<commit_message>
Distribute UML lecture work.
</commit_message>
<xml_diff>
--- a/OOAD/lectures/070--Notation.Part.2.pptx
+++ b/OOAD/lectures/070--Notation.Part.2.pptx
@@ -5,15 +5,34 @@
     <p:sldMasterId id="2147483648" r:id="rId1"/>
   </p:sldMasterIdLst>
   <p:notesMasterIdLst>
-    <p:notesMasterId r:id="rId8"/>
+    <p:notesMasterId r:id="rId27"/>
   </p:notesMasterIdLst>
   <p:sldIdLst>
     <p:sldId id="267" r:id="rId2"/>
     <p:sldId id="274" r:id="rId3"/>
-    <p:sldId id="292" r:id="rId4"/>
-    <p:sldId id="272" r:id="rId5"/>
-    <p:sldId id="291" r:id="rId6"/>
-    <p:sldId id="268" r:id="rId7"/>
+    <p:sldId id="312" r:id="rId4"/>
+    <p:sldId id="293" r:id="rId5"/>
+    <p:sldId id="294" r:id="rId6"/>
+    <p:sldId id="295" r:id="rId7"/>
+    <p:sldId id="296" r:id="rId8"/>
+    <p:sldId id="297" r:id="rId9"/>
+    <p:sldId id="298" r:id="rId10"/>
+    <p:sldId id="299" r:id="rId11"/>
+    <p:sldId id="300" r:id="rId12"/>
+    <p:sldId id="301" r:id="rId13"/>
+    <p:sldId id="302" r:id="rId14"/>
+    <p:sldId id="303" r:id="rId15"/>
+    <p:sldId id="304" r:id="rId16"/>
+    <p:sldId id="305" r:id="rId17"/>
+    <p:sldId id="306" r:id="rId18"/>
+    <p:sldId id="307" r:id="rId19"/>
+    <p:sldId id="308" r:id="rId20"/>
+    <p:sldId id="309" r:id="rId21"/>
+    <p:sldId id="310" r:id="rId22"/>
+    <p:sldId id="311" r:id="rId23"/>
+    <p:sldId id="272" r:id="rId24"/>
+    <p:sldId id="291" r:id="rId25"/>
+    <p:sldId id="268" r:id="rId26"/>
   </p:sldIdLst>
   <p:sldSz cx="9144000" cy="6858000" type="screen4x3"/>
   <p:notesSz cx="6858000" cy="9144000"/>
@@ -144,7 +163,7 @@
   </p:defaultTextStyle>
   <p:extLst>
     <p:ext uri="{EFAFB233-063F-42B5-8137-9DF3F51BA10A}">
-      <p15:sldGuideLst xmlns:p15="http://schemas.microsoft.com/office/powerpoint/2012/main">
+      <p15:sldGuideLst xmlns:p15="http://schemas.microsoft.com/office/powerpoint/2012/main" xmlns="">
         <p15:guide id="1" orient="horz" pos="2160">
           <p15:clr>
             <a:srgbClr val="A4A3A4"/>
@@ -211,14 +230,14 @@
           <a:effectLst/>
           <a:extLst>
             <a:ext uri="{909E8E84-426E-40DD-AFC4-6F175D3DCCD1}">
-              <a14:hiddenFill xmlns:a14="http://schemas.microsoft.com/office/drawing/2010/main">
+              <a14:hiddenFill xmlns:a14="http://schemas.microsoft.com/office/drawing/2010/main" xmlns="">
                 <a:solidFill>
                   <a:schemeClr val="accent1"/>
                 </a:solidFill>
               </a14:hiddenFill>
             </a:ext>
             <a:ext uri="{91240B29-F687-4F45-9708-019B960494DF}">
-              <a14:hiddenLine xmlns:a14="http://schemas.microsoft.com/office/drawing/2010/main" w="9525">
+              <a14:hiddenLine xmlns:a14="http://schemas.microsoft.com/office/drawing/2010/main" xmlns="" w="9525">
                 <a:solidFill>
                   <a:schemeClr val="tx1"/>
                 </a:solidFill>
@@ -228,7 +247,7 @@
               </a14:hiddenLine>
             </a:ext>
             <a:ext uri="{AF507438-7753-43E0-B8FC-AC1667EBCBE1}">
-              <a14:hiddenEffects xmlns:a14="http://schemas.microsoft.com/office/drawing/2010/main">
+              <a14:hiddenEffects xmlns:a14="http://schemas.microsoft.com/office/drawing/2010/main" xmlns="">
                 <a:effectLst>
                   <a:outerShdw dist="35921" dir="2700000" algn="ctr" rotWithShape="0">
                     <a:schemeClr val="bg2"/>
@@ -282,14 +301,14 @@
           <a:effectLst/>
           <a:extLst>
             <a:ext uri="{909E8E84-426E-40DD-AFC4-6F175D3DCCD1}">
-              <a14:hiddenFill xmlns:a14="http://schemas.microsoft.com/office/drawing/2010/main">
+              <a14:hiddenFill xmlns:a14="http://schemas.microsoft.com/office/drawing/2010/main" xmlns="">
                 <a:solidFill>
                   <a:schemeClr val="accent1"/>
                 </a:solidFill>
               </a14:hiddenFill>
             </a:ext>
             <a:ext uri="{91240B29-F687-4F45-9708-019B960494DF}">
-              <a14:hiddenLine xmlns:a14="http://schemas.microsoft.com/office/drawing/2010/main" w="9525">
+              <a14:hiddenLine xmlns:a14="http://schemas.microsoft.com/office/drawing/2010/main" xmlns="" w="9525">
                 <a:solidFill>
                   <a:schemeClr val="tx1"/>
                 </a:solidFill>
@@ -299,7 +318,7 @@
               </a14:hiddenLine>
             </a:ext>
             <a:ext uri="{AF507438-7753-43E0-B8FC-AC1667EBCBE1}">
-              <a14:hiddenEffects xmlns:a14="http://schemas.microsoft.com/office/drawing/2010/main">
+              <a14:hiddenEffects xmlns:a14="http://schemas.microsoft.com/office/drawing/2010/main" xmlns="">
                 <a:effectLst>
                   <a:outerShdw dist="35921" dir="2700000" algn="ctr" rotWithShape="0">
                     <a:schemeClr val="bg2"/>
@@ -358,14 +377,14 @@
           <a:effectLst/>
           <a:extLst>
             <a:ext uri="{909E8E84-426E-40DD-AFC4-6F175D3DCCD1}">
-              <a14:hiddenFill xmlns:a14="http://schemas.microsoft.com/office/drawing/2010/main">
+              <a14:hiddenFill xmlns:a14="http://schemas.microsoft.com/office/drawing/2010/main" xmlns="">
                 <a:solidFill>
                   <a:srgbClr val="FFFFFF"/>
                 </a:solidFill>
               </a14:hiddenFill>
             </a:ext>
             <a:ext uri="{AF507438-7753-43E0-B8FC-AC1667EBCBE1}">
-              <a14:hiddenEffects xmlns:a14="http://schemas.microsoft.com/office/drawing/2010/main">
+              <a14:hiddenEffects xmlns:a14="http://schemas.microsoft.com/office/drawing/2010/main" xmlns="">
                 <a:effectLst>
                   <a:outerShdw dist="35921" dir="2700000" algn="ctr" rotWithShape="0">
                     <a:srgbClr val="808080"/>
@@ -374,7 +393,7 @@
               </a14:hiddenEffects>
             </a:ext>
             <a:ext uri="{53640926-AAD7-44D8-BBD7-CCE9431645EC}">
-              <a14:shadowObscured xmlns:a14="http://schemas.microsoft.com/office/drawing/2010/main" val="1"/>
+              <a14:shadowObscured xmlns:a14="http://schemas.microsoft.com/office/drawing/2010/main" xmlns="" val="1"/>
             </a:ext>
           </a:extLst>
         </p:spPr>
@@ -404,14 +423,14 @@
           <a:effectLst/>
           <a:extLst>
             <a:ext uri="{909E8E84-426E-40DD-AFC4-6F175D3DCCD1}">
-              <a14:hiddenFill xmlns:a14="http://schemas.microsoft.com/office/drawing/2010/main">
+              <a14:hiddenFill xmlns:a14="http://schemas.microsoft.com/office/drawing/2010/main" xmlns="">
                 <a:solidFill>
                   <a:schemeClr val="accent1"/>
                 </a:solidFill>
               </a14:hiddenFill>
             </a:ext>
             <a:ext uri="{91240B29-F687-4F45-9708-019B960494DF}">
-              <a14:hiddenLine xmlns:a14="http://schemas.microsoft.com/office/drawing/2010/main" w="9525">
+              <a14:hiddenLine xmlns:a14="http://schemas.microsoft.com/office/drawing/2010/main" xmlns="" w="9525">
                 <a:solidFill>
                   <a:schemeClr val="tx1"/>
                 </a:solidFill>
@@ -421,7 +440,7 @@
               </a14:hiddenLine>
             </a:ext>
             <a:ext uri="{AF507438-7753-43E0-B8FC-AC1667EBCBE1}">
-              <a14:hiddenEffects xmlns:a14="http://schemas.microsoft.com/office/drawing/2010/main">
+              <a14:hiddenEffects xmlns:a14="http://schemas.microsoft.com/office/drawing/2010/main" xmlns="">
                 <a:effectLst>
                   <a:outerShdw dist="35921" dir="2700000" algn="ctr" rotWithShape="0">
                     <a:schemeClr val="bg2"/>
@@ -500,14 +519,14 @@
           <a:effectLst/>
           <a:extLst>
             <a:ext uri="{909E8E84-426E-40DD-AFC4-6F175D3DCCD1}">
-              <a14:hiddenFill xmlns:a14="http://schemas.microsoft.com/office/drawing/2010/main">
+              <a14:hiddenFill xmlns:a14="http://schemas.microsoft.com/office/drawing/2010/main" xmlns="">
                 <a:solidFill>
                   <a:schemeClr val="accent1"/>
                 </a:solidFill>
               </a14:hiddenFill>
             </a:ext>
             <a:ext uri="{91240B29-F687-4F45-9708-019B960494DF}">
-              <a14:hiddenLine xmlns:a14="http://schemas.microsoft.com/office/drawing/2010/main" w="9525">
+              <a14:hiddenLine xmlns:a14="http://schemas.microsoft.com/office/drawing/2010/main" xmlns="" w="9525">
                 <a:solidFill>
                   <a:schemeClr val="tx1"/>
                 </a:solidFill>
@@ -517,7 +536,7 @@
               </a14:hiddenLine>
             </a:ext>
             <a:ext uri="{AF507438-7753-43E0-B8FC-AC1667EBCBE1}">
-              <a14:hiddenEffects xmlns:a14="http://schemas.microsoft.com/office/drawing/2010/main">
+              <a14:hiddenEffects xmlns:a14="http://schemas.microsoft.com/office/drawing/2010/main" xmlns="">
                 <a:effectLst>
                   <a:outerShdw dist="35921" dir="2700000" algn="ctr" rotWithShape="0">
                     <a:schemeClr val="bg2"/>
@@ -571,14 +590,14 @@
           <a:effectLst/>
           <a:extLst>
             <a:ext uri="{909E8E84-426E-40DD-AFC4-6F175D3DCCD1}">
-              <a14:hiddenFill xmlns:a14="http://schemas.microsoft.com/office/drawing/2010/main">
+              <a14:hiddenFill xmlns:a14="http://schemas.microsoft.com/office/drawing/2010/main" xmlns="">
                 <a:solidFill>
                   <a:schemeClr val="accent1"/>
                 </a:solidFill>
               </a14:hiddenFill>
             </a:ext>
             <a:ext uri="{91240B29-F687-4F45-9708-019B960494DF}">
-              <a14:hiddenLine xmlns:a14="http://schemas.microsoft.com/office/drawing/2010/main" w="9525">
+              <a14:hiddenLine xmlns:a14="http://schemas.microsoft.com/office/drawing/2010/main" xmlns="" w="9525">
                 <a:solidFill>
                   <a:schemeClr val="tx1"/>
                 </a:solidFill>
@@ -588,7 +607,7 @@
               </a14:hiddenLine>
             </a:ext>
             <a:ext uri="{AF507438-7753-43E0-B8FC-AC1667EBCBE1}">
-              <a14:hiddenEffects xmlns:a14="http://schemas.microsoft.com/office/drawing/2010/main">
+              <a14:hiddenEffects xmlns:a14="http://schemas.microsoft.com/office/drawing/2010/main" xmlns="">
                 <a:effectLst>
                   <a:outerShdw dist="35921" dir="2700000" algn="ctr" rotWithShape="0">
                     <a:schemeClr val="bg2"/>
@@ -627,7 +646,7 @@
     </p:spTree>
     <p:extLst>
       <p:ext uri="{BB962C8B-B14F-4D97-AF65-F5344CB8AC3E}">
-        <p14:creationId xmlns:p14="http://schemas.microsoft.com/office/powerpoint/2010/main" val="1534625768"/>
+        <p14:creationId xmlns:p14="http://schemas.microsoft.com/office/powerpoint/2010/main" xmlns="" val="1534625768"/>
       </p:ext>
     </p:extLst>
   </p:cSld>
@@ -874,7 +893,7 @@
     </p:spTree>
     <p:extLst>
       <p:ext uri="{BB962C8B-B14F-4D97-AF65-F5344CB8AC3E}">
-        <p14:creationId xmlns:p14="http://schemas.microsoft.com/office/powerpoint/2010/main" val="2716104023"/>
+        <p14:creationId xmlns:p14="http://schemas.microsoft.com/office/powerpoint/2010/main" xmlns="" val="2716104023"/>
       </p:ext>
     </p:extLst>
   </p:cSld>
@@ -1011,7 +1030,7 @@
               <a:pPr>
                 <a:defRPr/>
               </a:pPr>
-              <a:t>10/28/2017</a:t>
+              <a:t>10/29/2017</a:t>
             </a:fld>
             <a:endParaRPr lang="en-US" altLang="en-US"/>
           </a:p>
@@ -1098,7 +1117,7 @@
     </p:spTree>
     <p:extLst>
       <p:ext uri="{BB962C8B-B14F-4D97-AF65-F5344CB8AC3E}">
-        <p14:creationId xmlns:p14="http://schemas.microsoft.com/office/powerpoint/2010/main" val="3849012506"/>
+        <p14:creationId xmlns:p14="http://schemas.microsoft.com/office/powerpoint/2010/main" xmlns="" val="3849012506"/>
       </p:ext>
     </p:extLst>
   </p:cSld>
@@ -1245,7 +1264,7 @@
               <a:pPr>
                 <a:defRPr/>
               </a:pPr>
-              <a:t>10/28/2017</a:t>
+              <a:t>10/29/2017</a:t>
             </a:fld>
             <a:endParaRPr lang="en-US" altLang="en-US"/>
           </a:p>
@@ -1332,7 +1351,7 @@
     </p:spTree>
     <p:extLst>
       <p:ext uri="{BB962C8B-B14F-4D97-AF65-F5344CB8AC3E}">
-        <p14:creationId xmlns:p14="http://schemas.microsoft.com/office/powerpoint/2010/main" val="1950966811"/>
+        <p14:creationId xmlns:p14="http://schemas.microsoft.com/office/powerpoint/2010/main" xmlns="" val="1950966811"/>
       </p:ext>
     </p:extLst>
   </p:cSld>
@@ -1437,7 +1456,7 @@
     </p:spTree>
     <p:extLst>
       <p:ext uri="{BB962C8B-B14F-4D97-AF65-F5344CB8AC3E}">
-        <p14:creationId xmlns:p14="http://schemas.microsoft.com/office/powerpoint/2010/main" val="1766794565"/>
+        <p14:creationId xmlns:p14="http://schemas.microsoft.com/office/powerpoint/2010/main" xmlns="" val="1766794565"/>
       </p:ext>
     </p:extLst>
   </p:cSld>
@@ -1564,7 +1583,7 @@
     </p:spTree>
     <p:extLst>
       <p:ext uri="{BB962C8B-B14F-4D97-AF65-F5344CB8AC3E}">
-        <p14:creationId xmlns:p14="http://schemas.microsoft.com/office/powerpoint/2010/main" val="2138603420"/>
+        <p14:creationId xmlns:p14="http://schemas.microsoft.com/office/powerpoint/2010/main" xmlns="" val="2138603420"/>
       </p:ext>
     </p:extLst>
   </p:cSld>
@@ -1731,7 +1750,7 @@
     </p:spTree>
     <p:extLst>
       <p:ext uri="{BB962C8B-B14F-4D97-AF65-F5344CB8AC3E}">
-        <p14:creationId xmlns:p14="http://schemas.microsoft.com/office/powerpoint/2010/main" val="2826881444"/>
+        <p14:creationId xmlns:p14="http://schemas.microsoft.com/office/powerpoint/2010/main" xmlns="" val="2826881444"/>
       </p:ext>
     </p:extLst>
   </p:cSld>
@@ -2033,7 +2052,7 @@
     </p:spTree>
     <p:extLst>
       <p:ext uri="{BB962C8B-B14F-4D97-AF65-F5344CB8AC3E}">
-        <p14:creationId xmlns:p14="http://schemas.microsoft.com/office/powerpoint/2010/main" val="1963513231"/>
+        <p14:creationId xmlns:p14="http://schemas.microsoft.com/office/powerpoint/2010/main" xmlns="" val="1963513231"/>
       </p:ext>
     </p:extLst>
   </p:cSld>
@@ -2118,7 +2137,7 @@
               <a:pPr>
                 <a:defRPr/>
               </a:pPr>
-              <a:t>10/28/2017</a:t>
+              <a:t>10/29/2017</a:t>
             </a:fld>
             <a:endParaRPr lang="en-US" altLang="en-US"/>
           </a:p>
@@ -2205,7 +2224,7 @@
     </p:spTree>
     <p:extLst>
       <p:ext uri="{BB962C8B-B14F-4D97-AF65-F5344CB8AC3E}">
-        <p14:creationId xmlns:p14="http://schemas.microsoft.com/office/powerpoint/2010/main" val="2218195436"/>
+        <p14:creationId xmlns:p14="http://schemas.microsoft.com/office/powerpoint/2010/main" xmlns="" val="2218195436"/>
       </p:ext>
     </p:extLst>
   </p:cSld>
@@ -2267,7 +2286,7 @@
               <a:pPr>
                 <a:defRPr/>
               </a:pPr>
-              <a:t>10/28/2017</a:t>
+              <a:t>10/29/2017</a:t>
             </a:fld>
             <a:endParaRPr lang="en-US" altLang="en-US"/>
           </a:p>
@@ -2354,7 +2373,7 @@
     </p:spTree>
     <p:extLst>
       <p:ext uri="{BB962C8B-B14F-4D97-AF65-F5344CB8AC3E}">
-        <p14:creationId xmlns:p14="http://schemas.microsoft.com/office/powerpoint/2010/main" val="1171497205"/>
+        <p14:creationId xmlns:p14="http://schemas.microsoft.com/office/powerpoint/2010/main" xmlns="" val="1171497205"/>
       </p:ext>
     </p:extLst>
   </p:cSld>
@@ -2598,7 +2617,7 @@
               <a:pPr>
                 <a:defRPr/>
               </a:pPr>
-              <a:t>10/28/2017</a:t>
+              <a:t>10/29/2017</a:t>
             </a:fld>
             <a:endParaRPr lang="en-US" altLang="en-US"/>
           </a:p>
@@ -2685,7 +2704,7 @@
     </p:spTree>
     <p:extLst>
       <p:ext uri="{BB962C8B-B14F-4D97-AF65-F5344CB8AC3E}">
-        <p14:creationId xmlns:p14="http://schemas.microsoft.com/office/powerpoint/2010/main" val="2730479000"/>
+        <p14:creationId xmlns:p14="http://schemas.microsoft.com/office/powerpoint/2010/main" xmlns="" val="2730479000"/>
       </p:ext>
     </p:extLst>
   </p:cSld>
@@ -2906,7 +2925,7 @@
               <a:pPr>
                 <a:defRPr/>
               </a:pPr>
-              <a:t>10/28/2017</a:t>
+              <a:t>10/29/2017</a:t>
             </a:fld>
             <a:endParaRPr lang="en-US" altLang="en-US"/>
           </a:p>
@@ -2993,7 +3012,7 @@
     </p:spTree>
     <p:extLst>
       <p:ext uri="{BB962C8B-B14F-4D97-AF65-F5344CB8AC3E}">
-        <p14:creationId xmlns:p14="http://schemas.microsoft.com/office/powerpoint/2010/main" val="2177943095"/>
+        <p14:creationId xmlns:p14="http://schemas.microsoft.com/office/powerpoint/2010/main" xmlns="" val="2177943095"/>
       </p:ext>
     </p:extLst>
   </p:cSld>
@@ -3053,14 +3072,14 @@
           <a:effectLst/>
           <a:extLst>
             <a:ext uri="{909E8E84-426E-40DD-AFC4-6F175D3DCCD1}">
-              <a14:hiddenFill xmlns:a14="http://schemas.microsoft.com/office/drawing/2010/main">
+              <a14:hiddenFill xmlns:a14="http://schemas.microsoft.com/office/drawing/2010/main" xmlns="">
                 <a:solidFill>
                   <a:schemeClr val="accent1"/>
                 </a:solidFill>
               </a14:hiddenFill>
             </a:ext>
             <a:ext uri="{91240B29-F687-4F45-9708-019B960494DF}">
-              <a14:hiddenLine xmlns:a14="http://schemas.microsoft.com/office/drawing/2010/main" w="9525">
+              <a14:hiddenLine xmlns:a14="http://schemas.microsoft.com/office/drawing/2010/main" xmlns="" w="9525">
                 <a:solidFill>
                   <a:schemeClr val="tx1"/>
                 </a:solidFill>
@@ -3070,7 +3089,7 @@
               </a14:hiddenLine>
             </a:ext>
             <a:ext uri="{AF507438-7753-43E0-B8FC-AC1667EBCBE1}">
-              <a14:hiddenEffects xmlns:a14="http://schemas.microsoft.com/office/drawing/2010/main">
+              <a14:hiddenEffects xmlns:a14="http://schemas.microsoft.com/office/drawing/2010/main" xmlns="">
                 <a:effectLst>
                   <a:outerShdw dist="35921" dir="2700000" algn="ctr" rotWithShape="0">
                     <a:schemeClr val="bg2"/>
@@ -3121,14 +3140,14 @@
           <a:effectLst/>
           <a:extLst>
             <a:ext uri="{909E8E84-426E-40DD-AFC4-6F175D3DCCD1}">
-              <a14:hiddenFill xmlns:a14="http://schemas.microsoft.com/office/drawing/2010/main">
+              <a14:hiddenFill xmlns:a14="http://schemas.microsoft.com/office/drawing/2010/main" xmlns="">
                 <a:solidFill>
                   <a:schemeClr val="accent1"/>
                 </a:solidFill>
               </a14:hiddenFill>
             </a:ext>
             <a:ext uri="{91240B29-F687-4F45-9708-019B960494DF}">
-              <a14:hiddenLine xmlns:a14="http://schemas.microsoft.com/office/drawing/2010/main" w="9525">
+              <a14:hiddenLine xmlns:a14="http://schemas.microsoft.com/office/drawing/2010/main" xmlns="" w="9525">
                 <a:solidFill>
                   <a:schemeClr val="tx1"/>
                 </a:solidFill>
@@ -3138,7 +3157,7 @@
               </a14:hiddenLine>
             </a:ext>
             <a:ext uri="{AF507438-7753-43E0-B8FC-AC1667EBCBE1}">
-              <a14:hiddenEffects xmlns:a14="http://schemas.microsoft.com/office/drawing/2010/main">
+              <a14:hiddenEffects xmlns:a14="http://schemas.microsoft.com/office/drawing/2010/main" xmlns="">
                 <a:effectLst>
                   <a:outerShdw dist="35921" dir="2700000" algn="ctr" rotWithShape="0">
                     <a:schemeClr val="bg2"/>
@@ -3686,14 +3705,14 @@
           </a:ln>
           <a:extLst>
             <a:ext uri="{909E8E84-426E-40DD-AFC4-6F175D3DCCD1}">
-              <a14:hiddenFill xmlns:a14="http://schemas.microsoft.com/office/drawing/2010/main">
+              <a14:hiddenFill xmlns:a14="http://schemas.microsoft.com/office/drawing/2010/main" xmlns="">
                 <a:solidFill>
                   <a:srgbClr val="FFFFFF"/>
                 </a:solidFill>
               </a14:hiddenFill>
             </a:ext>
             <a:ext uri="{91240B29-F687-4F45-9708-019B960494DF}">
-              <a14:hiddenLine xmlns:a14="http://schemas.microsoft.com/office/drawing/2010/main" w="9525">
+              <a14:hiddenLine xmlns:a14="http://schemas.microsoft.com/office/drawing/2010/main" xmlns="" w="9525">
                 <a:solidFill>
                   <a:srgbClr val="000000"/>
                 </a:solidFill>
@@ -3868,6 +3887,1506 @@
 </p:sld>
 </file>
 
+<file path=ppt/slides/slide10.xml><?xml version="1.0" encoding="utf-8"?>
+<p:sld xmlns:a="http://schemas.openxmlformats.org/drawingml/2006/main" xmlns:r="http://schemas.openxmlformats.org/officeDocument/2006/relationships" xmlns:p="http://schemas.openxmlformats.org/presentationml/2006/main">
+  <p:cSld>
+    <p:spTree>
+      <p:nvGrpSpPr>
+        <p:cNvPr id="1" name=""/>
+        <p:cNvGrpSpPr/>
+        <p:nvPr/>
+      </p:nvGrpSpPr>
+      <p:grpSpPr>
+        <a:xfrm>
+          <a:off x="0" y="0"/>
+          <a:ext cx="0" cy="0"/>
+          <a:chOff x="0" y="0"/>
+          <a:chExt cx="0" cy="0"/>
+        </a:xfrm>
+      </p:grpSpPr>
+      <p:sp>
+        <p:nvSpPr>
+          <p:cNvPr id="2" name="Title 1"/>
+          <p:cNvSpPr>
+            <a:spLocks noGrp="1"/>
+          </p:cNvSpPr>
+          <p:nvPr>
+            <p:ph type="title"/>
+          </p:nvPr>
+        </p:nvSpPr>
+        <p:spPr/>
+        <p:txBody>
+          <a:bodyPr/>
+          <a:lstStyle/>
+          <a:p>
+            <a:r>
+              <a:rPr lang="en-GB" dirty="0"/>
+              <a:t>Composite Structure </a:t>
+            </a:r>
+            <a:r>
+              <a:rPr lang="en-GB" dirty="0" smtClean="0"/>
+              <a:t>Diagram</a:t>
+            </a:r>
+            <a:endParaRPr lang="en-GB" dirty="0"/>
+          </a:p>
+        </p:txBody>
+      </p:sp>
+      <p:sp>
+        <p:nvSpPr>
+          <p:cNvPr id="3" name="Content Placeholder 2"/>
+          <p:cNvSpPr>
+            <a:spLocks noGrp="1"/>
+          </p:cNvSpPr>
+          <p:nvPr>
+            <p:ph idx="1"/>
+          </p:nvPr>
+        </p:nvSpPr>
+        <p:spPr/>
+        <p:txBody>
+          <a:bodyPr/>
+          <a:lstStyle/>
+          <a:p>
+            <a:r>
+              <a:rPr lang="en-GB" dirty="0"/>
+              <a:t>Composite structure diagrams provide a way to depict a structured classifier with</a:t>
+            </a:r>
+            <a:br>
+              <a:rPr lang="en-GB" dirty="0"/>
+            </a:br>
+            <a:r>
+              <a:rPr lang="en-GB" dirty="0"/>
+              <a:t>the definition of its internal </a:t>
+            </a:r>
+            <a:r>
+              <a:rPr lang="en-GB" dirty="0" smtClean="0"/>
+              <a:t>structure.</a:t>
+            </a:r>
+          </a:p>
+          <a:p>
+            <a:r>
+              <a:rPr lang="en-GB" dirty="0" smtClean="0"/>
+              <a:t>This </a:t>
+            </a:r>
+            <a:r>
+              <a:rPr lang="en-GB" dirty="0"/>
+              <a:t>internal structure is comprised of </a:t>
+            </a:r>
+            <a:r>
+              <a:rPr lang="en-GB" dirty="0" smtClean="0"/>
+              <a:t>parts and </a:t>
+            </a:r>
+            <a:r>
+              <a:rPr lang="en-GB" dirty="0"/>
+              <a:t>their interconnections, all within the namespace of the composite structure.</a:t>
+            </a:r>
+            <a:br>
+              <a:rPr lang="en-GB" dirty="0"/>
+            </a:br>
+            <a:r>
+              <a:rPr lang="en-GB" dirty="0"/>
+              <a:t/>
+            </a:r>
+            <a:br>
+              <a:rPr lang="en-GB" dirty="0"/>
+            </a:br>
+            <a:endParaRPr lang="en-GB" dirty="0"/>
+          </a:p>
+        </p:txBody>
+      </p:sp>
+    </p:spTree>
+    <p:extLst>
+      <p:ext uri="{BB962C8B-B14F-4D97-AF65-F5344CB8AC3E}">
+        <p14:creationId xmlns:p14="http://schemas.microsoft.com/office/powerpoint/2010/main" xmlns="" val="3088272837"/>
+      </p:ext>
+    </p:extLst>
+  </p:cSld>
+  <p:clrMapOvr>
+    <a:masterClrMapping/>
+  </p:clrMapOvr>
+  <p:timing>
+    <p:tnLst>
+      <p:par>
+        <p:cTn id="1" dur="indefinite" restart="never" nodeType="tmRoot"/>
+      </p:par>
+    </p:tnLst>
+  </p:timing>
+</p:sld>
+</file>
+
+<file path=ppt/slides/slide11.xml><?xml version="1.0" encoding="utf-8"?>
+<p:sld xmlns:a="http://schemas.openxmlformats.org/drawingml/2006/main" xmlns:r="http://schemas.openxmlformats.org/officeDocument/2006/relationships" xmlns:p="http://schemas.openxmlformats.org/presentationml/2006/main">
+  <p:cSld>
+    <p:spTree>
+      <p:nvGrpSpPr>
+        <p:cNvPr id="1" name=""/>
+        <p:cNvGrpSpPr/>
+        <p:nvPr/>
+      </p:nvGrpSpPr>
+      <p:grpSpPr>
+        <a:xfrm>
+          <a:off x="0" y="0"/>
+          <a:ext cx="0" cy="0"/>
+          <a:chOff x="0" y="0"/>
+          <a:chExt cx="0" cy="0"/>
+        </a:xfrm>
+      </p:grpSpPr>
+      <p:sp>
+        <p:nvSpPr>
+          <p:cNvPr id="2" name="Title 1"/>
+          <p:cNvSpPr>
+            <a:spLocks noGrp="1"/>
+          </p:cNvSpPr>
+          <p:nvPr>
+            <p:ph type="title"/>
+          </p:nvPr>
+        </p:nvSpPr>
+        <p:spPr/>
+        <p:txBody>
+          <a:bodyPr/>
+          <a:lstStyle/>
+          <a:p>
+            <a:r>
+              <a:rPr lang="en-GB" dirty="0" smtClean="0"/>
+              <a:t>Example</a:t>
+            </a:r>
+            <a:endParaRPr lang="en-GB" dirty="0"/>
+          </a:p>
+        </p:txBody>
+      </p:sp>
+      <p:sp>
+        <p:nvSpPr>
+          <p:cNvPr id="3" name="Content Placeholder 2"/>
+          <p:cNvSpPr>
+            <a:spLocks noGrp="1"/>
+          </p:cNvSpPr>
+          <p:nvPr>
+            <p:ph idx="1"/>
+          </p:nvPr>
+        </p:nvSpPr>
+        <p:spPr/>
+        <p:txBody>
+          <a:bodyPr/>
+          <a:lstStyle/>
+          <a:p>
+            <a:endParaRPr lang="en-GB"/>
+          </a:p>
+        </p:txBody>
+      </p:sp>
+      <p:pic>
+        <p:nvPicPr>
+          <p:cNvPr id="4" name="Picture 3"/>
+          <p:cNvPicPr>
+            <a:picLocks noChangeAspect="1"/>
+          </p:cNvPicPr>
+          <p:nvPr/>
+        </p:nvPicPr>
+        <p:blipFill>
+          <a:blip r:embed="rId2"/>
+          <a:stretch>
+            <a:fillRect/>
+          </a:stretch>
+        </p:blipFill>
+        <p:spPr>
+          <a:xfrm>
+            <a:off x="744834" y="2736056"/>
+            <a:ext cx="7654332" cy="2605088"/>
+          </a:xfrm>
+          <a:prstGeom prst="rect">
+            <a:avLst/>
+          </a:prstGeom>
+        </p:spPr>
+      </p:pic>
+    </p:spTree>
+    <p:extLst>
+      <p:ext uri="{BB962C8B-B14F-4D97-AF65-F5344CB8AC3E}">
+        <p14:creationId xmlns:p14="http://schemas.microsoft.com/office/powerpoint/2010/main" xmlns="" val="334759954"/>
+      </p:ext>
+    </p:extLst>
+  </p:cSld>
+  <p:clrMapOvr>
+    <a:masterClrMapping/>
+  </p:clrMapOvr>
+  <p:timing>
+    <p:tnLst>
+      <p:par>
+        <p:cTn id="1" dur="indefinite" restart="never" nodeType="tmRoot"/>
+      </p:par>
+    </p:tnLst>
+  </p:timing>
+</p:sld>
+</file>
+
+<file path=ppt/slides/slide12.xml><?xml version="1.0" encoding="utf-8"?>
+<p:sld xmlns:a="http://schemas.openxmlformats.org/drawingml/2006/main" xmlns:r="http://schemas.openxmlformats.org/officeDocument/2006/relationships" xmlns:p="http://schemas.openxmlformats.org/presentationml/2006/main">
+  <p:cSld>
+    <p:spTree>
+      <p:nvGrpSpPr>
+        <p:cNvPr id="1" name=""/>
+        <p:cNvGrpSpPr/>
+        <p:nvPr/>
+      </p:nvGrpSpPr>
+      <p:grpSpPr>
+        <a:xfrm>
+          <a:off x="0" y="0"/>
+          <a:ext cx="0" cy="0"/>
+          <a:chOff x="0" y="0"/>
+          <a:chExt cx="0" cy="0"/>
+        </a:xfrm>
+      </p:grpSpPr>
+      <p:sp>
+        <p:nvSpPr>
+          <p:cNvPr id="2" name="Title 1"/>
+          <p:cNvSpPr>
+            <a:spLocks noGrp="1"/>
+          </p:cNvSpPr>
+          <p:nvPr>
+            <p:ph type="title"/>
+          </p:nvPr>
+        </p:nvSpPr>
+        <p:spPr/>
+        <p:txBody>
+          <a:bodyPr/>
+          <a:lstStyle/>
+          <a:p>
+            <a:r>
+              <a:rPr lang="en-GB" dirty="0"/>
+              <a:t>State Machine Diagrams</a:t>
+            </a:r>
+          </a:p>
+        </p:txBody>
+      </p:sp>
+      <p:sp>
+        <p:nvSpPr>
+          <p:cNvPr id="3" name="Content Placeholder 2"/>
+          <p:cNvSpPr>
+            <a:spLocks noGrp="1"/>
+          </p:cNvSpPr>
+          <p:nvPr>
+            <p:ph idx="1"/>
+          </p:nvPr>
+        </p:nvSpPr>
+        <p:spPr>
+          <a:xfrm>
+            <a:off x="685800" y="1981200"/>
+            <a:ext cx="7772400" cy="4419600"/>
+          </a:xfrm>
+        </p:spPr>
+        <p:txBody>
+          <a:bodyPr>
+            <a:normAutofit fontScale="70000" lnSpcReduction="20000"/>
+          </a:bodyPr>
+          <a:lstStyle/>
+          <a:p>
+            <a:r>
+              <a:rPr lang="en-GB" dirty="0"/>
+              <a:t>Package </a:t>
+            </a:r>
+            <a:r>
+              <a:rPr lang="en-GB" dirty="0" smtClean="0"/>
+              <a:t>Diagrams</a:t>
+            </a:r>
+            <a:endParaRPr lang="en-GB" dirty="0"/>
+          </a:p>
+          <a:p>
+            <a:r>
+              <a:rPr lang="en-GB" dirty="0"/>
+              <a:t>Component </a:t>
+            </a:r>
+            <a:r>
+              <a:rPr lang="en-GB" dirty="0" smtClean="0"/>
+              <a:t>Diagrams</a:t>
+            </a:r>
+            <a:endParaRPr lang="en-GB" dirty="0"/>
+          </a:p>
+          <a:p>
+            <a:r>
+              <a:rPr lang="en-GB" dirty="0"/>
+              <a:t>Deployment </a:t>
+            </a:r>
+            <a:r>
+              <a:rPr lang="en-GB" dirty="0" smtClean="0"/>
+              <a:t>Diagrams</a:t>
+            </a:r>
+            <a:endParaRPr lang="en-GB" dirty="0"/>
+          </a:p>
+          <a:p>
+            <a:r>
+              <a:rPr lang="en-GB" dirty="0"/>
+              <a:t>Use </a:t>
+            </a:r>
+            <a:r>
+              <a:rPr lang="en-GB" dirty="0" smtClean="0"/>
+              <a:t>Case Diagrams</a:t>
+            </a:r>
+            <a:endParaRPr lang="en-GB" dirty="0"/>
+          </a:p>
+          <a:p>
+            <a:r>
+              <a:rPr lang="en-GB" dirty="0"/>
+              <a:t>Activity </a:t>
+            </a:r>
+            <a:r>
+              <a:rPr lang="en-GB" dirty="0" smtClean="0"/>
+              <a:t>Diagrams</a:t>
+            </a:r>
+            <a:endParaRPr lang="en-GB" dirty="0"/>
+          </a:p>
+          <a:p>
+            <a:r>
+              <a:rPr lang="en-GB" dirty="0"/>
+              <a:t>Class </a:t>
+            </a:r>
+            <a:r>
+              <a:rPr lang="en-GB" dirty="0" smtClean="0"/>
+              <a:t>Diagrams</a:t>
+            </a:r>
+            <a:endParaRPr lang="en-GB" dirty="0"/>
+          </a:p>
+          <a:p>
+            <a:r>
+              <a:rPr lang="en-GB" dirty="0"/>
+              <a:t>Sequence </a:t>
+            </a:r>
+            <a:r>
+              <a:rPr lang="en-GB" dirty="0" smtClean="0"/>
+              <a:t>Diagrams</a:t>
+            </a:r>
+            <a:endParaRPr lang="en-GB" dirty="0"/>
+          </a:p>
+          <a:p>
+            <a:r>
+              <a:rPr lang="en-GB" dirty="0"/>
+              <a:t>Interaction </a:t>
+            </a:r>
+            <a:r>
+              <a:rPr lang="en-GB" dirty="0" smtClean="0"/>
+              <a:t>Overview Diagrams</a:t>
+            </a:r>
+            <a:endParaRPr lang="en-GB" dirty="0"/>
+          </a:p>
+          <a:p>
+            <a:r>
+              <a:rPr lang="en-GB" dirty="0"/>
+              <a:t>Composite </a:t>
+            </a:r>
+            <a:r>
+              <a:rPr lang="en-GB" dirty="0" smtClean="0"/>
+              <a:t>Structure Diagrams</a:t>
+            </a:r>
+            <a:endParaRPr lang="en-GB" dirty="0"/>
+          </a:p>
+          <a:p>
+            <a:r>
+              <a:rPr lang="en-GB" b="1" dirty="0">
+                <a:solidFill>
+                  <a:srgbClr val="FF0000"/>
+                </a:solidFill>
+              </a:rPr>
+              <a:t>State </a:t>
+            </a:r>
+            <a:r>
+              <a:rPr lang="en-GB" b="1" dirty="0" smtClean="0">
+                <a:solidFill>
+                  <a:srgbClr val="FF0000"/>
+                </a:solidFill>
+              </a:rPr>
+              <a:t>Machine Diagrams</a:t>
+            </a:r>
+            <a:endParaRPr lang="en-GB" b="1" dirty="0">
+              <a:solidFill>
+                <a:srgbClr val="FF0000"/>
+              </a:solidFill>
+            </a:endParaRPr>
+          </a:p>
+          <a:p>
+            <a:r>
+              <a:rPr lang="en-GB" dirty="0"/>
+              <a:t>Timing </a:t>
+            </a:r>
+            <a:r>
+              <a:rPr lang="en-GB" dirty="0" smtClean="0"/>
+              <a:t>Diagrams</a:t>
+            </a:r>
+            <a:endParaRPr lang="en-GB" dirty="0"/>
+          </a:p>
+          <a:p>
+            <a:r>
+              <a:rPr lang="en-GB" dirty="0"/>
+              <a:t>Object </a:t>
+            </a:r>
+            <a:r>
+              <a:rPr lang="en-GB" dirty="0" smtClean="0"/>
+              <a:t>Diagrams</a:t>
+            </a:r>
+            <a:endParaRPr lang="en-GB" dirty="0"/>
+          </a:p>
+          <a:p>
+            <a:r>
+              <a:rPr lang="en-GB" dirty="0"/>
+              <a:t>Communication </a:t>
+            </a:r>
+            <a:r>
+              <a:rPr lang="en-GB" dirty="0" smtClean="0"/>
+              <a:t>Diagrams</a:t>
+            </a:r>
+            <a:endParaRPr lang="en-GB" dirty="0"/>
+          </a:p>
+        </p:txBody>
+      </p:sp>
+    </p:spTree>
+    <p:extLst>
+      <p:ext uri="{BB962C8B-B14F-4D97-AF65-F5344CB8AC3E}">
+        <p14:creationId xmlns:p14="http://schemas.microsoft.com/office/powerpoint/2010/main" xmlns="" val="2997175923"/>
+      </p:ext>
+    </p:extLst>
+  </p:cSld>
+  <p:clrMapOvr>
+    <a:masterClrMapping/>
+  </p:clrMapOvr>
+  <p:timing>
+    <p:tnLst>
+      <p:par>
+        <p:cTn id="1" dur="indefinite" restart="never" nodeType="tmRoot"/>
+      </p:par>
+    </p:tnLst>
+  </p:timing>
+</p:sld>
+</file>
+
+<file path=ppt/slides/slide13.xml><?xml version="1.0" encoding="utf-8"?>
+<p:sld xmlns:a="http://schemas.openxmlformats.org/drawingml/2006/main" xmlns:r="http://schemas.openxmlformats.org/officeDocument/2006/relationships" xmlns:p="http://schemas.openxmlformats.org/presentationml/2006/main">
+  <p:cSld>
+    <p:spTree>
+      <p:nvGrpSpPr>
+        <p:cNvPr id="1" name=""/>
+        <p:cNvGrpSpPr/>
+        <p:nvPr/>
+      </p:nvGrpSpPr>
+      <p:grpSpPr>
+        <a:xfrm>
+          <a:off x="0" y="0"/>
+          <a:ext cx="0" cy="0"/>
+          <a:chOff x="0" y="0"/>
+          <a:chExt cx="0" cy="0"/>
+        </a:xfrm>
+      </p:grpSpPr>
+      <p:sp>
+        <p:nvSpPr>
+          <p:cNvPr id="2" name="Title 1"/>
+          <p:cNvSpPr>
+            <a:spLocks noGrp="1"/>
+          </p:cNvSpPr>
+          <p:nvPr>
+            <p:ph type="title"/>
+          </p:nvPr>
+        </p:nvSpPr>
+        <p:spPr/>
+        <p:txBody>
+          <a:bodyPr/>
+          <a:lstStyle/>
+          <a:p>
+            <a:r>
+              <a:rPr lang="en-GB" dirty="0" smtClean="0"/>
+              <a:t>Example</a:t>
+            </a:r>
+            <a:endParaRPr lang="en-GB" dirty="0"/>
+          </a:p>
+        </p:txBody>
+      </p:sp>
+      <p:sp>
+        <p:nvSpPr>
+          <p:cNvPr id="3" name="Content Placeholder 2"/>
+          <p:cNvSpPr>
+            <a:spLocks noGrp="1"/>
+          </p:cNvSpPr>
+          <p:nvPr>
+            <p:ph idx="1"/>
+          </p:nvPr>
+        </p:nvSpPr>
+        <p:spPr/>
+        <p:txBody>
+          <a:bodyPr/>
+          <a:lstStyle/>
+          <a:p>
+            <a:endParaRPr lang="en-GB"/>
+          </a:p>
+        </p:txBody>
+      </p:sp>
+      <p:pic>
+        <p:nvPicPr>
+          <p:cNvPr id="4" name="Picture 3"/>
+          <p:cNvPicPr>
+            <a:picLocks noChangeAspect="1"/>
+          </p:cNvPicPr>
+          <p:nvPr/>
+        </p:nvPicPr>
+        <p:blipFill>
+          <a:blip r:embed="rId2"/>
+          <a:stretch>
+            <a:fillRect/>
+          </a:stretch>
+        </p:blipFill>
+        <p:spPr>
+          <a:xfrm>
+            <a:off x="838200" y="2362200"/>
+            <a:ext cx="7896225" cy="3438525"/>
+          </a:xfrm>
+          <a:prstGeom prst="rect">
+            <a:avLst/>
+          </a:prstGeom>
+        </p:spPr>
+      </p:pic>
+    </p:spTree>
+    <p:extLst>
+      <p:ext uri="{BB962C8B-B14F-4D97-AF65-F5344CB8AC3E}">
+        <p14:creationId xmlns:p14="http://schemas.microsoft.com/office/powerpoint/2010/main" xmlns="" val="3143873876"/>
+      </p:ext>
+    </p:extLst>
+  </p:cSld>
+  <p:clrMapOvr>
+    <a:masterClrMapping/>
+  </p:clrMapOvr>
+  <p:timing>
+    <p:tnLst>
+      <p:par>
+        <p:cTn id="1" dur="indefinite" restart="never" nodeType="tmRoot"/>
+      </p:par>
+    </p:tnLst>
+  </p:timing>
+</p:sld>
+</file>
+
+<file path=ppt/slides/slide14.xml><?xml version="1.0" encoding="utf-8"?>
+<p:sld xmlns:a="http://schemas.openxmlformats.org/drawingml/2006/main" xmlns:r="http://schemas.openxmlformats.org/officeDocument/2006/relationships" xmlns:p="http://schemas.openxmlformats.org/presentationml/2006/main">
+  <p:cSld>
+    <p:spTree>
+      <p:nvGrpSpPr>
+        <p:cNvPr id="1" name=""/>
+        <p:cNvGrpSpPr/>
+        <p:nvPr/>
+      </p:nvGrpSpPr>
+      <p:grpSpPr>
+        <a:xfrm>
+          <a:off x="0" y="0"/>
+          <a:ext cx="0" cy="0"/>
+          <a:chOff x="0" y="0"/>
+          <a:chExt cx="0" cy="0"/>
+        </a:xfrm>
+      </p:grpSpPr>
+      <p:sp>
+        <p:nvSpPr>
+          <p:cNvPr id="2" name="Title 1"/>
+          <p:cNvSpPr>
+            <a:spLocks noGrp="1"/>
+          </p:cNvSpPr>
+          <p:nvPr>
+            <p:ph type="title"/>
+          </p:nvPr>
+        </p:nvSpPr>
+        <p:spPr/>
+        <p:txBody>
+          <a:bodyPr/>
+          <a:lstStyle/>
+          <a:p>
+            <a:r>
+              <a:rPr lang="en-GB" dirty="0"/>
+              <a:t>Timing Diagrams</a:t>
+            </a:r>
+          </a:p>
+        </p:txBody>
+      </p:sp>
+      <p:sp>
+        <p:nvSpPr>
+          <p:cNvPr id="3" name="Content Placeholder 2"/>
+          <p:cNvSpPr>
+            <a:spLocks noGrp="1"/>
+          </p:cNvSpPr>
+          <p:nvPr>
+            <p:ph idx="1"/>
+          </p:nvPr>
+        </p:nvSpPr>
+        <p:spPr>
+          <a:xfrm>
+            <a:off x="685800" y="1981200"/>
+            <a:ext cx="7772400" cy="4419600"/>
+          </a:xfrm>
+        </p:spPr>
+        <p:txBody>
+          <a:bodyPr>
+            <a:normAutofit fontScale="70000" lnSpcReduction="20000"/>
+          </a:bodyPr>
+          <a:lstStyle/>
+          <a:p>
+            <a:r>
+              <a:rPr lang="en-GB" dirty="0"/>
+              <a:t>Package </a:t>
+            </a:r>
+            <a:r>
+              <a:rPr lang="en-GB" dirty="0" smtClean="0"/>
+              <a:t>Diagrams</a:t>
+            </a:r>
+            <a:endParaRPr lang="en-GB" dirty="0"/>
+          </a:p>
+          <a:p>
+            <a:r>
+              <a:rPr lang="en-GB" dirty="0"/>
+              <a:t>Component </a:t>
+            </a:r>
+            <a:r>
+              <a:rPr lang="en-GB" dirty="0" smtClean="0"/>
+              <a:t>Diagrams</a:t>
+            </a:r>
+            <a:endParaRPr lang="en-GB" dirty="0"/>
+          </a:p>
+          <a:p>
+            <a:r>
+              <a:rPr lang="en-GB" dirty="0"/>
+              <a:t>Deployment </a:t>
+            </a:r>
+            <a:r>
+              <a:rPr lang="en-GB" dirty="0" smtClean="0"/>
+              <a:t>Diagrams</a:t>
+            </a:r>
+            <a:endParaRPr lang="en-GB" dirty="0"/>
+          </a:p>
+          <a:p>
+            <a:r>
+              <a:rPr lang="en-GB" dirty="0"/>
+              <a:t>Use </a:t>
+            </a:r>
+            <a:r>
+              <a:rPr lang="en-GB" dirty="0" smtClean="0"/>
+              <a:t>Case Diagrams</a:t>
+            </a:r>
+            <a:endParaRPr lang="en-GB" dirty="0"/>
+          </a:p>
+          <a:p>
+            <a:r>
+              <a:rPr lang="en-GB" dirty="0"/>
+              <a:t>Activity </a:t>
+            </a:r>
+            <a:r>
+              <a:rPr lang="en-GB" dirty="0" smtClean="0"/>
+              <a:t>Diagrams</a:t>
+            </a:r>
+            <a:endParaRPr lang="en-GB" dirty="0"/>
+          </a:p>
+          <a:p>
+            <a:r>
+              <a:rPr lang="en-GB" dirty="0"/>
+              <a:t>Class </a:t>
+            </a:r>
+            <a:r>
+              <a:rPr lang="en-GB" dirty="0" smtClean="0"/>
+              <a:t>Diagrams</a:t>
+            </a:r>
+            <a:endParaRPr lang="en-GB" dirty="0"/>
+          </a:p>
+          <a:p>
+            <a:r>
+              <a:rPr lang="en-GB" dirty="0"/>
+              <a:t>Sequence </a:t>
+            </a:r>
+            <a:r>
+              <a:rPr lang="en-GB" dirty="0" smtClean="0"/>
+              <a:t>Diagrams</a:t>
+            </a:r>
+            <a:endParaRPr lang="en-GB" dirty="0"/>
+          </a:p>
+          <a:p>
+            <a:r>
+              <a:rPr lang="en-GB" dirty="0"/>
+              <a:t>Interaction </a:t>
+            </a:r>
+            <a:r>
+              <a:rPr lang="en-GB" dirty="0" smtClean="0"/>
+              <a:t>Overview Diagrams</a:t>
+            </a:r>
+            <a:endParaRPr lang="en-GB" dirty="0"/>
+          </a:p>
+          <a:p>
+            <a:r>
+              <a:rPr lang="en-GB" dirty="0"/>
+              <a:t>Composite </a:t>
+            </a:r>
+            <a:r>
+              <a:rPr lang="en-GB" dirty="0" smtClean="0"/>
+              <a:t>Structure Diagrams</a:t>
+            </a:r>
+            <a:endParaRPr lang="en-GB" dirty="0"/>
+          </a:p>
+          <a:p>
+            <a:r>
+              <a:rPr lang="en-GB" dirty="0"/>
+              <a:t>State </a:t>
+            </a:r>
+            <a:r>
+              <a:rPr lang="en-GB" dirty="0" smtClean="0"/>
+              <a:t>Machine Diagrams</a:t>
+            </a:r>
+            <a:endParaRPr lang="en-GB" dirty="0"/>
+          </a:p>
+          <a:p>
+            <a:r>
+              <a:rPr lang="en-GB" b="1" dirty="0">
+                <a:solidFill>
+                  <a:srgbClr val="FF0000"/>
+                </a:solidFill>
+              </a:rPr>
+              <a:t>Timing </a:t>
+            </a:r>
+            <a:r>
+              <a:rPr lang="en-GB" b="1" dirty="0" smtClean="0">
+                <a:solidFill>
+                  <a:srgbClr val="FF0000"/>
+                </a:solidFill>
+              </a:rPr>
+              <a:t>Diagrams</a:t>
+            </a:r>
+            <a:endParaRPr lang="en-GB" b="1" dirty="0">
+              <a:solidFill>
+                <a:srgbClr val="FF0000"/>
+              </a:solidFill>
+            </a:endParaRPr>
+          </a:p>
+          <a:p>
+            <a:r>
+              <a:rPr lang="en-GB" dirty="0"/>
+              <a:t>Object </a:t>
+            </a:r>
+            <a:r>
+              <a:rPr lang="en-GB" dirty="0" smtClean="0"/>
+              <a:t>Diagrams</a:t>
+            </a:r>
+            <a:endParaRPr lang="en-GB" dirty="0"/>
+          </a:p>
+          <a:p>
+            <a:r>
+              <a:rPr lang="en-GB" dirty="0"/>
+              <a:t>Communication </a:t>
+            </a:r>
+            <a:r>
+              <a:rPr lang="en-GB" dirty="0" smtClean="0"/>
+              <a:t>Diagrams</a:t>
+            </a:r>
+            <a:endParaRPr lang="en-GB" dirty="0"/>
+          </a:p>
+        </p:txBody>
+      </p:sp>
+    </p:spTree>
+    <p:extLst>
+      <p:ext uri="{BB962C8B-B14F-4D97-AF65-F5344CB8AC3E}">
+        <p14:creationId xmlns:p14="http://schemas.microsoft.com/office/powerpoint/2010/main" xmlns="" val="1121814747"/>
+      </p:ext>
+    </p:extLst>
+  </p:cSld>
+  <p:clrMapOvr>
+    <a:masterClrMapping/>
+  </p:clrMapOvr>
+  <p:timing>
+    <p:tnLst>
+      <p:par>
+        <p:cTn id="1" dur="indefinite" restart="never" nodeType="tmRoot"/>
+      </p:par>
+    </p:tnLst>
+  </p:timing>
+</p:sld>
+</file>
+
+<file path=ppt/slides/slide15.xml><?xml version="1.0" encoding="utf-8"?>
+<p:sld xmlns:a="http://schemas.openxmlformats.org/drawingml/2006/main" xmlns:r="http://schemas.openxmlformats.org/officeDocument/2006/relationships" xmlns:p="http://schemas.openxmlformats.org/presentationml/2006/main">
+  <p:cSld>
+    <p:spTree>
+      <p:nvGrpSpPr>
+        <p:cNvPr id="1" name=""/>
+        <p:cNvGrpSpPr/>
+        <p:nvPr/>
+      </p:nvGrpSpPr>
+      <p:grpSpPr>
+        <a:xfrm>
+          <a:off x="0" y="0"/>
+          <a:ext cx="0" cy="0"/>
+          <a:chOff x="0" y="0"/>
+          <a:chExt cx="0" cy="0"/>
+        </a:xfrm>
+      </p:grpSpPr>
+      <p:sp>
+        <p:nvSpPr>
+          <p:cNvPr id="2" name="Title 1"/>
+          <p:cNvSpPr>
+            <a:spLocks noGrp="1"/>
+          </p:cNvSpPr>
+          <p:nvPr>
+            <p:ph type="title"/>
+          </p:nvPr>
+        </p:nvSpPr>
+        <p:spPr/>
+        <p:txBody>
+          <a:bodyPr/>
+          <a:lstStyle/>
+          <a:p>
+            <a:r>
+              <a:rPr lang="en-GB" dirty="0" smtClean="0"/>
+              <a:t>Timing Diagrams</a:t>
+            </a:r>
+            <a:endParaRPr lang="en-GB" dirty="0"/>
+          </a:p>
+        </p:txBody>
+      </p:sp>
+      <p:sp>
+        <p:nvSpPr>
+          <p:cNvPr id="3" name="Content Placeholder 2"/>
+          <p:cNvSpPr>
+            <a:spLocks noGrp="1"/>
+          </p:cNvSpPr>
+          <p:nvPr>
+            <p:ph idx="1"/>
+          </p:nvPr>
+        </p:nvSpPr>
+        <p:spPr/>
+        <p:txBody>
+          <a:bodyPr/>
+          <a:lstStyle/>
+          <a:p>
+            <a:r>
+              <a:rPr lang="en-GB" dirty="0"/>
+              <a:t>Timing diagrams are a type of interaction </a:t>
+            </a:r>
+            <a:r>
+              <a:rPr lang="en-GB" dirty="0" smtClean="0"/>
+              <a:t>diagram</a:t>
+            </a:r>
+          </a:p>
+          <a:p>
+            <a:r>
+              <a:rPr lang="en-GB" dirty="0" smtClean="0"/>
+              <a:t>Their </a:t>
+            </a:r>
+            <a:r>
+              <a:rPr lang="en-GB" dirty="0"/>
+              <a:t>purpose is to show </a:t>
+            </a:r>
+            <a:r>
+              <a:rPr lang="en-GB" dirty="0" smtClean="0"/>
+              <a:t>how the </a:t>
+            </a:r>
+            <a:r>
+              <a:rPr lang="en-GB" dirty="0"/>
+              <a:t>states of an element or elements change over time and how events </a:t>
+            </a:r>
+            <a:r>
+              <a:rPr lang="en-GB" dirty="0" smtClean="0"/>
+              <a:t>change those states</a:t>
+            </a:r>
+            <a:r>
+              <a:rPr lang="en-GB" dirty="0"/>
+              <a:t/>
+            </a:r>
+            <a:br>
+              <a:rPr lang="en-GB" dirty="0"/>
+            </a:br>
+            <a:r>
+              <a:rPr lang="en-GB" dirty="0"/>
+              <a:t/>
+            </a:r>
+            <a:br>
+              <a:rPr lang="en-GB" dirty="0"/>
+            </a:br>
+            <a:endParaRPr lang="en-GB" dirty="0"/>
+          </a:p>
+        </p:txBody>
+      </p:sp>
+    </p:spTree>
+    <p:extLst>
+      <p:ext uri="{BB962C8B-B14F-4D97-AF65-F5344CB8AC3E}">
+        <p14:creationId xmlns:p14="http://schemas.microsoft.com/office/powerpoint/2010/main" xmlns="" val="1447592189"/>
+      </p:ext>
+    </p:extLst>
+  </p:cSld>
+  <p:clrMapOvr>
+    <a:masterClrMapping/>
+  </p:clrMapOvr>
+  <p:timing>
+    <p:tnLst>
+      <p:par>
+        <p:cTn id="1" dur="indefinite" restart="never" nodeType="tmRoot"/>
+      </p:par>
+    </p:tnLst>
+  </p:timing>
+</p:sld>
+</file>
+
+<file path=ppt/slides/slide16.xml><?xml version="1.0" encoding="utf-8"?>
+<p:sld xmlns:a="http://schemas.openxmlformats.org/drawingml/2006/main" xmlns:r="http://schemas.openxmlformats.org/officeDocument/2006/relationships" xmlns:p="http://schemas.openxmlformats.org/presentationml/2006/main">
+  <p:cSld>
+    <p:spTree>
+      <p:nvGrpSpPr>
+        <p:cNvPr id="1" name=""/>
+        <p:cNvGrpSpPr/>
+        <p:nvPr/>
+      </p:nvGrpSpPr>
+      <p:grpSpPr>
+        <a:xfrm>
+          <a:off x="0" y="0"/>
+          <a:ext cx="0" cy="0"/>
+          <a:chOff x="0" y="0"/>
+          <a:chExt cx="0" cy="0"/>
+        </a:xfrm>
+      </p:grpSpPr>
+      <p:sp>
+        <p:nvSpPr>
+          <p:cNvPr id="2" name="Title 1"/>
+          <p:cNvSpPr>
+            <a:spLocks noGrp="1"/>
+          </p:cNvSpPr>
+          <p:nvPr>
+            <p:ph type="title"/>
+          </p:nvPr>
+        </p:nvSpPr>
+        <p:spPr/>
+        <p:txBody>
+          <a:bodyPr/>
+          <a:lstStyle/>
+          <a:p>
+            <a:r>
+              <a:rPr lang="en-GB" dirty="0" smtClean="0"/>
+              <a:t>Example</a:t>
+            </a:r>
+            <a:endParaRPr lang="en-GB" dirty="0"/>
+          </a:p>
+        </p:txBody>
+      </p:sp>
+      <p:sp>
+        <p:nvSpPr>
+          <p:cNvPr id="3" name="Content Placeholder 2"/>
+          <p:cNvSpPr>
+            <a:spLocks noGrp="1"/>
+          </p:cNvSpPr>
+          <p:nvPr>
+            <p:ph idx="1"/>
+          </p:nvPr>
+        </p:nvSpPr>
+        <p:spPr/>
+        <p:txBody>
+          <a:bodyPr/>
+          <a:lstStyle/>
+          <a:p>
+            <a:endParaRPr lang="en-GB"/>
+          </a:p>
+        </p:txBody>
+      </p:sp>
+      <p:pic>
+        <p:nvPicPr>
+          <p:cNvPr id="4" name="Picture 3"/>
+          <p:cNvPicPr>
+            <a:picLocks noChangeAspect="1"/>
+          </p:cNvPicPr>
+          <p:nvPr/>
+        </p:nvPicPr>
+        <p:blipFill>
+          <a:blip r:embed="rId2"/>
+          <a:stretch>
+            <a:fillRect/>
+          </a:stretch>
+        </p:blipFill>
+        <p:spPr>
+          <a:xfrm>
+            <a:off x="2362200" y="1981200"/>
+            <a:ext cx="3924300" cy="4267200"/>
+          </a:xfrm>
+          <a:prstGeom prst="rect">
+            <a:avLst/>
+          </a:prstGeom>
+        </p:spPr>
+      </p:pic>
+    </p:spTree>
+    <p:extLst>
+      <p:ext uri="{BB962C8B-B14F-4D97-AF65-F5344CB8AC3E}">
+        <p14:creationId xmlns:p14="http://schemas.microsoft.com/office/powerpoint/2010/main" xmlns="" val="3843290255"/>
+      </p:ext>
+    </p:extLst>
+  </p:cSld>
+  <p:clrMapOvr>
+    <a:masterClrMapping/>
+  </p:clrMapOvr>
+  <p:timing>
+    <p:tnLst>
+      <p:par>
+        <p:cTn id="1" dur="indefinite" restart="never" nodeType="tmRoot"/>
+      </p:par>
+    </p:tnLst>
+  </p:timing>
+</p:sld>
+</file>
+
+<file path=ppt/slides/slide17.xml><?xml version="1.0" encoding="utf-8"?>
+<p:sld xmlns:a="http://schemas.openxmlformats.org/drawingml/2006/main" xmlns:r="http://schemas.openxmlformats.org/officeDocument/2006/relationships" xmlns:p="http://schemas.openxmlformats.org/presentationml/2006/main">
+  <p:cSld>
+    <p:spTree>
+      <p:nvGrpSpPr>
+        <p:cNvPr id="1" name=""/>
+        <p:cNvGrpSpPr/>
+        <p:nvPr/>
+      </p:nvGrpSpPr>
+      <p:grpSpPr>
+        <a:xfrm>
+          <a:off x="0" y="0"/>
+          <a:ext cx="0" cy="0"/>
+          <a:chOff x="0" y="0"/>
+          <a:chExt cx="0" cy="0"/>
+        </a:xfrm>
+      </p:grpSpPr>
+      <p:sp>
+        <p:nvSpPr>
+          <p:cNvPr id="2" name="Title 1"/>
+          <p:cNvSpPr>
+            <a:spLocks noGrp="1"/>
+          </p:cNvSpPr>
+          <p:nvPr>
+            <p:ph type="title"/>
+          </p:nvPr>
+        </p:nvSpPr>
+        <p:spPr/>
+        <p:txBody>
+          <a:bodyPr/>
+          <a:lstStyle/>
+          <a:p>
+            <a:r>
+              <a:rPr lang="en-GB" dirty="0"/>
+              <a:t>Object Diagrams</a:t>
+            </a:r>
+          </a:p>
+        </p:txBody>
+      </p:sp>
+      <p:sp>
+        <p:nvSpPr>
+          <p:cNvPr id="3" name="Content Placeholder 2"/>
+          <p:cNvSpPr>
+            <a:spLocks noGrp="1"/>
+          </p:cNvSpPr>
+          <p:nvPr>
+            <p:ph idx="1"/>
+          </p:nvPr>
+        </p:nvSpPr>
+        <p:spPr>
+          <a:xfrm>
+            <a:off x="685800" y="1981200"/>
+            <a:ext cx="7772400" cy="4419600"/>
+          </a:xfrm>
+        </p:spPr>
+        <p:txBody>
+          <a:bodyPr>
+            <a:normAutofit fontScale="70000" lnSpcReduction="20000"/>
+          </a:bodyPr>
+          <a:lstStyle/>
+          <a:p>
+            <a:r>
+              <a:rPr lang="en-GB" dirty="0"/>
+              <a:t>Package </a:t>
+            </a:r>
+            <a:r>
+              <a:rPr lang="en-GB" dirty="0" smtClean="0"/>
+              <a:t>Diagrams</a:t>
+            </a:r>
+            <a:endParaRPr lang="en-GB" dirty="0"/>
+          </a:p>
+          <a:p>
+            <a:r>
+              <a:rPr lang="en-GB" dirty="0"/>
+              <a:t>Component </a:t>
+            </a:r>
+            <a:r>
+              <a:rPr lang="en-GB" dirty="0" smtClean="0"/>
+              <a:t>Diagrams</a:t>
+            </a:r>
+            <a:endParaRPr lang="en-GB" dirty="0"/>
+          </a:p>
+          <a:p>
+            <a:r>
+              <a:rPr lang="en-GB" dirty="0"/>
+              <a:t>Deployment </a:t>
+            </a:r>
+            <a:r>
+              <a:rPr lang="en-GB" dirty="0" smtClean="0"/>
+              <a:t>Diagrams</a:t>
+            </a:r>
+            <a:endParaRPr lang="en-GB" dirty="0"/>
+          </a:p>
+          <a:p>
+            <a:r>
+              <a:rPr lang="en-GB" dirty="0"/>
+              <a:t>Use </a:t>
+            </a:r>
+            <a:r>
+              <a:rPr lang="en-GB" dirty="0" smtClean="0"/>
+              <a:t>Case Diagrams</a:t>
+            </a:r>
+            <a:endParaRPr lang="en-GB" dirty="0"/>
+          </a:p>
+          <a:p>
+            <a:r>
+              <a:rPr lang="en-GB" dirty="0"/>
+              <a:t>Activity </a:t>
+            </a:r>
+            <a:r>
+              <a:rPr lang="en-GB" dirty="0" smtClean="0"/>
+              <a:t>Diagrams</a:t>
+            </a:r>
+            <a:endParaRPr lang="en-GB" dirty="0"/>
+          </a:p>
+          <a:p>
+            <a:r>
+              <a:rPr lang="en-GB" dirty="0"/>
+              <a:t>Class </a:t>
+            </a:r>
+            <a:r>
+              <a:rPr lang="en-GB" dirty="0" smtClean="0"/>
+              <a:t>Diagrams</a:t>
+            </a:r>
+            <a:endParaRPr lang="en-GB" dirty="0"/>
+          </a:p>
+          <a:p>
+            <a:r>
+              <a:rPr lang="en-GB" dirty="0"/>
+              <a:t>Sequence </a:t>
+            </a:r>
+            <a:r>
+              <a:rPr lang="en-GB" dirty="0" smtClean="0"/>
+              <a:t>Diagrams</a:t>
+            </a:r>
+            <a:endParaRPr lang="en-GB" dirty="0"/>
+          </a:p>
+          <a:p>
+            <a:r>
+              <a:rPr lang="en-GB" dirty="0"/>
+              <a:t>Interaction </a:t>
+            </a:r>
+            <a:r>
+              <a:rPr lang="en-GB" dirty="0" smtClean="0"/>
+              <a:t>Overview Diagrams</a:t>
+            </a:r>
+            <a:endParaRPr lang="en-GB" dirty="0"/>
+          </a:p>
+          <a:p>
+            <a:r>
+              <a:rPr lang="en-GB" dirty="0"/>
+              <a:t>Composite </a:t>
+            </a:r>
+            <a:r>
+              <a:rPr lang="en-GB" dirty="0" smtClean="0"/>
+              <a:t>Structure Diagrams</a:t>
+            </a:r>
+            <a:endParaRPr lang="en-GB" dirty="0"/>
+          </a:p>
+          <a:p>
+            <a:r>
+              <a:rPr lang="en-GB" dirty="0"/>
+              <a:t>State </a:t>
+            </a:r>
+            <a:r>
+              <a:rPr lang="en-GB" dirty="0" smtClean="0"/>
+              <a:t>Machine Diagrams</a:t>
+            </a:r>
+            <a:endParaRPr lang="en-GB" dirty="0"/>
+          </a:p>
+          <a:p>
+            <a:r>
+              <a:rPr lang="en-GB" dirty="0"/>
+              <a:t>Timing </a:t>
+            </a:r>
+            <a:r>
+              <a:rPr lang="en-GB" dirty="0" smtClean="0"/>
+              <a:t>Diagrams</a:t>
+            </a:r>
+            <a:endParaRPr lang="en-GB" dirty="0"/>
+          </a:p>
+          <a:p>
+            <a:r>
+              <a:rPr lang="en-GB" b="1" dirty="0">
+                <a:solidFill>
+                  <a:srgbClr val="FF0000"/>
+                </a:solidFill>
+              </a:rPr>
+              <a:t>Object </a:t>
+            </a:r>
+            <a:r>
+              <a:rPr lang="en-GB" b="1" dirty="0" smtClean="0">
+                <a:solidFill>
+                  <a:srgbClr val="FF0000"/>
+                </a:solidFill>
+              </a:rPr>
+              <a:t>Diagrams</a:t>
+            </a:r>
+            <a:endParaRPr lang="en-GB" b="1" dirty="0">
+              <a:solidFill>
+                <a:srgbClr val="FF0000"/>
+              </a:solidFill>
+            </a:endParaRPr>
+          </a:p>
+          <a:p>
+            <a:r>
+              <a:rPr lang="en-GB" dirty="0"/>
+              <a:t>Communication </a:t>
+            </a:r>
+            <a:r>
+              <a:rPr lang="en-GB" dirty="0" smtClean="0"/>
+              <a:t>Diagrams</a:t>
+            </a:r>
+            <a:endParaRPr lang="en-GB" dirty="0"/>
+          </a:p>
+        </p:txBody>
+      </p:sp>
+    </p:spTree>
+    <p:extLst>
+      <p:ext uri="{BB962C8B-B14F-4D97-AF65-F5344CB8AC3E}">
+        <p14:creationId xmlns:p14="http://schemas.microsoft.com/office/powerpoint/2010/main" xmlns="" val="2036547419"/>
+      </p:ext>
+    </p:extLst>
+  </p:cSld>
+  <p:clrMapOvr>
+    <a:masterClrMapping/>
+  </p:clrMapOvr>
+  <p:timing>
+    <p:tnLst>
+      <p:par>
+        <p:cTn id="1" dur="indefinite" restart="never" nodeType="tmRoot"/>
+      </p:par>
+    </p:tnLst>
+  </p:timing>
+</p:sld>
+</file>
+
+<file path=ppt/slides/slide18.xml><?xml version="1.0" encoding="utf-8"?>
+<p:sld xmlns:a="http://schemas.openxmlformats.org/drawingml/2006/main" xmlns:r="http://schemas.openxmlformats.org/officeDocument/2006/relationships" xmlns:p="http://schemas.openxmlformats.org/presentationml/2006/main">
+  <p:cSld>
+    <p:spTree>
+      <p:nvGrpSpPr>
+        <p:cNvPr id="1" name=""/>
+        <p:cNvGrpSpPr/>
+        <p:nvPr/>
+      </p:nvGrpSpPr>
+      <p:grpSpPr>
+        <a:xfrm>
+          <a:off x="0" y="0"/>
+          <a:ext cx="0" cy="0"/>
+          <a:chOff x="0" y="0"/>
+          <a:chExt cx="0" cy="0"/>
+        </a:xfrm>
+      </p:grpSpPr>
+      <p:sp>
+        <p:nvSpPr>
+          <p:cNvPr id="2" name="Title 1"/>
+          <p:cNvSpPr>
+            <a:spLocks noGrp="1"/>
+          </p:cNvSpPr>
+          <p:nvPr>
+            <p:ph type="title"/>
+          </p:nvPr>
+        </p:nvSpPr>
+        <p:spPr/>
+        <p:txBody>
+          <a:bodyPr/>
+          <a:lstStyle/>
+          <a:p>
+            <a:r>
+              <a:rPr lang="en-GB" dirty="0" smtClean="0"/>
+              <a:t>Object Diagram</a:t>
+            </a:r>
+            <a:endParaRPr lang="en-GB" dirty="0"/>
+          </a:p>
+        </p:txBody>
+      </p:sp>
+      <p:sp>
+        <p:nvSpPr>
+          <p:cNvPr id="3" name="Content Placeholder 2"/>
+          <p:cNvSpPr>
+            <a:spLocks noGrp="1"/>
+          </p:cNvSpPr>
+          <p:nvPr>
+            <p:ph idx="1"/>
+          </p:nvPr>
+        </p:nvSpPr>
+        <p:spPr/>
+        <p:txBody>
+          <a:bodyPr/>
+          <a:lstStyle/>
+          <a:p>
+            <a:r>
+              <a:rPr lang="en-GB" dirty="0"/>
+              <a:t>An object diagram is used to show the existence of objects and their </a:t>
+            </a:r>
+            <a:r>
+              <a:rPr lang="en-GB" dirty="0" smtClean="0"/>
+              <a:t>relationships in </a:t>
+            </a:r>
+            <a:r>
+              <a:rPr lang="en-GB" dirty="0"/>
+              <a:t>the logical design of a </a:t>
+            </a:r>
+            <a:r>
+              <a:rPr lang="en-GB" dirty="0" smtClean="0"/>
+              <a:t>system </a:t>
+            </a:r>
+          </a:p>
+          <a:p>
+            <a:r>
+              <a:rPr lang="en-GB" dirty="0" smtClean="0"/>
+              <a:t>Stated </a:t>
+            </a:r>
+            <a:r>
+              <a:rPr lang="en-GB" dirty="0"/>
+              <a:t>another way, an object diagram represents a snapshot in time of an otherwise transitory stream of events over a </a:t>
+            </a:r>
+            <a:r>
+              <a:rPr lang="en-GB" dirty="0" smtClean="0"/>
+              <a:t>certain configuration </a:t>
+            </a:r>
+            <a:r>
+              <a:rPr lang="en-GB" dirty="0"/>
+              <a:t>of objects. </a:t>
+            </a:r>
+            <a:br>
+              <a:rPr lang="en-GB" dirty="0"/>
+            </a:br>
+            <a:r>
+              <a:rPr lang="en-GB" dirty="0"/>
+              <a:t/>
+            </a:r>
+            <a:br>
+              <a:rPr lang="en-GB" dirty="0"/>
+            </a:br>
+            <a:endParaRPr lang="en-GB" dirty="0"/>
+          </a:p>
+        </p:txBody>
+      </p:sp>
+    </p:spTree>
+    <p:extLst>
+      <p:ext uri="{BB962C8B-B14F-4D97-AF65-F5344CB8AC3E}">
+        <p14:creationId xmlns:p14="http://schemas.microsoft.com/office/powerpoint/2010/main" xmlns="" val="4066592543"/>
+      </p:ext>
+    </p:extLst>
+  </p:cSld>
+  <p:clrMapOvr>
+    <a:masterClrMapping/>
+  </p:clrMapOvr>
+  <p:timing>
+    <p:tnLst>
+      <p:par>
+        <p:cTn id="1" dur="indefinite" restart="never" nodeType="tmRoot"/>
+      </p:par>
+    </p:tnLst>
+  </p:timing>
+</p:sld>
+</file>
+
+<file path=ppt/slides/slide19.xml><?xml version="1.0" encoding="utf-8"?>
+<p:sld xmlns:a="http://schemas.openxmlformats.org/drawingml/2006/main" xmlns:r="http://schemas.openxmlformats.org/officeDocument/2006/relationships" xmlns:p="http://schemas.openxmlformats.org/presentationml/2006/main">
+  <p:cSld>
+    <p:spTree>
+      <p:nvGrpSpPr>
+        <p:cNvPr id="1" name=""/>
+        <p:cNvGrpSpPr/>
+        <p:nvPr/>
+      </p:nvGrpSpPr>
+      <p:grpSpPr>
+        <a:xfrm>
+          <a:off x="0" y="0"/>
+          <a:ext cx="0" cy="0"/>
+          <a:chOff x="0" y="0"/>
+          <a:chExt cx="0" cy="0"/>
+        </a:xfrm>
+      </p:grpSpPr>
+      <p:sp>
+        <p:nvSpPr>
+          <p:cNvPr id="2" name="Title 1"/>
+          <p:cNvSpPr>
+            <a:spLocks noGrp="1"/>
+          </p:cNvSpPr>
+          <p:nvPr>
+            <p:ph type="title"/>
+          </p:nvPr>
+        </p:nvSpPr>
+        <p:spPr>
+          <a:xfrm>
+            <a:off x="685800" y="387879"/>
+            <a:ext cx="7772400" cy="1143000"/>
+          </a:xfrm>
+        </p:spPr>
+        <p:txBody>
+          <a:bodyPr/>
+          <a:lstStyle/>
+          <a:p>
+            <a:r>
+              <a:rPr lang="en-GB" dirty="0" smtClean="0"/>
+              <a:t>Example</a:t>
+            </a:r>
+            <a:endParaRPr lang="en-GB" dirty="0"/>
+          </a:p>
+        </p:txBody>
+      </p:sp>
+      <p:sp>
+        <p:nvSpPr>
+          <p:cNvPr id="3" name="Content Placeholder 2"/>
+          <p:cNvSpPr>
+            <a:spLocks noGrp="1"/>
+          </p:cNvSpPr>
+          <p:nvPr>
+            <p:ph idx="1"/>
+          </p:nvPr>
+        </p:nvSpPr>
+        <p:spPr/>
+        <p:txBody>
+          <a:bodyPr/>
+          <a:lstStyle/>
+          <a:p>
+            <a:endParaRPr lang="en-GB"/>
+          </a:p>
+        </p:txBody>
+      </p:sp>
+      <p:pic>
+        <p:nvPicPr>
+          <p:cNvPr id="4" name="Picture 3"/>
+          <p:cNvPicPr>
+            <a:picLocks noChangeAspect="1"/>
+          </p:cNvPicPr>
+          <p:nvPr/>
+        </p:nvPicPr>
+        <p:blipFill>
+          <a:blip r:embed="rId2"/>
+          <a:stretch>
+            <a:fillRect/>
+          </a:stretch>
+        </p:blipFill>
+        <p:spPr>
+          <a:xfrm>
+            <a:off x="1790700" y="1547812"/>
+            <a:ext cx="5562600" cy="4981575"/>
+          </a:xfrm>
+          <a:prstGeom prst="rect">
+            <a:avLst/>
+          </a:prstGeom>
+        </p:spPr>
+      </p:pic>
+    </p:spTree>
+    <p:extLst>
+      <p:ext uri="{BB962C8B-B14F-4D97-AF65-F5344CB8AC3E}">
+        <p14:creationId xmlns:p14="http://schemas.microsoft.com/office/powerpoint/2010/main" xmlns="" val="2033297992"/>
+      </p:ext>
+    </p:extLst>
+  </p:cSld>
+  <p:clrMapOvr>
+    <a:masterClrMapping/>
+  </p:clrMapOvr>
+  <p:timing>
+    <p:tnLst>
+      <p:par>
+        <p:cTn id="1" dur="indefinite" restart="never" nodeType="tmRoot"/>
+      </p:par>
+    </p:tnLst>
+  </p:timing>
+</p:sld>
+</file>
+
 <file path=ppt/slides/slide2.xml><?xml version="1.0" encoding="utf-8"?>
 <p:sld xmlns:a="http://schemas.openxmlformats.org/drawingml/2006/main" xmlns:r="http://schemas.openxmlformats.org/officeDocument/2006/relationships" xmlns:p="http://schemas.openxmlformats.org/presentationml/2006/main">
   <p:cSld>
@@ -3938,15 +5457,7 @@
             <a:pPr eaLnBrk="1" hangingPunct="1"/>
             <a:r>
               <a:rPr lang="en-US" altLang="en-US" dirty="0" smtClean="0"/>
-              <a:t>What </a:t>
-            </a:r>
-            <a:r>
-              <a:rPr lang="en-US" altLang="en-US" dirty="0" smtClean="0"/>
-              <a:t>do we mean by </a:t>
-            </a:r>
-            <a:r>
-              <a:rPr lang="en-US" altLang="en-US" dirty="0" smtClean="0"/>
-              <a:t>Notation and UML?</a:t>
+              <a:t>What do we mean by Notation and UML?</a:t>
             </a:r>
           </a:p>
           <a:p>
@@ -3955,22 +5466,14 @@
               <a:rPr lang="en-US" altLang="en-US" dirty="0" smtClean="0"/>
               <a:t>Types of UML View</a:t>
             </a:r>
-            <a:endParaRPr lang="en-US" altLang="en-US" dirty="0" smtClean="0"/>
           </a:p>
           <a:p>
             <a:pPr eaLnBrk="1" hangingPunct="1"/>
             <a:r>
-              <a:rPr lang="en-GB" b="1" dirty="0" err="1"/>
-              <a:t>Behavior</a:t>
-            </a:r>
-            <a:r>
-              <a:rPr lang="en-GB" b="1" dirty="0"/>
-              <a:t> </a:t>
-            </a:r>
-            <a:r>
               <a:rPr lang="en-GB" b="1" dirty="0" smtClean="0"/>
-              <a:t>diagrams</a:t>
-            </a:r>
+              <a:t>Continue UML Diagram Types</a:t>
+            </a:r>
+            <a:endParaRPr lang="en-GB" b="1" dirty="0" smtClean="0"/>
           </a:p>
           <a:p>
             <a:pPr eaLnBrk="1" hangingPunct="1"/>
@@ -3990,6 +5493,795 @@
           <a:p>
             <a:pPr eaLnBrk="1" hangingPunct="1"/>
             <a:endParaRPr lang="en-US" altLang="en-US" dirty="0" smtClean="0"/>
+          </a:p>
+        </p:txBody>
+      </p:sp>
+    </p:spTree>
+  </p:cSld>
+  <p:clrMapOvr>
+    <a:masterClrMapping/>
+  </p:clrMapOvr>
+  <p:timing>
+    <p:tnLst>
+      <p:par>
+        <p:cTn id="1" dur="indefinite" restart="never" nodeType="tmRoot"/>
+      </p:par>
+    </p:tnLst>
+  </p:timing>
+</p:sld>
+</file>
+
+<file path=ppt/slides/slide20.xml><?xml version="1.0" encoding="utf-8"?>
+<p:sld xmlns:a="http://schemas.openxmlformats.org/drawingml/2006/main" xmlns:r="http://schemas.openxmlformats.org/officeDocument/2006/relationships" xmlns:p="http://schemas.openxmlformats.org/presentationml/2006/main">
+  <p:cSld>
+    <p:spTree>
+      <p:nvGrpSpPr>
+        <p:cNvPr id="1" name=""/>
+        <p:cNvGrpSpPr/>
+        <p:nvPr/>
+      </p:nvGrpSpPr>
+      <p:grpSpPr>
+        <a:xfrm>
+          <a:off x="0" y="0"/>
+          <a:ext cx="0" cy="0"/>
+          <a:chOff x="0" y="0"/>
+          <a:chExt cx="0" cy="0"/>
+        </a:xfrm>
+      </p:grpSpPr>
+      <p:sp>
+        <p:nvSpPr>
+          <p:cNvPr id="2" name="Title 1"/>
+          <p:cNvSpPr>
+            <a:spLocks noGrp="1"/>
+          </p:cNvSpPr>
+          <p:nvPr>
+            <p:ph type="title"/>
+          </p:nvPr>
+        </p:nvSpPr>
+        <p:spPr/>
+        <p:txBody>
+          <a:bodyPr/>
+          <a:lstStyle/>
+          <a:p>
+            <a:r>
+              <a:rPr lang="en-GB" dirty="0"/>
+              <a:t>Communication Diagrams</a:t>
+            </a:r>
+          </a:p>
+        </p:txBody>
+      </p:sp>
+      <p:sp>
+        <p:nvSpPr>
+          <p:cNvPr id="3" name="Content Placeholder 2"/>
+          <p:cNvSpPr>
+            <a:spLocks noGrp="1"/>
+          </p:cNvSpPr>
+          <p:nvPr>
+            <p:ph idx="1"/>
+          </p:nvPr>
+        </p:nvSpPr>
+        <p:spPr>
+          <a:xfrm>
+            <a:off x="685800" y="1981200"/>
+            <a:ext cx="7772400" cy="4419600"/>
+          </a:xfrm>
+        </p:spPr>
+        <p:txBody>
+          <a:bodyPr>
+            <a:normAutofit fontScale="70000" lnSpcReduction="20000"/>
+          </a:bodyPr>
+          <a:lstStyle/>
+          <a:p>
+            <a:r>
+              <a:rPr lang="en-GB" dirty="0"/>
+              <a:t>Package </a:t>
+            </a:r>
+            <a:r>
+              <a:rPr lang="en-GB" dirty="0" smtClean="0"/>
+              <a:t>Diagrams</a:t>
+            </a:r>
+            <a:endParaRPr lang="en-GB" dirty="0"/>
+          </a:p>
+          <a:p>
+            <a:r>
+              <a:rPr lang="en-GB" dirty="0"/>
+              <a:t>Component </a:t>
+            </a:r>
+            <a:r>
+              <a:rPr lang="en-GB" dirty="0" smtClean="0"/>
+              <a:t>Diagrams</a:t>
+            </a:r>
+            <a:endParaRPr lang="en-GB" dirty="0"/>
+          </a:p>
+          <a:p>
+            <a:r>
+              <a:rPr lang="en-GB" dirty="0"/>
+              <a:t>Deployment </a:t>
+            </a:r>
+            <a:r>
+              <a:rPr lang="en-GB" dirty="0" smtClean="0"/>
+              <a:t>Diagrams</a:t>
+            </a:r>
+            <a:endParaRPr lang="en-GB" dirty="0"/>
+          </a:p>
+          <a:p>
+            <a:r>
+              <a:rPr lang="en-GB" dirty="0"/>
+              <a:t>Use </a:t>
+            </a:r>
+            <a:r>
+              <a:rPr lang="en-GB" dirty="0" smtClean="0"/>
+              <a:t>Case Diagrams</a:t>
+            </a:r>
+            <a:endParaRPr lang="en-GB" dirty="0"/>
+          </a:p>
+          <a:p>
+            <a:r>
+              <a:rPr lang="en-GB" dirty="0"/>
+              <a:t>Activity </a:t>
+            </a:r>
+            <a:r>
+              <a:rPr lang="en-GB" dirty="0" smtClean="0"/>
+              <a:t>Diagrams</a:t>
+            </a:r>
+            <a:endParaRPr lang="en-GB" dirty="0"/>
+          </a:p>
+          <a:p>
+            <a:r>
+              <a:rPr lang="en-GB" dirty="0"/>
+              <a:t>Class </a:t>
+            </a:r>
+            <a:r>
+              <a:rPr lang="en-GB" dirty="0" smtClean="0"/>
+              <a:t>Diagrams</a:t>
+            </a:r>
+            <a:endParaRPr lang="en-GB" dirty="0"/>
+          </a:p>
+          <a:p>
+            <a:r>
+              <a:rPr lang="en-GB" dirty="0"/>
+              <a:t>Sequence </a:t>
+            </a:r>
+            <a:r>
+              <a:rPr lang="en-GB" dirty="0" smtClean="0"/>
+              <a:t>Diagrams</a:t>
+            </a:r>
+            <a:endParaRPr lang="en-GB" dirty="0"/>
+          </a:p>
+          <a:p>
+            <a:r>
+              <a:rPr lang="en-GB" dirty="0"/>
+              <a:t>Interaction </a:t>
+            </a:r>
+            <a:r>
+              <a:rPr lang="en-GB" dirty="0" smtClean="0"/>
+              <a:t>Overview Diagrams</a:t>
+            </a:r>
+            <a:endParaRPr lang="en-GB" dirty="0"/>
+          </a:p>
+          <a:p>
+            <a:r>
+              <a:rPr lang="en-GB" dirty="0"/>
+              <a:t>Composite </a:t>
+            </a:r>
+            <a:r>
+              <a:rPr lang="en-GB" dirty="0" smtClean="0"/>
+              <a:t>Structure Diagrams</a:t>
+            </a:r>
+            <a:endParaRPr lang="en-GB" dirty="0"/>
+          </a:p>
+          <a:p>
+            <a:r>
+              <a:rPr lang="en-GB" dirty="0"/>
+              <a:t>State </a:t>
+            </a:r>
+            <a:r>
+              <a:rPr lang="en-GB" dirty="0" smtClean="0"/>
+              <a:t>Machine Diagrams</a:t>
+            </a:r>
+            <a:endParaRPr lang="en-GB" dirty="0"/>
+          </a:p>
+          <a:p>
+            <a:r>
+              <a:rPr lang="en-GB" dirty="0"/>
+              <a:t>Timing </a:t>
+            </a:r>
+            <a:r>
+              <a:rPr lang="en-GB" dirty="0" smtClean="0"/>
+              <a:t>Diagrams</a:t>
+            </a:r>
+            <a:endParaRPr lang="en-GB" dirty="0"/>
+          </a:p>
+          <a:p>
+            <a:r>
+              <a:rPr lang="en-GB" dirty="0"/>
+              <a:t>Object </a:t>
+            </a:r>
+            <a:r>
+              <a:rPr lang="en-GB" dirty="0" smtClean="0"/>
+              <a:t>Diagrams</a:t>
+            </a:r>
+            <a:endParaRPr lang="en-GB" dirty="0"/>
+          </a:p>
+          <a:p>
+            <a:r>
+              <a:rPr lang="en-GB" b="1" dirty="0">
+                <a:solidFill>
+                  <a:srgbClr val="FF0000"/>
+                </a:solidFill>
+              </a:rPr>
+              <a:t>Communication </a:t>
+            </a:r>
+            <a:r>
+              <a:rPr lang="en-GB" b="1" dirty="0" smtClean="0">
+                <a:solidFill>
+                  <a:srgbClr val="FF0000"/>
+                </a:solidFill>
+              </a:rPr>
+              <a:t>Diagrams</a:t>
+            </a:r>
+            <a:endParaRPr lang="en-GB" b="1" dirty="0">
+              <a:solidFill>
+                <a:srgbClr val="FF0000"/>
+              </a:solidFill>
+            </a:endParaRPr>
+          </a:p>
+        </p:txBody>
+      </p:sp>
+    </p:spTree>
+    <p:extLst>
+      <p:ext uri="{BB962C8B-B14F-4D97-AF65-F5344CB8AC3E}">
+        <p14:creationId xmlns:p14="http://schemas.microsoft.com/office/powerpoint/2010/main" xmlns="" val="876791485"/>
+      </p:ext>
+    </p:extLst>
+  </p:cSld>
+  <p:clrMapOvr>
+    <a:masterClrMapping/>
+  </p:clrMapOvr>
+  <p:timing>
+    <p:tnLst>
+      <p:par>
+        <p:cTn id="1" dur="indefinite" restart="never" nodeType="tmRoot"/>
+      </p:par>
+    </p:tnLst>
+  </p:timing>
+</p:sld>
+</file>
+
+<file path=ppt/slides/slide21.xml><?xml version="1.0" encoding="utf-8"?>
+<p:sld xmlns:a="http://schemas.openxmlformats.org/drawingml/2006/main" xmlns:r="http://schemas.openxmlformats.org/officeDocument/2006/relationships" xmlns:p="http://schemas.openxmlformats.org/presentationml/2006/main">
+  <p:cSld>
+    <p:spTree>
+      <p:nvGrpSpPr>
+        <p:cNvPr id="1" name=""/>
+        <p:cNvGrpSpPr/>
+        <p:nvPr/>
+      </p:nvGrpSpPr>
+      <p:grpSpPr>
+        <a:xfrm>
+          <a:off x="0" y="0"/>
+          <a:ext cx="0" cy="0"/>
+          <a:chOff x="0" y="0"/>
+          <a:chExt cx="0" cy="0"/>
+        </a:xfrm>
+      </p:grpSpPr>
+      <p:sp>
+        <p:nvSpPr>
+          <p:cNvPr id="2" name="Title 1"/>
+          <p:cNvSpPr>
+            <a:spLocks noGrp="1"/>
+          </p:cNvSpPr>
+          <p:nvPr>
+            <p:ph type="title"/>
+          </p:nvPr>
+        </p:nvSpPr>
+        <p:spPr/>
+        <p:txBody>
+          <a:bodyPr/>
+          <a:lstStyle/>
+          <a:p>
+            <a:r>
+              <a:rPr lang="en-GB" dirty="0" smtClean="0"/>
+              <a:t>Communication Diagram</a:t>
+            </a:r>
+            <a:endParaRPr lang="en-GB" dirty="0"/>
+          </a:p>
+        </p:txBody>
+      </p:sp>
+      <p:sp>
+        <p:nvSpPr>
+          <p:cNvPr id="3" name="Content Placeholder 2"/>
+          <p:cNvSpPr>
+            <a:spLocks noGrp="1"/>
+          </p:cNvSpPr>
+          <p:nvPr>
+            <p:ph idx="1"/>
+          </p:nvPr>
+        </p:nvSpPr>
+        <p:spPr/>
+        <p:txBody>
+          <a:bodyPr/>
+          <a:lstStyle/>
+          <a:p>
+            <a:r>
+              <a:rPr lang="en-GB" dirty="0" smtClean="0"/>
+              <a:t>A communication </a:t>
+            </a:r>
+            <a:r>
+              <a:rPr lang="en-GB" dirty="0"/>
+              <a:t>diagram is a type of interaction diagram that focuses on how</a:t>
+            </a:r>
+            <a:br>
+              <a:rPr lang="en-GB" dirty="0"/>
+            </a:br>
+            <a:r>
+              <a:rPr lang="en-GB" dirty="0"/>
+              <a:t>objects are linked and what messages they pass as they participate in a </a:t>
+            </a:r>
+            <a:r>
+              <a:rPr lang="en-GB" dirty="0" smtClean="0"/>
+              <a:t>specific interaction</a:t>
+            </a:r>
+            <a:r>
+              <a:rPr lang="en-GB" dirty="0"/>
+              <a:t/>
+            </a:r>
+            <a:br>
+              <a:rPr lang="en-GB" dirty="0"/>
+            </a:br>
+            <a:r>
+              <a:rPr lang="en-GB" dirty="0"/>
+              <a:t/>
+            </a:r>
+            <a:br>
+              <a:rPr lang="en-GB" dirty="0"/>
+            </a:br>
+            <a:endParaRPr lang="en-GB" dirty="0"/>
+          </a:p>
+        </p:txBody>
+      </p:sp>
+    </p:spTree>
+    <p:extLst>
+      <p:ext uri="{BB962C8B-B14F-4D97-AF65-F5344CB8AC3E}">
+        <p14:creationId xmlns:p14="http://schemas.microsoft.com/office/powerpoint/2010/main" xmlns="" val="1012127932"/>
+      </p:ext>
+    </p:extLst>
+  </p:cSld>
+  <p:clrMapOvr>
+    <a:masterClrMapping/>
+  </p:clrMapOvr>
+  <p:timing>
+    <p:tnLst>
+      <p:par>
+        <p:cTn id="1" dur="indefinite" restart="never" nodeType="tmRoot"/>
+      </p:par>
+    </p:tnLst>
+  </p:timing>
+</p:sld>
+</file>
+
+<file path=ppt/slides/slide22.xml><?xml version="1.0" encoding="utf-8"?>
+<p:sld xmlns:a="http://schemas.openxmlformats.org/drawingml/2006/main" xmlns:r="http://schemas.openxmlformats.org/officeDocument/2006/relationships" xmlns:p="http://schemas.openxmlformats.org/presentationml/2006/main">
+  <p:cSld>
+    <p:spTree>
+      <p:nvGrpSpPr>
+        <p:cNvPr id="1" name=""/>
+        <p:cNvGrpSpPr/>
+        <p:nvPr/>
+      </p:nvGrpSpPr>
+      <p:grpSpPr>
+        <a:xfrm>
+          <a:off x="0" y="0"/>
+          <a:ext cx="0" cy="0"/>
+          <a:chOff x="0" y="0"/>
+          <a:chExt cx="0" cy="0"/>
+        </a:xfrm>
+      </p:grpSpPr>
+      <p:sp>
+        <p:nvSpPr>
+          <p:cNvPr id="2" name="Title 1"/>
+          <p:cNvSpPr>
+            <a:spLocks noGrp="1"/>
+          </p:cNvSpPr>
+          <p:nvPr>
+            <p:ph type="title"/>
+          </p:nvPr>
+        </p:nvSpPr>
+        <p:spPr>
+          <a:xfrm>
+            <a:off x="533400" y="0"/>
+            <a:ext cx="7772400" cy="1143000"/>
+          </a:xfrm>
+        </p:spPr>
+        <p:txBody>
+          <a:bodyPr/>
+          <a:lstStyle/>
+          <a:p>
+            <a:r>
+              <a:rPr lang="en-GB" dirty="0" smtClean="0"/>
+              <a:t>Example</a:t>
+            </a:r>
+            <a:endParaRPr lang="en-GB" dirty="0"/>
+          </a:p>
+        </p:txBody>
+      </p:sp>
+      <p:sp>
+        <p:nvSpPr>
+          <p:cNvPr id="3" name="Content Placeholder 2"/>
+          <p:cNvSpPr>
+            <a:spLocks noGrp="1"/>
+          </p:cNvSpPr>
+          <p:nvPr>
+            <p:ph idx="1"/>
+          </p:nvPr>
+        </p:nvSpPr>
+        <p:spPr/>
+        <p:txBody>
+          <a:bodyPr/>
+          <a:lstStyle/>
+          <a:p>
+            <a:endParaRPr lang="en-GB"/>
+          </a:p>
+        </p:txBody>
+      </p:sp>
+      <p:pic>
+        <p:nvPicPr>
+          <p:cNvPr id="4" name="Picture 3"/>
+          <p:cNvPicPr>
+            <a:picLocks noChangeAspect="1"/>
+          </p:cNvPicPr>
+          <p:nvPr/>
+        </p:nvPicPr>
+        <p:blipFill>
+          <a:blip r:embed="rId2"/>
+          <a:stretch>
+            <a:fillRect/>
+          </a:stretch>
+        </p:blipFill>
+        <p:spPr>
+          <a:xfrm>
+            <a:off x="1981200" y="1447800"/>
+            <a:ext cx="5019675" cy="4972050"/>
+          </a:xfrm>
+          <a:prstGeom prst="rect">
+            <a:avLst/>
+          </a:prstGeom>
+        </p:spPr>
+      </p:pic>
+    </p:spTree>
+    <p:extLst>
+      <p:ext uri="{BB962C8B-B14F-4D97-AF65-F5344CB8AC3E}">
+        <p14:creationId xmlns:p14="http://schemas.microsoft.com/office/powerpoint/2010/main" xmlns="" val="1175813799"/>
+      </p:ext>
+    </p:extLst>
+  </p:cSld>
+  <p:clrMapOvr>
+    <a:masterClrMapping/>
+  </p:clrMapOvr>
+  <p:timing>
+    <p:tnLst>
+      <p:par>
+        <p:cTn id="1" dur="indefinite" restart="never" nodeType="tmRoot"/>
+      </p:par>
+    </p:tnLst>
+  </p:timing>
+</p:sld>
+</file>
+
+<file path=ppt/slides/slide23.xml><?xml version="1.0" encoding="utf-8"?>
+<p:sld xmlns:a="http://schemas.openxmlformats.org/drawingml/2006/main" xmlns:r="http://schemas.openxmlformats.org/officeDocument/2006/relationships" xmlns:p="http://schemas.openxmlformats.org/presentationml/2006/main">
+  <p:cSld>
+    <p:spTree>
+      <p:nvGrpSpPr>
+        <p:cNvPr id="1" name=""/>
+        <p:cNvGrpSpPr/>
+        <p:nvPr/>
+      </p:nvGrpSpPr>
+      <p:grpSpPr>
+        <a:xfrm>
+          <a:off x="0" y="0"/>
+          <a:ext cx="0" cy="0"/>
+          <a:chOff x="0" y="0"/>
+          <a:chExt cx="0" cy="0"/>
+        </a:xfrm>
+      </p:grpSpPr>
+      <p:sp>
+        <p:nvSpPr>
+          <p:cNvPr id="11266" name="Title 1"/>
+          <p:cNvSpPr>
+            <a:spLocks noGrp="1"/>
+          </p:cNvSpPr>
+          <p:nvPr>
+            <p:ph type="title"/>
+          </p:nvPr>
+        </p:nvSpPr>
+        <p:spPr/>
+        <p:txBody>
+          <a:bodyPr/>
+          <a:lstStyle/>
+          <a:p>
+            <a:r>
+              <a:rPr lang="en-GB" altLang="en-US" smtClean="0"/>
+              <a:t>Summary</a:t>
+            </a:r>
+          </a:p>
+        </p:txBody>
+      </p:sp>
+      <p:sp>
+        <p:nvSpPr>
+          <p:cNvPr id="11267" name="Content Placeholder 2"/>
+          <p:cNvSpPr>
+            <a:spLocks noGrp="1"/>
+          </p:cNvSpPr>
+          <p:nvPr>
+            <p:ph idx="1"/>
+          </p:nvPr>
+        </p:nvSpPr>
+        <p:spPr>
+          <a:xfrm>
+            <a:off x="685800" y="1981200"/>
+            <a:ext cx="4800600" cy="4114800"/>
+          </a:xfrm>
+        </p:spPr>
+        <p:txBody>
+          <a:bodyPr/>
+          <a:lstStyle/>
+          <a:p>
+            <a:r>
+              <a:rPr lang="en-GB" altLang="en-US" dirty="0" smtClean="0"/>
+              <a:t>Clear idea of Notation in Object Orientated Analysis and Design</a:t>
+            </a:r>
+          </a:p>
+          <a:p>
+            <a:r>
+              <a:rPr lang="en-GB" altLang="en-US" dirty="0" smtClean="0"/>
+              <a:t>Visualising System</a:t>
+            </a:r>
+          </a:p>
+          <a:p>
+            <a:r>
+              <a:rPr lang="en-GB" altLang="en-US" dirty="0" smtClean="0"/>
+              <a:t>UML Diagrams (Types)</a:t>
+            </a:r>
+          </a:p>
+          <a:p>
+            <a:r>
+              <a:rPr lang="en-GB" b="1" dirty="0" smtClean="0"/>
+              <a:t>UML </a:t>
+            </a:r>
+            <a:r>
+              <a:rPr lang="en-GB" b="1" dirty="0" smtClean="0"/>
+              <a:t>Diagrams</a:t>
+            </a:r>
+            <a:endParaRPr lang="en-GB" altLang="en-US" dirty="0" smtClean="0"/>
+          </a:p>
+          <a:p>
+            <a:endParaRPr lang="en-GB" altLang="en-US" dirty="0" smtClean="0"/>
+          </a:p>
+        </p:txBody>
+      </p:sp>
+      <p:pic>
+        <p:nvPicPr>
+          <p:cNvPr id="4" name="Picture 3"/>
+          <p:cNvPicPr>
+            <a:picLocks noChangeAspect="1"/>
+          </p:cNvPicPr>
+          <p:nvPr/>
+        </p:nvPicPr>
+        <p:blipFill>
+          <a:blip r:embed="rId2" cstate="print"/>
+          <a:stretch>
+            <a:fillRect/>
+          </a:stretch>
+        </p:blipFill>
+        <p:spPr>
+          <a:xfrm>
+            <a:off x="5943600" y="1981200"/>
+            <a:ext cx="2549549" cy="1695450"/>
+          </a:xfrm>
+          <a:prstGeom prst="rect">
+            <a:avLst/>
+          </a:prstGeom>
+        </p:spPr>
+      </p:pic>
+      <p:pic>
+        <p:nvPicPr>
+          <p:cNvPr id="5" name="Picture 4"/>
+          <p:cNvPicPr>
+            <a:picLocks noChangeAspect="1"/>
+          </p:cNvPicPr>
+          <p:nvPr/>
+        </p:nvPicPr>
+        <p:blipFill rotWithShape="1">
+          <a:blip r:embed="rId3" cstate="print"/>
+          <a:srcRect b="8333"/>
+          <a:stretch/>
+        </p:blipFill>
+        <p:spPr>
+          <a:xfrm>
+            <a:off x="5978549" y="4267200"/>
+            <a:ext cx="2536748" cy="1905000"/>
+          </a:xfrm>
+          <a:prstGeom prst="rect">
+            <a:avLst/>
+          </a:prstGeom>
+        </p:spPr>
+      </p:pic>
+    </p:spTree>
+  </p:cSld>
+  <p:clrMapOvr>
+    <a:masterClrMapping/>
+  </p:clrMapOvr>
+  <p:timing>
+    <p:tnLst>
+      <p:par>
+        <p:cTn id="1" dur="indefinite" restart="never" nodeType="tmRoot"/>
+      </p:par>
+    </p:tnLst>
+  </p:timing>
+</p:sld>
+</file>
+
+<file path=ppt/slides/slide24.xml><?xml version="1.0" encoding="utf-8"?>
+<p:sld xmlns:a="http://schemas.openxmlformats.org/drawingml/2006/main" xmlns:r="http://schemas.openxmlformats.org/officeDocument/2006/relationships" xmlns:p="http://schemas.openxmlformats.org/presentationml/2006/main">
+  <p:cSld>
+    <p:spTree>
+      <p:nvGrpSpPr>
+        <p:cNvPr id="1" name=""/>
+        <p:cNvGrpSpPr/>
+        <p:nvPr/>
+      </p:nvGrpSpPr>
+      <p:grpSpPr>
+        <a:xfrm>
+          <a:off x="0" y="0"/>
+          <a:ext cx="0" cy="0"/>
+          <a:chOff x="0" y="0"/>
+          <a:chExt cx="0" cy="0"/>
+        </a:xfrm>
+      </p:grpSpPr>
+      <p:sp>
+        <p:nvSpPr>
+          <p:cNvPr id="12290" name="Title 1"/>
+          <p:cNvSpPr>
+            <a:spLocks noGrp="1"/>
+          </p:cNvSpPr>
+          <p:nvPr>
+            <p:ph type="title"/>
+          </p:nvPr>
+        </p:nvSpPr>
+        <p:spPr/>
+        <p:txBody>
+          <a:bodyPr/>
+          <a:lstStyle/>
+          <a:p>
+            <a:r>
+              <a:rPr lang="en-GB" altLang="en-US" smtClean="0"/>
+              <a:t>This Week</a:t>
+            </a:r>
+          </a:p>
+        </p:txBody>
+      </p:sp>
+      <p:sp>
+        <p:nvSpPr>
+          <p:cNvPr id="12291" name="Content Placeholder 2"/>
+          <p:cNvSpPr>
+            <a:spLocks noGrp="1"/>
+          </p:cNvSpPr>
+          <p:nvPr>
+            <p:ph idx="1"/>
+          </p:nvPr>
+        </p:nvSpPr>
+        <p:spPr/>
+        <p:txBody>
+          <a:bodyPr/>
+          <a:lstStyle/>
+          <a:p>
+            <a:r>
+              <a:rPr lang="en-GB" altLang="en-US" dirty="0" smtClean="0"/>
+              <a:t>Review Slides</a:t>
+            </a:r>
+          </a:p>
+          <a:p>
+            <a:r>
+              <a:rPr lang="en-GB" altLang="en-US" dirty="0" smtClean="0"/>
+              <a:t>Read </a:t>
+            </a:r>
+            <a:r>
+              <a:rPr lang="en-GB" altLang="en-US" smtClean="0"/>
+              <a:t>Chapter </a:t>
+            </a:r>
+            <a:r>
+              <a:rPr lang="en-GB" altLang="en-US" smtClean="0"/>
+              <a:t>6</a:t>
+            </a:r>
+            <a:endParaRPr lang="en-GB" altLang="en-US" dirty="0" smtClean="0"/>
+          </a:p>
+          <a:p>
+            <a:r>
+              <a:rPr lang="en-GB" altLang="en-US" dirty="0" smtClean="0"/>
+              <a:t>Online Quizzes</a:t>
+            </a:r>
+          </a:p>
+          <a:p>
+            <a:r>
+              <a:rPr lang="en-GB" altLang="en-US" dirty="0" smtClean="0"/>
+              <a:t>Version Control (GitHub)</a:t>
+            </a:r>
+          </a:p>
+        </p:txBody>
+      </p:sp>
+    </p:spTree>
+  </p:cSld>
+  <p:clrMapOvr>
+    <a:masterClrMapping/>
+  </p:clrMapOvr>
+  <p:timing>
+    <p:tnLst>
+      <p:par>
+        <p:cTn id="1" dur="indefinite" restart="never" nodeType="tmRoot"/>
+      </p:par>
+    </p:tnLst>
+  </p:timing>
+</p:sld>
+</file>
+
+<file path=ppt/slides/slide25.xml><?xml version="1.0" encoding="utf-8"?>
+<p:sld xmlns:a="http://schemas.openxmlformats.org/drawingml/2006/main" xmlns:r="http://schemas.openxmlformats.org/officeDocument/2006/relationships" xmlns:p="http://schemas.openxmlformats.org/presentationml/2006/main">
+  <p:cSld>
+    <p:spTree>
+      <p:nvGrpSpPr>
+        <p:cNvPr id="1" name=""/>
+        <p:cNvGrpSpPr/>
+        <p:nvPr/>
+      </p:nvGrpSpPr>
+      <p:grpSpPr>
+        <a:xfrm>
+          <a:off x="0" y="0"/>
+          <a:ext cx="0" cy="0"/>
+          <a:chOff x="0" y="0"/>
+          <a:chExt cx="0" cy="0"/>
+        </a:xfrm>
+      </p:grpSpPr>
+      <p:sp>
+        <p:nvSpPr>
+          <p:cNvPr id="13314" name="Title 1"/>
+          <p:cNvSpPr>
+            <a:spLocks noGrp="1"/>
+          </p:cNvSpPr>
+          <p:nvPr>
+            <p:ph type="title"/>
+          </p:nvPr>
+        </p:nvSpPr>
+        <p:spPr/>
+        <p:txBody>
+          <a:bodyPr/>
+          <a:lstStyle/>
+          <a:p>
+            <a:pPr eaLnBrk="1" hangingPunct="1"/>
+            <a:r>
+              <a:rPr lang="en-GB" altLang="en-US" smtClean="0"/>
+              <a:t>Questions/Discussion</a:t>
+            </a:r>
+          </a:p>
+        </p:txBody>
+      </p:sp>
+      <p:sp>
+        <p:nvSpPr>
+          <p:cNvPr id="13315" name="Content Placeholder 2"/>
+          <p:cNvSpPr>
+            <a:spLocks noGrp="1"/>
+          </p:cNvSpPr>
+          <p:nvPr>
+            <p:ph idx="1"/>
+          </p:nvPr>
+        </p:nvSpPr>
+        <p:spPr/>
+        <p:txBody>
+          <a:bodyPr/>
+          <a:lstStyle/>
+          <a:p>
+            <a:pPr eaLnBrk="1" hangingPunct="1"/>
+            <a:endParaRPr lang="en-GB" altLang="en-US" smtClean="0"/>
           </a:p>
         </p:txBody>
       </p:sp>
@@ -4040,7 +6332,11 @@
           <a:bodyPr/>
           <a:lstStyle/>
           <a:p>
-            <a:endParaRPr lang="en-GB"/>
+            <a:r>
+              <a:rPr lang="en-GB" dirty="0" smtClean="0"/>
+              <a:t>Review</a:t>
+            </a:r>
+            <a:endParaRPr lang="en-GB" dirty="0"/>
           </a:p>
         </p:txBody>
       </p:sp>
@@ -4054,25 +6350,271 @@
             <p:ph idx="1"/>
           </p:nvPr>
         </p:nvSpPr>
-        <p:spPr/>
-        <p:txBody>
-          <a:bodyPr/>
+        <p:spPr>
+          <a:xfrm>
+            <a:off x="685800" y="1981200"/>
+            <a:ext cx="7772400" cy="4419600"/>
+          </a:xfrm>
+        </p:spPr>
+        <p:txBody>
+          <a:bodyPr>
+            <a:normAutofit fontScale="70000" lnSpcReduction="20000"/>
+          </a:bodyPr>
           <a:lstStyle/>
           <a:p>
-            <a:endParaRPr lang="en-GB"/>
+            <a:r>
+              <a:rPr lang="en-GB" dirty="0"/>
+              <a:t>Package </a:t>
+            </a:r>
+            <a:r>
+              <a:rPr lang="en-GB" dirty="0" smtClean="0"/>
+              <a:t>Diagrams</a:t>
+            </a:r>
+            <a:endParaRPr lang="en-GB" dirty="0"/>
+          </a:p>
+          <a:p>
+            <a:r>
+              <a:rPr lang="en-GB" dirty="0"/>
+              <a:t>Component </a:t>
+            </a:r>
+            <a:r>
+              <a:rPr lang="en-GB" dirty="0" smtClean="0"/>
+              <a:t>Diagrams</a:t>
+            </a:r>
+            <a:endParaRPr lang="en-GB" dirty="0"/>
+          </a:p>
+          <a:p>
+            <a:r>
+              <a:rPr lang="en-GB" dirty="0"/>
+              <a:t>Deployment </a:t>
+            </a:r>
+            <a:r>
+              <a:rPr lang="en-GB" dirty="0" smtClean="0"/>
+              <a:t>Diagrams</a:t>
+            </a:r>
+            <a:endParaRPr lang="en-GB" dirty="0"/>
+          </a:p>
+          <a:p>
+            <a:r>
+              <a:rPr lang="en-GB" dirty="0"/>
+              <a:t>Use </a:t>
+            </a:r>
+            <a:r>
+              <a:rPr lang="en-GB" dirty="0" smtClean="0"/>
+              <a:t>Case Diagrams</a:t>
+            </a:r>
+            <a:endParaRPr lang="en-GB" dirty="0"/>
+          </a:p>
+          <a:p>
+            <a:r>
+              <a:rPr lang="en-GB" dirty="0"/>
+              <a:t>Activity </a:t>
+            </a:r>
+            <a:r>
+              <a:rPr lang="en-GB" dirty="0" smtClean="0"/>
+              <a:t>Diagrams</a:t>
+            </a:r>
+            <a:endParaRPr lang="en-GB" dirty="0"/>
+          </a:p>
+          <a:p>
+            <a:r>
+              <a:rPr lang="en-GB" dirty="0"/>
+              <a:t>Class </a:t>
+            </a:r>
+            <a:r>
+              <a:rPr lang="en-GB" dirty="0" smtClean="0"/>
+              <a:t>Diagrams</a:t>
+            </a:r>
+            <a:endParaRPr lang="en-GB" dirty="0"/>
+          </a:p>
+          <a:p>
+            <a:r>
+              <a:rPr lang="en-GB" b="1" dirty="0">
+                <a:solidFill>
+                  <a:srgbClr val="FF0000"/>
+                </a:solidFill>
+              </a:rPr>
+              <a:t>Sequence </a:t>
+            </a:r>
+            <a:r>
+              <a:rPr lang="en-GB" b="1" dirty="0" smtClean="0">
+                <a:solidFill>
+                  <a:srgbClr val="FF0000"/>
+                </a:solidFill>
+              </a:rPr>
+              <a:t>Diagrams</a:t>
+            </a:r>
+            <a:endParaRPr lang="en-GB" b="1" dirty="0">
+              <a:solidFill>
+                <a:srgbClr val="FF0000"/>
+              </a:solidFill>
+            </a:endParaRPr>
+          </a:p>
+          <a:p>
+            <a:r>
+              <a:rPr lang="en-GB" dirty="0"/>
+              <a:t>Interaction </a:t>
+            </a:r>
+            <a:r>
+              <a:rPr lang="en-GB" dirty="0" smtClean="0"/>
+              <a:t>Overview Diagrams</a:t>
+            </a:r>
+            <a:endParaRPr lang="en-GB" dirty="0"/>
+          </a:p>
+          <a:p>
+            <a:r>
+              <a:rPr lang="en-GB" dirty="0"/>
+              <a:t>Composite </a:t>
+            </a:r>
+            <a:r>
+              <a:rPr lang="en-GB" dirty="0" smtClean="0"/>
+              <a:t>Structure Diagrams</a:t>
+            </a:r>
+            <a:endParaRPr lang="en-GB" dirty="0"/>
+          </a:p>
+          <a:p>
+            <a:r>
+              <a:rPr lang="en-GB" dirty="0"/>
+              <a:t>State </a:t>
+            </a:r>
+            <a:r>
+              <a:rPr lang="en-GB" dirty="0" smtClean="0"/>
+              <a:t>Machine Diagrams</a:t>
+            </a:r>
+            <a:endParaRPr lang="en-GB" dirty="0"/>
+          </a:p>
+          <a:p>
+            <a:r>
+              <a:rPr lang="en-GB" dirty="0"/>
+              <a:t>Timing </a:t>
+            </a:r>
+            <a:r>
+              <a:rPr lang="en-GB" dirty="0" smtClean="0"/>
+              <a:t>Diagrams</a:t>
+            </a:r>
+            <a:endParaRPr lang="en-GB" dirty="0"/>
+          </a:p>
+          <a:p>
+            <a:r>
+              <a:rPr lang="en-GB" dirty="0"/>
+              <a:t>Object </a:t>
+            </a:r>
+            <a:r>
+              <a:rPr lang="en-GB" dirty="0" smtClean="0"/>
+              <a:t>Diagrams</a:t>
+            </a:r>
+            <a:endParaRPr lang="en-GB" dirty="0"/>
+          </a:p>
+          <a:p>
+            <a:r>
+              <a:rPr lang="en-GB" dirty="0"/>
+              <a:t>Communication </a:t>
+            </a:r>
+            <a:r>
+              <a:rPr lang="en-GB" dirty="0" smtClean="0"/>
+              <a:t>Diagrams</a:t>
+            </a:r>
+            <a:endParaRPr lang="en-GB" dirty="0"/>
+          </a:p>
+        </p:txBody>
+      </p:sp>
+      <p:sp>
+        <p:nvSpPr>
+          <p:cNvPr id="4" name="Rectangle 3"/>
+          <p:cNvSpPr/>
+          <p:nvPr/>
+        </p:nvSpPr>
+        <p:spPr>
+          <a:xfrm>
+            <a:off x="609600" y="1905000"/>
+            <a:ext cx="8153400" cy="2057400"/>
+          </a:xfrm>
+          <a:prstGeom prst="rect">
+            <a:avLst/>
+          </a:prstGeom>
+          <a:noFill/>
+          <a:ln w="53975"/>
+        </p:spPr>
+        <p:style>
+          <a:lnRef idx="2">
+            <a:schemeClr val="accent1">
+              <a:shade val="50000"/>
+            </a:schemeClr>
+          </a:lnRef>
+          <a:fillRef idx="1">
+            <a:schemeClr val="accent1"/>
+          </a:fillRef>
+          <a:effectRef idx="0">
+            <a:schemeClr val="accent1"/>
+          </a:effectRef>
+          <a:fontRef idx="minor">
+            <a:schemeClr val="lt1"/>
+          </a:fontRef>
+        </p:style>
+        <p:txBody>
+          <a:bodyPr rtlCol="0" anchor="ctr"/>
+          <a:lstStyle/>
+          <a:p>
+            <a:pPr algn="ctr"/>
+            <a:endParaRPr lang="en-US"/>
+          </a:p>
+        </p:txBody>
+      </p:sp>
+      <p:sp>
+        <p:nvSpPr>
+          <p:cNvPr id="5" name="TextBox 4"/>
+          <p:cNvSpPr txBox="1"/>
+          <p:nvPr/>
+        </p:nvSpPr>
+        <p:spPr>
+          <a:xfrm>
+            <a:off x="7086600" y="3429000"/>
+            <a:ext cx="1572738" cy="461665"/>
+          </a:xfrm>
+          <a:prstGeom prst="rect">
+            <a:avLst/>
+          </a:prstGeom>
+          <a:noFill/>
+        </p:spPr>
+        <p:txBody>
+          <a:bodyPr wrap="none" rtlCol="0">
+            <a:spAutoFit/>
+          </a:bodyPr>
+          <a:lstStyle/>
+          <a:p>
+            <a:r>
+              <a:rPr lang="en-US" b="1" dirty="0" smtClean="0">
+                <a:solidFill>
+                  <a:srgbClr val="FF0000"/>
+                </a:solidFill>
+              </a:rPr>
+              <a:t>Last Week</a:t>
+            </a:r>
+            <a:endParaRPr lang="en-US" b="1" dirty="0">
+              <a:solidFill>
+                <a:srgbClr val="FF0000"/>
+              </a:solidFill>
+            </a:endParaRPr>
           </a:p>
         </p:txBody>
       </p:sp>
     </p:spTree>
     <p:extLst>
       <p:ext uri="{BB962C8B-B14F-4D97-AF65-F5344CB8AC3E}">
-        <p14:creationId xmlns:p14="http://schemas.microsoft.com/office/powerpoint/2010/main" val="57376077"/>
+        <p14:creationId xmlns:p14="http://schemas.microsoft.com/office/powerpoint/2010/main" xmlns="" val="671100035"/>
       </p:ext>
     </p:extLst>
   </p:cSld>
   <p:clrMapOvr>
     <a:masterClrMapping/>
   </p:clrMapOvr>
+  <p:timing>
+    <p:tnLst>
+      <p:par>
+        <p:cTn id="1" dur="indefinite" restart="never" nodeType="tmRoot"/>
+      </p:par>
+    </p:tnLst>
+  </p:timing>
 </p:sld>
 </file>
 
@@ -4095,7 +6637,7 @@
       </p:grpSpPr>
       <p:sp>
         <p:nvSpPr>
-          <p:cNvPr id="11266" name="Title 1"/>
+          <p:cNvPr id="2" name="Title 1"/>
           <p:cNvSpPr>
             <a:spLocks noGrp="1"/>
           </p:cNvSpPr>
@@ -4109,15 +6651,15 @@
           <a:lstStyle/>
           <a:p>
             <a:r>
-              <a:rPr lang="en-GB" altLang="en-US" smtClean="0"/>
-              <a:t>Summary</a:t>
-            </a:r>
-          </a:p>
-        </p:txBody>
-      </p:sp>
-      <p:sp>
-        <p:nvSpPr>
-          <p:cNvPr id="11267" name="Content Placeholder 2"/>
+              <a:rPr lang="en-GB" dirty="0"/>
+              <a:t>Sequence Diagrams</a:t>
+            </a:r>
+          </a:p>
+        </p:txBody>
+      </p:sp>
+      <p:sp>
+        <p:nvSpPr>
+          <p:cNvPr id="3" name="Content Placeholder 2"/>
           <p:cNvSpPr>
             <a:spLocks noGrp="1"/>
           </p:cNvSpPr>
@@ -4125,53 +6667,180 @@
             <p:ph idx="1"/>
           </p:nvPr>
         </p:nvSpPr>
-        <p:spPr/>
-        <p:txBody>
-          <a:bodyPr/>
+        <p:spPr>
+          <a:xfrm>
+            <a:off x="685800" y="1981200"/>
+            <a:ext cx="7772400" cy="4419600"/>
+          </a:xfrm>
+        </p:spPr>
+        <p:txBody>
+          <a:bodyPr>
+            <a:normAutofit fontScale="70000" lnSpcReduction="20000"/>
+          </a:bodyPr>
           <a:lstStyle/>
           <a:p>
             <a:r>
-              <a:rPr lang="en-GB" altLang="en-US" dirty="0" smtClean="0"/>
-              <a:t>Clear idea of Notation in Object Orientated Analysis and </a:t>
-            </a:r>
-            <a:r>
-              <a:rPr lang="en-GB" altLang="en-US" dirty="0" smtClean="0"/>
-              <a:t>Design</a:t>
-            </a:r>
-          </a:p>
-          <a:p>
-            <a:r>
-              <a:rPr lang="en-GB" altLang="en-US" dirty="0" smtClean="0"/>
-              <a:t>Visualising System</a:t>
-            </a:r>
-          </a:p>
-          <a:p>
-            <a:r>
-              <a:rPr lang="en-GB" altLang="en-US" dirty="0" smtClean="0"/>
-              <a:t>UML Diagrams (Types)</a:t>
-            </a:r>
-          </a:p>
-          <a:p>
-            <a:r>
-              <a:rPr lang="en-GB" b="1" dirty="0" err="1"/>
-              <a:t>Behavior</a:t>
-            </a:r>
-            <a:r>
-              <a:rPr lang="en-GB" b="1" dirty="0"/>
-              <a:t> </a:t>
-            </a:r>
-            <a:r>
-              <a:rPr lang="en-GB" b="1" dirty="0" smtClean="0"/>
+              <a:rPr lang="en-GB" dirty="0"/>
+              <a:t>Package </a:t>
+            </a:r>
+            <a:r>
+              <a:rPr lang="en-GB" dirty="0" smtClean="0"/>
               <a:t>Diagrams</a:t>
             </a:r>
-            <a:endParaRPr lang="en-GB" altLang="en-US" dirty="0" smtClean="0"/>
-          </a:p>
-          <a:p>
-            <a:endParaRPr lang="en-GB" altLang="en-US" dirty="0" smtClean="0"/>
+            <a:endParaRPr lang="en-GB" dirty="0"/>
+          </a:p>
+          <a:p>
+            <a:r>
+              <a:rPr lang="en-GB" dirty="0"/>
+              <a:t>Component </a:t>
+            </a:r>
+            <a:r>
+              <a:rPr lang="en-GB" dirty="0" smtClean="0"/>
+              <a:t>Diagrams</a:t>
+            </a:r>
+            <a:endParaRPr lang="en-GB" dirty="0"/>
+          </a:p>
+          <a:p>
+            <a:r>
+              <a:rPr lang="en-GB" dirty="0"/>
+              <a:t>Deployment </a:t>
+            </a:r>
+            <a:r>
+              <a:rPr lang="en-GB" dirty="0" smtClean="0"/>
+              <a:t>Diagrams</a:t>
+            </a:r>
+            <a:endParaRPr lang="en-GB" dirty="0"/>
+          </a:p>
+          <a:p>
+            <a:r>
+              <a:rPr lang="en-GB" dirty="0"/>
+              <a:t>Use </a:t>
+            </a:r>
+            <a:r>
+              <a:rPr lang="en-GB" dirty="0" smtClean="0"/>
+              <a:t>Case Diagrams</a:t>
+            </a:r>
+            <a:endParaRPr lang="en-GB" dirty="0"/>
+          </a:p>
+          <a:p>
+            <a:r>
+              <a:rPr lang="en-GB" dirty="0"/>
+              <a:t>Activity </a:t>
+            </a:r>
+            <a:r>
+              <a:rPr lang="en-GB" dirty="0" smtClean="0"/>
+              <a:t>Diagrams</a:t>
+            </a:r>
+            <a:endParaRPr lang="en-GB" dirty="0"/>
+          </a:p>
+          <a:p>
+            <a:r>
+              <a:rPr lang="en-GB" dirty="0"/>
+              <a:t>Class </a:t>
+            </a:r>
+            <a:r>
+              <a:rPr lang="en-GB" dirty="0" smtClean="0"/>
+              <a:t>Diagrams</a:t>
+            </a:r>
+            <a:endParaRPr lang="en-GB" dirty="0"/>
+          </a:p>
+          <a:p>
+            <a:r>
+              <a:rPr lang="en-GB" b="1" dirty="0">
+                <a:solidFill>
+                  <a:srgbClr val="FF0000"/>
+                </a:solidFill>
+              </a:rPr>
+              <a:t>Sequence </a:t>
+            </a:r>
+            <a:r>
+              <a:rPr lang="en-GB" b="1" dirty="0" smtClean="0">
+                <a:solidFill>
+                  <a:srgbClr val="FF0000"/>
+                </a:solidFill>
+              </a:rPr>
+              <a:t>Diagrams</a:t>
+            </a:r>
+            <a:endParaRPr lang="en-GB" b="1" dirty="0">
+              <a:solidFill>
+                <a:srgbClr val="FF0000"/>
+              </a:solidFill>
+            </a:endParaRPr>
+          </a:p>
+          <a:p>
+            <a:r>
+              <a:rPr lang="en-GB" dirty="0"/>
+              <a:t>Interaction </a:t>
+            </a:r>
+            <a:r>
+              <a:rPr lang="en-GB" dirty="0" smtClean="0"/>
+              <a:t>Overview Diagrams</a:t>
+            </a:r>
+            <a:endParaRPr lang="en-GB" dirty="0"/>
+          </a:p>
+          <a:p>
+            <a:r>
+              <a:rPr lang="en-GB" dirty="0"/>
+              <a:t>Composite </a:t>
+            </a:r>
+            <a:r>
+              <a:rPr lang="en-GB" dirty="0" smtClean="0"/>
+              <a:t>Structure Diagrams</a:t>
+            </a:r>
+            <a:endParaRPr lang="en-GB" dirty="0"/>
+          </a:p>
+          <a:p>
+            <a:r>
+              <a:rPr lang="en-GB" dirty="0"/>
+              <a:t>State </a:t>
+            </a:r>
+            <a:r>
+              <a:rPr lang="en-GB" dirty="0" smtClean="0"/>
+              <a:t>Machine Diagrams</a:t>
+            </a:r>
+            <a:endParaRPr lang="en-GB" dirty="0"/>
+          </a:p>
+          <a:p>
+            <a:r>
+              <a:rPr lang="en-GB" dirty="0"/>
+              <a:t>Timing </a:t>
+            </a:r>
+            <a:r>
+              <a:rPr lang="en-GB" dirty="0" smtClean="0"/>
+              <a:t>Diagrams</a:t>
+            </a:r>
+            <a:endParaRPr lang="en-GB" dirty="0"/>
+          </a:p>
+          <a:p>
+            <a:r>
+              <a:rPr lang="en-GB" dirty="0"/>
+              <a:t>Object </a:t>
+            </a:r>
+            <a:r>
+              <a:rPr lang="en-GB" dirty="0" smtClean="0"/>
+              <a:t>Diagrams</a:t>
+            </a:r>
+            <a:endParaRPr lang="en-GB" dirty="0"/>
+          </a:p>
+          <a:p>
+            <a:r>
+              <a:rPr lang="en-GB" dirty="0"/>
+              <a:t>Communication </a:t>
+            </a:r>
+            <a:r>
+              <a:rPr lang="en-GB" dirty="0" smtClean="0"/>
+              <a:t>Diagrams</a:t>
+            </a:r>
+            <a:endParaRPr lang="en-GB" dirty="0"/>
           </a:p>
         </p:txBody>
       </p:sp>
     </p:spTree>
+    <p:extLst>
+      <p:ext uri="{BB962C8B-B14F-4D97-AF65-F5344CB8AC3E}">
+        <p14:creationId xmlns:p14="http://schemas.microsoft.com/office/powerpoint/2010/main" xmlns="" val="671100035"/>
+      </p:ext>
+    </p:extLst>
   </p:cSld>
   <p:clrMapOvr>
     <a:masterClrMapping/>
@@ -4205,7 +6874,7 @@
       </p:grpSpPr>
       <p:sp>
         <p:nvSpPr>
-          <p:cNvPr id="12290" name="Title 1"/>
+          <p:cNvPr id="2" name="Title 1"/>
           <p:cNvSpPr>
             <a:spLocks noGrp="1"/>
           </p:cNvSpPr>
@@ -4219,15 +6888,16 @@
           <a:lstStyle/>
           <a:p>
             <a:r>
-              <a:rPr lang="en-GB" altLang="en-US" smtClean="0"/>
-              <a:t>This Week</a:t>
-            </a:r>
-          </a:p>
-        </p:txBody>
-      </p:sp>
-      <p:sp>
-        <p:nvSpPr>
-          <p:cNvPr id="12291" name="Content Placeholder 2"/>
+              <a:rPr lang="en-GB" dirty="0" smtClean="0"/>
+              <a:t>Example</a:t>
+            </a:r>
+            <a:endParaRPr lang="en-GB" dirty="0"/>
+          </a:p>
+        </p:txBody>
+      </p:sp>
+      <p:sp>
+        <p:nvSpPr>
+          <p:cNvPr id="3" name="Content Placeholder 2"/>
           <p:cNvSpPr>
             <a:spLocks noGrp="1"/>
           </p:cNvSpPr>
@@ -4240,37 +6910,40 @@
           <a:bodyPr/>
           <a:lstStyle/>
           <a:p>
-            <a:r>
-              <a:rPr lang="en-GB" altLang="en-US" dirty="0" smtClean="0"/>
-              <a:t>Review Slides</a:t>
-            </a:r>
-          </a:p>
-          <a:p>
-            <a:r>
-              <a:rPr lang="en-GB" altLang="en-US" dirty="0" smtClean="0"/>
-              <a:t>Read Chapter </a:t>
-            </a:r>
-            <a:r>
-              <a:rPr lang="en-GB" altLang="en-US" dirty="0" smtClean="0"/>
-              <a:t>5 &amp; 6</a:t>
-            </a:r>
-          </a:p>
-          <a:p>
-            <a:r>
-              <a:rPr lang="en-GB" altLang="en-US" dirty="0" smtClean="0"/>
-              <a:t>Online Quizzes</a:t>
-            </a:r>
-          </a:p>
-          <a:p>
-            <a:r>
-              <a:rPr lang="en-GB" altLang="en-US" dirty="0" smtClean="0"/>
-              <a:t>Version Control (GitHub)</a:t>
-            </a:r>
-            <a:endParaRPr lang="en-GB" altLang="en-US" dirty="0" smtClean="0"/>
-          </a:p>
-        </p:txBody>
-      </p:sp>
+            <a:endParaRPr lang="en-GB"/>
+          </a:p>
+        </p:txBody>
+      </p:sp>
+      <p:pic>
+        <p:nvPicPr>
+          <p:cNvPr id="4" name="Picture 3"/>
+          <p:cNvPicPr>
+            <a:picLocks noChangeAspect="1"/>
+          </p:cNvPicPr>
+          <p:nvPr/>
+        </p:nvPicPr>
+        <p:blipFill>
+          <a:blip r:embed="rId2"/>
+          <a:stretch>
+            <a:fillRect/>
+          </a:stretch>
+        </p:blipFill>
+        <p:spPr>
+          <a:xfrm>
+            <a:off x="569164" y="2247900"/>
+            <a:ext cx="7872103" cy="3581400"/>
+          </a:xfrm>
+          <a:prstGeom prst="rect">
+            <a:avLst/>
+          </a:prstGeom>
+        </p:spPr>
+      </p:pic>
     </p:spTree>
+    <p:extLst>
+      <p:ext uri="{BB962C8B-B14F-4D97-AF65-F5344CB8AC3E}">
+        <p14:creationId xmlns:p14="http://schemas.microsoft.com/office/powerpoint/2010/main" xmlns="" val="1652512450"/>
+      </p:ext>
+    </p:extLst>
   </p:cSld>
   <p:clrMapOvr>
     <a:masterClrMapping/>
@@ -4304,7 +6977,7 @@
       </p:grpSpPr>
       <p:sp>
         <p:nvSpPr>
-          <p:cNvPr id="13314" name="Title 1"/>
+          <p:cNvPr id="2" name="Title 1"/>
           <p:cNvSpPr>
             <a:spLocks noGrp="1"/>
           </p:cNvSpPr>
@@ -4317,22 +6990,236 @@
           <a:bodyPr/>
           <a:lstStyle/>
           <a:p>
-            <a:pPr eaLnBrk="1" hangingPunct="1"/>
-            <a:r>
-              <a:rPr lang="en-GB" altLang="en-US" smtClean="0"/>
-              <a:t>Questions/Discussion</a:t>
-            </a:r>
-          </a:p>
-        </p:txBody>
-      </p:sp>
-      <p:sp>
-        <p:nvSpPr>
-          <p:cNvPr id="13315" name="Content Placeholder 2"/>
+            <a:r>
+              <a:rPr lang="en-GB" dirty="0"/>
+              <a:t>Interaction Overview Diagrams</a:t>
+            </a:r>
+          </a:p>
+        </p:txBody>
+      </p:sp>
+      <p:sp>
+        <p:nvSpPr>
+          <p:cNvPr id="3" name="Content Placeholder 2"/>
           <p:cNvSpPr>
             <a:spLocks noGrp="1"/>
           </p:cNvSpPr>
           <p:nvPr>
             <p:ph idx="1"/>
+          </p:nvPr>
+        </p:nvSpPr>
+        <p:spPr>
+          <a:xfrm>
+            <a:off x="685800" y="1981200"/>
+            <a:ext cx="7772400" cy="4419600"/>
+          </a:xfrm>
+        </p:spPr>
+        <p:txBody>
+          <a:bodyPr>
+            <a:normAutofit fontScale="70000" lnSpcReduction="20000"/>
+          </a:bodyPr>
+          <a:lstStyle/>
+          <a:p>
+            <a:r>
+              <a:rPr lang="en-GB" dirty="0"/>
+              <a:t>Package </a:t>
+            </a:r>
+            <a:r>
+              <a:rPr lang="en-GB" dirty="0" smtClean="0"/>
+              <a:t>Diagrams</a:t>
+            </a:r>
+            <a:endParaRPr lang="en-GB" dirty="0"/>
+          </a:p>
+          <a:p>
+            <a:r>
+              <a:rPr lang="en-GB" dirty="0"/>
+              <a:t>Component </a:t>
+            </a:r>
+            <a:r>
+              <a:rPr lang="en-GB" dirty="0" smtClean="0"/>
+              <a:t>Diagrams</a:t>
+            </a:r>
+            <a:endParaRPr lang="en-GB" dirty="0"/>
+          </a:p>
+          <a:p>
+            <a:r>
+              <a:rPr lang="en-GB" dirty="0"/>
+              <a:t>Deployment </a:t>
+            </a:r>
+            <a:r>
+              <a:rPr lang="en-GB" dirty="0" smtClean="0"/>
+              <a:t>Diagrams</a:t>
+            </a:r>
+            <a:endParaRPr lang="en-GB" dirty="0"/>
+          </a:p>
+          <a:p>
+            <a:r>
+              <a:rPr lang="en-GB" dirty="0"/>
+              <a:t>Use </a:t>
+            </a:r>
+            <a:r>
+              <a:rPr lang="en-GB" dirty="0" smtClean="0"/>
+              <a:t>Case Diagrams</a:t>
+            </a:r>
+            <a:endParaRPr lang="en-GB" dirty="0"/>
+          </a:p>
+          <a:p>
+            <a:r>
+              <a:rPr lang="en-GB" dirty="0"/>
+              <a:t>Activity </a:t>
+            </a:r>
+            <a:r>
+              <a:rPr lang="en-GB" dirty="0" smtClean="0"/>
+              <a:t>Diagrams</a:t>
+            </a:r>
+            <a:endParaRPr lang="en-GB" dirty="0"/>
+          </a:p>
+          <a:p>
+            <a:r>
+              <a:rPr lang="en-GB" dirty="0"/>
+              <a:t>Class </a:t>
+            </a:r>
+            <a:r>
+              <a:rPr lang="en-GB" dirty="0" smtClean="0"/>
+              <a:t>Diagrams</a:t>
+            </a:r>
+            <a:endParaRPr lang="en-GB" dirty="0"/>
+          </a:p>
+          <a:p>
+            <a:r>
+              <a:rPr lang="en-GB" dirty="0"/>
+              <a:t>Sequence </a:t>
+            </a:r>
+            <a:r>
+              <a:rPr lang="en-GB" dirty="0" smtClean="0"/>
+              <a:t>Diagrams</a:t>
+            </a:r>
+            <a:endParaRPr lang="en-GB" dirty="0"/>
+          </a:p>
+          <a:p>
+            <a:r>
+              <a:rPr lang="en-GB" b="1" dirty="0">
+                <a:solidFill>
+                  <a:srgbClr val="FF0000"/>
+                </a:solidFill>
+              </a:rPr>
+              <a:t>Interaction </a:t>
+            </a:r>
+            <a:r>
+              <a:rPr lang="en-GB" b="1" dirty="0" smtClean="0">
+                <a:solidFill>
+                  <a:srgbClr val="FF0000"/>
+                </a:solidFill>
+              </a:rPr>
+              <a:t>Overview Diagrams</a:t>
+            </a:r>
+            <a:endParaRPr lang="en-GB" b="1" dirty="0">
+              <a:solidFill>
+                <a:srgbClr val="FF0000"/>
+              </a:solidFill>
+            </a:endParaRPr>
+          </a:p>
+          <a:p>
+            <a:r>
+              <a:rPr lang="en-GB" dirty="0"/>
+              <a:t>Composite </a:t>
+            </a:r>
+            <a:r>
+              <a:rPr lang="en-GB" dirty="0" smtClean="0"/>
+              <a:t>Structure Diagrams</a:t>
+            </a:r>
+            <a:endParaRPr lang="en-GB" dirty="0"/>
+          </a:p>
+          <a:p>
+            <a:r>
+              <a:rPr lang="en-GB" dirty="0"/>
+              <a:t>State </a:t>
+            </a:r>
+            <a:r>
+              <a:rPr lang="en-GB" dirty="0" smtClean="0"/>
+              <a:t>Machine Diagrams</a:t>
+            </a:r>
+            <a:endParaRPr lang="en-GB" dirty="0"/>
+          </a:p>
+          <a:p>
+            <a:r>
+              <a:rPr lang="en-GB" dirty="0"/>
+              <a:t>Timing </a:t>
+            </a:r>
+            <a:r>
+              <a:rPr lang="en-GB" dirty="0" smtClean="0"/>
+              <a:t>Diagrams</a:t>
+            </a:r>
+            <a:endParaRPr lang="en-GB" dirty="0"/>
+          </a:p>
+          <a:p>
+            <a:r>
+              <a:rPr lang="en-GB" dirty="0"/>
+              <a:t>Object </a:t>
+            </a:r>
+            <a:r>
+              <a:rPr lang="en-GB" dirty="0" smtClean="0"/>
+              <a:t>Diagrams</a:t>
+            </a:r>
+            <a:endParaRPr lang="en-GB" dirty="0"/>
+          </a:p>
+          <a:p>
+            <a:r>
+              <a:rPr lang="en-GB" dirty="0"/>
+              <a:t>Communication </a:t>
+            </a:r>
+            <a:r>
+              <a:rPr lang="en-GB" dirty="0" smtClean="0"/>
+              <a:t>Diagrams</a:t>
+            </a:r>
+            <a:endParaRPr lang="en-GB" dirty="0"/>
+          </a:p>
+        </p:txBody>
+      </p:sp>
+    </p:spTree>
+    <p:extLst>
+      <p:ext uri="{BB962C8B-B14F-4D97-AF65-F5344CB8AC3E}">
+        <p14:creationId xmlns:p14="http://schemas.microsoft.com/office/powerpoint/2010/main" xmlns="" val="2735570689"/>
+      </p:ext>
+    </p:extLst>
+  </p:cSld>
+  <p:clrMapOvr>
+    <a:masterClrMapping/>
+  </p:clrMapOvr>
+  <p:timing>
+    <p:tnLst>
+      <p:par>
+        <p:cTn id="1" dur="indefinite" restart="never" nodeType="tmRoot"/>
+      </p:par>
+    </p:tnLst>
+  </p:timing>
+</p:sld>
+</file>
+
+<file path=ppt/slides/slide7.xml><?xml version="1.0" encoding="utf-8"?>
+<p:sld xmlns:a="http://schemas.openxmlformats.org/drawingml/2006/main" xmlns:r="http://schemas.openxmlformats.org/officeDocument/2006/relationships" xmlns:p="http://schemas.openxmlformats.org/presentationml/2006/main">
+  <p:cSld>
+    <p:spTree>
+      <p:nvGrpSpPr>
+        <p:cNvPr id="1" name=""/>
+        <p:cNvGrpSpPr/>
+        <p:nvPr/>
+      </p:nvGrpSpPr>
+      <p:grpSpPr>
+        <a:xfrm>
+          <a:off x="0" y="0"/>
+          <a:ext cx="0" cy="0"/>
+          <a:chOff x="0" y="0"/>
+          <a:chExt cx="0" cy="0"/>
+        </a:xfrm>
+      </p:grpSpPr>
+      <p:sp>
+        <p:nvSpPr>
+          <p:cNvPr id="2" name="Title 1"/>
+          <p:cNvSpPr>
+            <a:spLocks noGrp="1"/>
+          </p:cNvSpPr>
+          <p:nvPr>
+            <p:ph type="title"/>
           </p:nvPr>
         </p:nvSpPr>
         <p:spPr/>
@@ -4340,12 +7227,417 @@
           <a:bodyPr/>
           <a:lstStyle/>
           <a:p>
-            <a:pPr eaLnBrk="1" hangingPunct="1"/>
-            <a:endParaRPr lang="en-GB" altLang="en-US" smtClean="0"/>
+            <a:r>
+              <a:rPr lang="en-GB" dirty="0" smtClean="0"/>
+              <a:t>Interaction Overview Diagram</a:t>
+            </a:r>
+            <a:endParaRPr lang="en-GB" dirty="0"/>
+          </a:p>
+        </p:txBody>
+      </p:sp>
+      <p:sp>
+        <p:nvSpPr>
+          <p:cNvPr id="3" name="Content Placeholder 2"/>
+          <p:cNvSpPr>
+            <a:spLocks noGrp="1"/>
+          </p:cNvSpPr>
+          <p:nvPr>
+            <p:ph idx="1"/>
+          </p:nvPr>
+        </p:nvSpPr>
+        <p:spPr/>
+        <p:txBody>
+          <a:bodyPr/>
+          <a:lstStyle/>
+          <a:p>
+            <a:r>
+              <a:rPr lang="en-GB" dirty="0"/>
+              <a:t>Interaction overview diagrams are a combination of activity diagrams and interaction diagrams </a:t>
+            </a:r>
+            <a:endParaRPr lang="en-GB" dirty="0" smtClean="0"/>
+          </a:p>
+          <a:p>
+            <a:r>
+              <a:rPr lang="en-GB" dirty="0" smtClean="0"/>
+              <a:t>Intended </a:t>
+            </a:r>
+            <a:r>
+              <a:rPr lang="en-GB" dirty="0"/>
+              <a:t>to provide an overview of the flow of </a:t>
+            </a:r>
+            <a:r>
+              <a:rPr lang="en-GB" dirty="0" smtClean="0"/>
+              <a:t>control between </a:t>
+            </a:r>
+            <a:r>
+              <a:rPr lang="en-GB" dirty="0"/>
+              <a:t>interaction diagram elements</a:t>
+            </a:r>
+            <a:br>
+              <a:rPr lang="en-GB" dirty="0"/>
+            </a:br>
+            <a:r>
+              <a:rPr lang="en-GB" dirty="0"/>
+              <a:t/>
+            </a:r>
+            <a:br>
+              <a:rPr lang="en-GB" dirty="0"/>
+            </a:br>
+            <a:endParaRPr lang="en-GB" dirty="0"/>
           </a:p>
         </p:txBody>
       </p:sp>
     </p:spTree>
+    <p:extLst>
+      <p:ext uri="{BB962C8B-B14F-4D97-AF65-F5344CB8AC3E}">
+        <p14:creationId xmlns:p14="http://schemas.microsoft.com/office/powerpoint/2010/main" xmlns="" val="314924256"/>
+      </p:ext>
+    </p:extLst>
+  </p:cSld>
+  <p:clrMapOvr>
+    <a:masterClrMapping/>
+  </p:clrMapOvr>
+  <p:timing>
+    <p:tnLst>
+      <p:par>
+        <p:cTn id="1" dur="indefinite" restart="never" nodeType="tmRoot"/>
+      </p:par>
+    </p:tnLst>
+  </p:timing>
+</p:sld>
+</file>
+
+<file path=ppt/slides/slide8.xml><?xml version="1.0" encoding="utf-8"?>
+<p:sld xmlns:a="http://schemas.openxmlformats.org/drawingml/2006/main" xmlns:r="http://schemas.openxmlformats.org/officeDocument/2006/relationships" xmlns:p="http://schemas.openxmlformats.org/presentationml/2006/main">
+  <p:cSld>
+    <p:spTree>
+      <p:nvGrpSpPr>
+        <p:cNvPr id="1" name=""/>
+        <p:cNvGrpSpPr/>
+        <p:nvPr/>
+      </p:nvGrpSpPr>
+      <p:grpSpPr>
+        <a:xfrm>
+          <a:off x="0" y="0"/>
+          <a:ext cx="0" cy="0"/>
+          <a:chOff x="0" y="0"/>
+          <a:chExt cx="0" cy="0"/>
+        </a:xfrm>
+      </p:grpSpPr>
+      <p:sp>
+        <p:nvSpPr>
+          <p:cNvPr id="2" name="Title 1"/>
+          <p:cNvSpPr>
+            <a:spLocks noGrp="1"/>
+          </p:cNvSpPr>
+          <p:nvPr>
+            <p:ph type="title"/>
+          </p:nvPr>
+        </p:nvSpPr>
+        <p:spPr>
+          <a:xfrm>
+            <a:off x="685800" y="-133349"/>
+            <a:ext cx="7772400" cy="1143000"/>
+          </a:xfrm>
+        </p:spPr>
+        <p:txBody>
+          <a:bodyPr/>
+          <a:lstStyle/>
+          <a:p>
+            <a:r>
+              <a:rPr lang="en-GB" dirty="0" smtClean="0"/>
+              <a:t>Example</a:t>
+            </a:r>
+            <a:endParaRPr lang="en-GB" dirty="0"/>
+          </a:p>
+        </p:txBody>
+      </p:sp>
+      <p:sp>
+        <p:nvSpPr>
+          <p:cNvPr id="3" name="Content Placeholder 2"/>
+          <p:cNvSpPr>
+            <a:spLocks noGrp="1"/>
+          </p:cNvSpPr>
+          <p:nvPr>
+            <p:ph idx="1"/>
+          </p:nvPr>
+        </p:nvSpPr>
+        <p:spPr/>
+        <p:txBody>
+          <a:bodyPr/>
+          <a:lstStyle/>
+          <a:p>
+            <a:endParaRPr lang="en-GB"/>
+          </a:p>
+        </p:txBody>
+      </p:sp>
+      <p:pic>
+        <p:nvPicPr>
+          <p:cNvPr id="4" name="Picture 3"/>
+          <p:cNvPicPr>
+            <a:picLocks noChangeAspect="1"/>
+          </p:cNvPicPr>
+          <p:nvPr/>
+        </p:nvPicPr>
+        <p:blipFill>
+          <a:blip r:embed="rId2"/>
+          <a:stretch>
+            <a:fillRect/>
+          </a:stretch>
+        </p:blipFill>
+        <p:spPr>
+          <a:xfrm>
+            <a:off x="2133600" y="838200"/>
+            <a:ext cx="4983451" cy="5926667"/>
+          </a:xfrm>
+          <a:prstGeom prst="rect">
+            <a:avLst/>
+          </a:prstGeom>
+        </p:spPr>
+      </p:pic>
+    </p:spTree>
+    <p:extLst>
+      <p:ext uri="{BB962C8B-B14F-4D97-AF65-F5344CB8AC3E}">
+        <p14:creationId xmlns:p14="http://schemas.microsoft.com/office/powerpoint/2010/main" xmlns="" val="3077947700"/>
+      </p:ext>
+    </p:extLst>
+  </p:cSld>
+  <p:clrMapOvr>
+    <a:masterClrMapping/>
+  </p:clrMapOvr>
+  <p:timing>
+    <p:tnLst>
+      <p:par>
+        <p:cTn id="1" dur="indefinite" restart="never" nodeType="tmRoot"/>
+      </p:par>
+    </p:tnLst>
+  </p:timing>
+</p:sld>
+</file>
+
+<file path=ppt/slides/slide9.xml><?xml version="1.0" encoding="utf-8"?>
+<p:sld xmlns:a="http://schemas.openxmlformats.org/drawingml/2006/main" xmlns:r="http://schemas.openxmlformats.org/officeDocument/2006/relationships" xmlns:p="http://schemas.openxmlformats.org/presentationml/2006/main">
+  <p:cSld>
+    <p:spTree>
+      <p:nvGrpSpPr>
+        <p:cNvPr id="1" name=""/>
+        <p:cNvGrpSpPr/>
+        <p:nvPr/>
+      </p:nvGrpSpPr>
+      <p:grpSpPr>
+        <a:xfrm>
+          <a:off x="0" y="0"/>
+          <a:ext cx="0" cy="0"/>
+          <a:chOff x="0" y="0"/>
+          <a:chExt cx="0" cy="0"/>
+        </a:xfrm>
+      </p:grpSpPr>
+      <p:sp>
+        <p:nvSpPr>
+          <p:cNvPr id="2" name="Title 1"/>
+          <p:cNvSpPr>
+            <a:spLocks noGrp="1"/>
+          </p:cNvSpPr>
+          <p:nvPr>
+            <p:ph type="title"/>
+          </p:nvPr>
+        </p:nvSpPr>
+        <p:spPr/>
+        <p:txBody>
+          <a:bodyPr/>
+          <a:lstStyle/>
+          <a:p>
+            <a:r>
+              <a:rPr lang="en-GB" dirty="0"/>
+              <a:t>Composite Structure Diagrams</a:t>
+            </a:r>
+          </a:p>
+        </p:txBody>
+      </p:sp>
+      <p:sp>
+        <p:nvSpPr>
+          <p:cNvPr id="3" name="Content Placeholder 2"/>
+          <p:cNvSpPr>
+            <a:spLocks noGrp="1"/>
+          </p:cNvSpPr>
+          <p:nvPr>
+            <p:ph idx="1"/>
+          </p:nvPr>
+        </p:nvSpPr>
+        <p:spPr>
+          <a:xfrm>
+            <a:off x="685800" y="1981200"/>
+            <a:ext cx="7772400" cy="4419600"/>
+          </a:xfrm>
+        </p:spPr>
+        <p:txBody>
+          <a:bodyPr>
+            <a:normAutofit fontScale="70000" lnSpcReduction="20000"/>
+          </a:bodyPr>
+          <a:lstStyle/>
+          <a:p>
+            <a:r>
+              <a:rPr lang="en-GB" dirty="0"/>
+              <a:t>Package </a:t>
+            </a:r>
+            <a:r>
+              <a:rPr lang="en-GB" dirty="0" smtClean="0"/>
+              <a:t>Diagrams</a:t>
+            </a:r>
+            <a:endParaRPr lang="en-GB" dirty="0"/>
+          </a:p>
+          <a:p>
+            <a:r>
+              <a:rPr lang="en-GB" dirty="0"/>
+              <a:t>Component </a:t>
+            </a:r>
+            <a:r>
+              <a:rPr lang="en-GB" dirty="0" smtClean="0"/>
+              <a:t>Diagrams</a:t>
+            </a:r>
+            <a:endParaRPr lang="en-GB" dirty="0"/>
+          </a:p>
+          <a:p>
+            <a:r>
+              <a:rPr lang="en-GB" dirty="0"/>
+              <a:t>Deployment </a:t>
+            </a:r>
+            <a:r>
+              <a:rPr lang="en-GB" dirty="0" smtClean="0"/>
+              <a:t>Diagrams</a:t>
+            </a:r>
+            <a:endParaRPr lang="en-GB" dirty="0"/>
+          </a:p>
+          <a:p>
+            <a:r>
+              <a:rPr lang="en-GB" dirty="0"/>
+              <a:t>Use </a:t>
+            </a:r>
+            <a:r>
+              <a:rPr lang="en-GB" dirty="0" smtClean="0"/>
+              <a:t>Case Diagrams</a:t>
+            </a:r>
+            <a:endParaRPr lang="en-GB" dirty="0"/>
+          </a:p>
+          <a:p>
+            <a:r>
+              <a:rPr lang="en-GB" dirty="0"/>
+              <a:t>Activity </a:t>
+            </a:r>
+            <a:r>
+              <a:rPr lang="en-GB" dirty="0" smtClean="0"/>
+              <a:t>Diagrams</a:t>
+            </a:r>
+            <a:endParaRPr lang="en-GB" dirty="0"/>
+          </a:p>
+          <a:p>
+            <a:r>
+              <a:rPr lang="en-GB" dirty="0"/>
+              <a:t>Class </a:t>
+            </a:r>
+            <a:r>
+              <a:rPr lang="en-GB" dirty="0" smtClean="0"/>
+              <a:t>Diagrams</a:t>
+            </a:r>
+            <a:endParaRPr lang="en-GB" dirty="0"/>
+          </a:p>
+          <a:p>
+            <a:r>
+              <a:rPr lang="en-GB" dirty="0"/>
+              <a:t>Sequence </a:t>
+            </a:r>
+            <a:r>
+              <a:rPr lang="en-GB" dirty="0" smtClean="0"/>
+              <a:t>Diagrams</a:t>
+            </a:r>
+            <a:endParaRPr lang="en-GB" dirty="0"/>
+          </a:p>
+          <a:p>
+            <a:r>
+              <a:rPr lang="en-GB" dirty="0"/>
+              <a:t>Interaction </a:t>
+            </a:r>
+            <a:r>
+              <a:rPr lang="en-GB" dirty="0" smtClean="0"/>
+              <a:t>Overview Diagrams</a:t>
+            </a:r>
+            <a:endParaRPr lang="en-GB" dirty="0"/>
+          </a:p>
+          <a:p>
+            <a:r>
+              <a:rPr lang="en-GB" b="1" dirty="0">
+                <a:solidFill>
+                  <a:srgbClr val="FF0000"/>
+                </a:solidFill>
+              </a:rPr>
+              <a:t>Composite </a:t>
+            </a:r>
+            <a:r>
+              <a:rPr lang="en-GB" b="1" dirty="0" smtClean="0">
+                <a:solidFill>
+                  <a:srgbClr val="FF0000"/>
+                </a:solidFill>
+              </a:rPr>
+              <a:t>Structure Diagrams</a:t>
+            </a:r>
+            <a:endParaRPr lang="en-GB" b="1" dirty="0">
+              <a:solidFill>
+                <a:srgbClr val="FF0000"/>
+              </a:solidFill>
+            </a:endParaRPr>
+          </a:p>
+          <a:p>
+            <a:r>
+              <a:rPr lang="en-GB" dirty="0"/>
+              <a:t>State </a:t>
+            </a:r>
+            <a:r>
+              <a:rPr lang="en-GB" dirty="0" smtClean="0"/>
+              <a:t>Machine Diagrams</a:t>
+            </a:r>
+            <a:endParaRPr lang="en-GB" dirty="0"/>
+          </a:p>
+          <a:p>
+            <a:r>
+              <a:rPr lang="en-GB" dirty="0"/>
+              <a:t>Timing </a:t>
+            </a:r>
+            <a:r>
+              <a:rPr lang="en-GB" dirty="0" smtClean="0"/>
+              <a:t>Diagrams</a:t>
+            </a:r>
+            <a:endParaRPr lang="en-GB" dirty="0"/>
+          </a:p>
+          <a:p>
+            <a:r>
+              <a:rPr lang="en-GB" dirty="0"/>
+              <a:t>Object </a:t>
+            </a:r>
+            <a:r>
+              <a:rPr lang="en-GB" dirty="0" smtClean="0"/>
+              <a:t>Diagrams</a:t>
+            </a:r>
+            <a:endParaRPr lang="en-GB" dirty="0"/>
+          </a:p>
+          <a:p>
+            <a:r>
+              <a:rPr lang="en-GB" dirty="0"/>
+              <a:t>Communication </a:t>
+            </a:r>
+            <a:r>
+              <a:rPr lang="en-GB" dirty="0" smtClean="0"/>
+              <a:t>Diagrams</a:t>
+            </a:r>
+            <a:endParaRPr lang="en-GB" dirty="0"/>
+          </a:p>
+        </p:txBody>
+      </p:sp>
+    </p:spTree>
+    <p:extLst>
+      <p:ext uri="{BB962C8B-B14F-4D97-AF65-F5344CB8AC3E}">
+        <p14:creationId xmlns:p14="http://schemas.microsoft.com/office/powerpoint/2010/main" xmlns="" val="1112626206"/>
+      </p:ext>
+    </p:extLst>
   </p:cSld>
   <p:clrMapOvr>
     <a:masterClrMapping/>
@@ -4843,7 +8135,7 @@
   </a:extraClrSchemeLst>
   <a:extLst>
     <a:ext uri="{05A4C25C-085E-4340-85A3-A5531E510DB2}">
-      <thm15:themeFamily xmlns:thm15="http://schemas.microsoft.com/office/thememl/2012/main" name="Office Theme" id="{62F939B6-93AF-4DB8-9C6B-D6C7DFDC589F}" vid="{4A3C46E8-61CC-4603-A589-7422A47A8E4A}"/>
+      <thm15:themeFamily xmlns:thm15="http://schemas.microsoft.com/office/thememl/2012/main" xmlns="" name="Office Theme" id="{62F939B6-93AF-4DB8-9C6B-D6C7DFDC589F}" vid="{4A3C46E8-61CC-4603-A589-7422A47A8E4A}"/>
     </a:ext>
   </a:extLst>
 </a:theme>
@@ -4892,7 +8184,7 @@
     </a:clrScheme>
     <a:fontScheme name="Office">
       <a:majorFont>
-        <a:latin typeface="Calibri Light" panose="020F0302020204030204"/>
+        <a:latin typeface="Calibri Light"/>
         <a:ea typeface=""/>
         <a:cs typeface=""/>
         <a:font script="Jpan" typeface="ＭＳ Ｐゴシック"/>
@@ -4927,7 +8219,7 @@
         <a:font script="Geor" typeface="Sylfaen"/>
       </a:majorFont>
       <a:minorFont>
-        <a:latin typeface="Calibri" panose="020F0502020204030204"/>
+        <a:latin typeface="Calibri"/>
         <a:ea typeface=""/>
         <a:cs typeface=""/>
         <a:font script="Jpan" typeface="ＭＳ Ｐゴシック"/>
@@ -5104,7 +8396,7 @@
   <a:extraClrSchemeLst/>
   <a:extLst>
     <a:ext uri="{05A4C25C-085E-4340-85A3-A5531E510DB2}">
-      <thm15:themeFamily xmlns:thm15="http://schemas.microsoft.com/office/thememl/2012/main" name="Office Theme" id="{62F939B6-93AF-4DB8-9C6B-D6C7DFDC589F}" vid="{4A3C46E8-61CC-4603-A589-7422A47A8E4A}"/>
+      <thm15:themeFamily xmlns:thm15="http://schemas.microsoft.com/office/thememl/2012/main" xmlns="" name="Office Theme" id="{62F939B6-93AF-4DB8-9C6B-D6C7DFDC589F}" vid="{4A3C46E8-61CC-4603-A589-7422A47A8E4A}"/>
     </a:ext>
   </a:extLst>
 </a:theme>

</xml_diff>

<commit_message>
Add additional details to notation slides.
</commit_message>
<xml_diff>
--- a/OOAD/lectures/070--Notation.Part.2.pptx
+++ b/OOAD/lectures/070--Notation.Part.2.pptx
@@ -5,34 +5,36 @@
     <p:sldMasterId id="2147483648" r:id="rId1"/>
   </p:sldMasterIdLst>
   <p:notesMasterIdLst>
-    <p:notesMasterId r:id="rId27"/>
+    <p:notesMasterId r:id="rId29"/>
   </p:notesMasterIdLst>
   <p:sldIdLst>
     <p:sldId id="267" r:id="rId2"/>
     <p:sldId id="274" r:id="rId3"/>
     <p:sldId id="312" r:id="rId4"/>
     <p:sldId id="293" r:id="rId5"/>
-    <p:sldId id="294" r:id="rId6"/>
-    <p:sldId id="295" r:id="rId7"/>
-    <p:sldId id="296" r:id="rId8"/>
-    <p:sldId id="297" r:id="rId9"/>
-    <p:sldId id="298" r:id="rId10"/>
-    <p:sldId id="299" r:id="rId11"/>
-    <p:sldId id="300" r:id="rId12"/>
-    <p:sldId id="301" r:id="rId13"/>
-    <p:sldId id="302" r:id="rId14"/>
-    <p:sldId id="303" r:id="rId15"/>
-    <p:sldId id="304" r:id="rId16"/>
-    <p:sldId id="305" r:id="rId17"/>
-    <p:sldId id="306" r:id="rId18"/>
-    <p:sldId id="307" r:id="rId19"/>
-    <p:sldId id="308" r:id="rId20"/>
-    <p:sldId id="309" r:id="rId21"/>
-    <p:sldId id="310" r:id="rId22"/>
-    <p:sldId id="311" r:id="rId23"/>
-    <p:sldId id="272" r:id="rId24"/>
-    <p:sldId id="291" r:id="rId25"/>
-    <p:sldId id="268" r:id="rId26"/>
+    <p:sldId id="313" r:id="rId6"/>
+    <p:sldId id="294" r:id="rId7"/>
+    <p:sldId id="295" r:id="rId8"/>
+    <p:sldId id="296" r:id="rId9"/>
+    <p:sldId id="297" r:id="rId10"/>
+    <p:sldId id="298" r:id="rId11"/>
+    <p:sldId id="299" r:id="rId12"/>
+    <p:sldId id="300" r:id="rId13"/>
+    <p:sldId id="301" r:id="rId14"/>
+    <p:sldId id="314" r:id="rId15"/>
+    <p:sldId id="302" r:id="rId16"/>
+    <p:sldId id="303" r:id="rId17"/>
+    <p:sldId id="304" r:id="rId18"/>
+    <p:sldId id="305" r:id="rId19"/>
+    <p:sldId id="306" r:id="rId20"/>
+    <p:sldId id="307" r:id="rId21"/>
+    <p:sldId id="308" r:id="rId22"/>
+    <p:sldId id="309" r:id="rId23"/>
+    <p:sldId id="310" r:id="rId24"/>
+    <p:sldId id="311" r:id="rId25"/>
+    <p:sldId id="272" r:id="rId26"/>
+    <p:sldId id="291" r:id="rId27"/>
+    <p:sldId id="268" r:id="rId28"/>
   </p:sldIdLst>
   <p:sldSz cx="9144000" cy="6858000" type="screen4x3"/>
   <p:notesSz cx="6858000" cy="9144000"/>
@@ -163,7 +165,7 @@
   </p:defaultTextStyle>
   <p:extLst>
     <p:ext uri="{EFAFB233-063F-42B5-8137-9DF3F51BA10A}">
-      <p15:sldGuideLst xmlns:p15="http://schemas.microsoft.com/office/powerpoint/2012/main" xmlns="">
+      <p15:sldGuideLst xmlns:p15="http://schemas.microsoft.com/office/powerpoint/2012/main">
         <p15:guide id="1" orient="horz" pos="2160">
           <p15:clr>
             <a:srgbClr val="A4A3A4"/>
@@ -230,14 +232,14 @@
           <a:effectLst/>
           <a:extLst>
             <a:ext uri="{909E8E84-426E-40DD-AFC4-6F175D3DCCD1}">
-              <a14:hiddenFill xmlns:a14="http://schemas.microsoft.com/office/drawing/2010/main" xmlns="">
+              <a14:hiddenFill xmlns:a14="http://schemas.microsoft.com/office/drawing/2010/main">
                 <a:solidFill>
                   <a:schemeClr val="accent1"/>
                 </a:solidFill>
               </a14:hiddenFill>
             </a:ext>
             <a:ext uri="{91240B29-F687-4F45-9708-019B960494DF}">
-              <a14:hiddenLine xmlns:a14="http://schemas.microsoft.com/office/drawing/2010/main" xmlns="" w="9525">
+              <a14:hiddenLine xmlns:a14="http://schemas.microsoft.com/office/drawing/2010/main" w="9525">
                 <a:solidFill>
                   <a:schemeClr val="tx1"/>
                 </a:solidFill>
@@ -247,7 +249,7 @@
               </a14:hiddenLine>
             </a:ext>
             <a:ext uri="{AF507438-7753-43E0-B8FC-AC1667EBCBE1}">
-              <a14:hiddenEffects xmlns:a14="http://schemas.microsoft.com/office/drawing/2010/main" xmlns="">
+              <a14:hiddenEffects xmlns:a14="http://schemas.microsoft.com/office/drawing/2010/main">
                 <a:effectLst>
                   <a:outerShdw dist="35921" dir="2700000" algn="ctr" rotWithShape="0">
                     <a:schemeClr val="bg2"/>
@@ -301,14 +303,14 @@
           <a:effectLst/>
           <a:extLst>
             <a:ext uri="{909E8E84-426E-40DD-AFC4-6F175D3DCCD1}">
-              <a14:hiddenFill xmlns:a14="http://schemas.microsoft.com/office/drawing/2010/main" xmlns="">
+              <a14:hiddenFill xmlns:a14="http://schemas.microsoft.com/office/drawing/2010/main">
                 <a:solidFill>
                   <a:schemeClr val="accent1"/>
                 </a:solidFill>
               </a14:hiddenFill>
             </a:ext>
             <a:ext uri="{91240B29-F687-4F45-9708-019B960494DF}">
-              <a14:hiddenLine xmlns:a14="http://schemas.microsoft.com/office/drawing/2010/main" xmlns="" w="9525">
+              <a14:hiddenLine xmlns:a14="http://schemas.microsoft.com/office/drawing/2010/main" w="9525">
                 <a:solidFill>
                   <a:schemeClr val="tx1"/>
                 </a:solidFill>
@@ -318,7 +320,7 @@
               </a14:hiddenLine>
             </a:ext>
             <a:ext uri="{AF507438-7753-43E0-B8FC-AC1667EBCBE1}">
-              <a14:hiddenEffects xmlns:a14="http://schemas.microsoft.com/office/drawing/2010/main" xmlns="">
+              <a14:hiddenEffects xmlns:a14="http://schemas.microsoft.com/office/drawing/2010/main">
                 <a:effectLst>
                   <a:outerShdw dist="35921" dir="2700000" algn="ctr" rotWithShape="0">
                     <a:schemeClr val="bg2"/>
@@ -377,14 +379,14 @@
           <a:effectLst/>
           <a:extLst>
             <a:ext uri="{909E8E84-426E-40DD-AFC4-6F175D3DCCD1}">
-              <a14:hiddenFill xmlns:a14="http://schemas.microsoft.com/office/drawing/2010/main" xmlns="">
+              <a14:hiddenFill xmlns:a14="http://schemas.microsoft.com/office/drawing/2010/main">
                 <a:solidFill>
                   <a:srgbClr val="FFFFFF"/>
                 </a:solidFill>
               </a14:hiddenFill>
             </a:ext>
             <a:ext uri="{AF507438-7753-43E0-B8FC-AC1667EBCBE1}">
-              <a14:hiddenEffects xmlns:a14="http://schemas.microsoft.com/office/drawing/2010/main" xmlns="">
+              <a14:hiddenEffects xmlns:a14="http://schemas.microsoft.com/office/drawing/2010/main">
                 <a:effectLst>
                   <a:outerShdw dist="35921" dir="2700000" algn="ctr" rotWithShape="0">
                     <a:srgbClr val="808080"/>
@@ -393,7 +395,7 @@
               </a14:hiddenEffects>
             </a:ext>
             <a:ext uri="{53640926-AAD7-44D8-BBD7-CCE9431645EC}">
-              <a14:shadowObscured xmlns:a14="http://schemas.microsoft.com/office/drawing/2010/main" xmlns="" val="1"/>
+              <a14:shadowObscured xmlns:a14="http://schemas.microsoft.com/office/drawing/2010/main" val="1"/>
             </a:ext>
           </a:extLst>
         </p:spPr>
@@ -423,14 +425,14 @@
           <a:effectLst/>
           <a:extLst>
             <a:ext uri="{909E8E84-426E-40DD-AFC4-6F175D3DCCD1}">
-              <a14:hiddenFill xmlns:a14="http://schemas.microsoft.com/office/drawing/2010/main" xmlns="">
+              <a14:hiddenFill xmlns:a14="http://schemas.microsoft.com/office/drawing/2010/main">
                 <a:solidFill>
                   <a:schemeClr val="accent1"/>
                 </a:solidFill>
               </a14:hiddenFill>
             </a:ext>
             <a:ext uri="{91240B29-F687-4F45-9708-019B960494DF}">
-              <a14:hiddenLine xmlns:a14="http://schemas.microsoft.com/office/drawing/2010/main" xmlns="" w="9525">
+              <a14:hiddenLine xmlns:a14="http://schemas.microsoft.com/office/drawing/2010/main" w="9525">
                 <a:solidFill>
                   <a:schemeClr val="tx1"/>
                 </a:solidFill>
@@ -440,7 +442,7 @@
               </a14:hiddenLine>
             </a:ext>
             <a:ext uri="{AF507438-7753-43E0-B8FC-AC1667EBCBE1}">
-              <a14:hiddenEffects xmlns:a14="http://schemas.microsoft.com/office/drawing/2010/main" xmlns="">
+              <a14:hiddenEffects xmlns:a14="http://schemas.microsoft.com/office/drawing/2010/main">
                 <a:effectLst>
                   <a:outerShdw dist="35921" dir="2700000" algn="ctr" rotWithShape="0">
                     <a:schemeClr val="bg2"/>
@@ -519,14 +521,14 @@
           <a:effectLst/>
           <a:extLst>
             <a:ext uri="{909E8E84-426E-40DD-AFC4-6F175D3DCCD1}">
-              <a14:hiddenFill xmlns:a14="http://schemas.microsoft.com/office/drawing/2010/main" xmlns="">
+              <a14:hiddenFill xmlns:a14="http://schemas.microsoft.com/office/drawing/2010/main">
                 <a:solidFill>
                   <a:schemeClr val="accent1"/>
                 </a:solidFill>
               </a14:hiddenFill>
             </a:ext>
             <a:ext uri="{91240B29-F687-4F45-9708-019B960494DF}">
-              <a14:hiddenLine xmlns:a14="http://schemas.microsoft.com/office/drawing/2010/main" xmlns="" w="9525">
+              <a14:hiddenLine xmlns:a14="http://schemas.microsoft.com/office/drawing/2010/main" w="9525">
                 <a:solidFill>
                   <a:schemeClr val="tx1"/>
                 </a:solidFill>
@@ -536,7 +538,7 @@
               </a14:hiddenLine>
             </a:ext>
             <a:ext uri="{AF507438-7753-43E0-B8FC-AC1667EBCBE1}">
-              <a14:hiddenEffects xmlns:a14="http://schemas.microsoft.com/office/drawing/2010/main" xmlns="">
+              <a14:hiddenEffects xmlns:a14="http://schemas.microsoft.com/office/drawing/2010/main">
                 <a:effectLst>
                   <a:outerShdw dist="35921" dir="2700000" algn="ctr" rotWithShape="0">
                     <a:schemeClr val="bg2"/>
@@ -590,14 +592,14 @@
           <a:effectLst/>
           <a:extLst>
             <a:ext uri="{909E8E84-426E-40DD-AFC4-6F175D3DCCD1}">
-              <a14:hiddenFill xmlns:a14="http://schemas.microsoft.com/office/drawing/2010/main" xmlns="">
+              <a14:hiddenFill xmlns:a14="http://schemas.microsoft.com/office/drawing/2010/main">
                 <a:solidFill>
                   <a:schemeClr val="accent1"/>
                 </a:solidFill>
               </a14:hiddenFill>
             </a:ext>
             <a:ext uri="{91240B29-F687-4F45-9708-019B960494DF}">
-              <a14:hiddenLine xmlns:a14="http://schemas.microsoft.com/office/drawing/2010/main" xmlns="" w="9525">
+              <a14:hiddenLine xmlns:a14="http://schemas.microsoft.com/office/drawing/2010/main" w="9525">
                 <a:solidFill>
                   <a:schemeClr val="tx1"/>
                 </a:solidFill>
@@ -607,7 +609,7 @@
               </a14:hiddenLine>
             </a:ext>
             <a:ext uri="{AF507438-7753-43E0-B8FC-AC1667EBCBE1}">
-              <a14:hiddenEffects xmlns:a14="http://schemas.microsoft.com/office/drawing/2010/main" xmlns="">
+              <a14:hiddenEffects xmlns:a14="http://schemas.microsoft.com/office/drawing/2010/main">
                 <a:effectLst>
                   <a:outerShdw dist="35921" dir="2700000" algn="ctr" rotWithShape="0">
                     <a:schemeClr val="bg2"/>
@@ -646,7 +648,7 @@
     </p:spTree>
     <p:extLst>
       <p:ext uri="{BB962C8B-B14F-4D97-AF65-F5344CB8AC3E}">
-        <p14:creationId xmlns:p14="http://schemas.microsoft.com/office/powerpoint/2010/main" xmlns="" val="1534625768"/>
+        <p14:creationId xmlns:p14="http://schemas.microsoft.com/office/powerpoint/2010/main" val="1534625768"/>
       </p:ext>
     </p:extLst>
   </p:cSld>
@@ -893,7 +895,7 @@
     </p:spTree>
     <p:extLst>
       <p:ext uri="{BB962C8B-B14F-4D97-AF65-F5344CB8AC3E}">
-        <p14:creationId xmlns:p14="http://schemas.microsoft.com/office/powerpoint/2010/main" xmlns="" val="2716104023"/>
+        <p14:creationId xmlns:p14="http://schemas.microsoft.com/office/powerpoint/2010/main" val="2716104023"/>
       </p:ext>
     </p:extLst>
   </p:cSld>
@@ -1117,7 +1119,7 @@
     </p:spTree>
     <p:extLst>
       <p:ext uri="{BB962C8B-B14F-4D97-AF65-F5344CB8AC3E}">
-        <p14:creationId xmlns:p14="http://schemas.microsoft.com/office/powerpoint/2010/main" xmlns="" val="3849012506"/>
+        <p14:creationId xmlns:p14="http://schemas.microsoft.com/office/powerpoint/2010/main" val="3849012506"/>
       </p:ext>
     </p:extLst>
   </p:cSld>
@@ -1351,7 +1353,7 @@
     </p:spTree>
     <p:extLst>
       <p:ext uri="{BB962C8B-B14F-4D97-AF65-F5344CB8AC3E}">
-        <p14:creationId xmlns:p14="http://schemas.microsoft.com/office/powerpoint/2010/main" xmlns="" val="1950966811"/>
+        <p14:creationId xmlns:p14="http://schemas.microsoft.com/office/powerpoint/2010/main" val="1950966811"/>
       </p:ext>
     </p:extLst>
   </p:cSld>
@@ -1456,7 +1458,7 @@
     </p:spTree>
     <p:extLst>
       <p:ext uri="{BB962C8B-B14F-4D97-AF65-F5344CB8AC3E}">
-        <p14:creationId xmlns:p14="http://schemas.microsoft.com/office/powerpoint/2010/main" xmlns="" val="1766794565"/>
+        <p14:creationId xmlns:p14="http://schemas.microsoft.com/office/powerpoint/2010/main" val="1766794565"/>
       </p:ext>
     </p:extLst>
   </p:cSld>
@@ -1583,7 +1585,7 @@
     </p:spTree>
     <p:extLst>
       <p:ext uri="{BB962C8B-B14F-4D97-AF65-F5344CB8AC3E}">
-        <p14:creationId xmlns:p14="http://schemas.microsoft.com/office/powerpoint/2010/main" xmlns="" val="2138603420"/>
+        <p14:creationId xmlns:p14="http://schemas.microsoft.com/office/powerpoint/2010/main" val="2138603420"/>
       </p:ext>
     </p:extLst>
   </p:cSld>
@@ -1750,7 +1752,7 @@
     </p:spTree>
     <p:extLst>
       <p:ext uri="{BB962C8B-B14F-4D97-AF65-F5344CB8AC3E}">
-        <p14:creationId xmlns:p14="http://schemas.microsoft.com/office/powerpoint/2010/main" xmlns="" val="2826881444"/>
+        <p14:creationId xmlns:p14="http://schemas.microsoft.com/office/powerpoint/2010/main" val="2826881444"/>
       </p:ext>
     </p:extLst>
   </p:cSld>
@@ -2052,7 +2054,7 @@
     </p:spTree>
     <p:extLst>
       <p:ext uri="{BB962C8B-B14F-4D97-AF65-F5344CB8AC3E}">
-        <p14:creationId xmlns:p14="http://schemas.microsoft.com/office/powerpoint/2010/main" xmlns="" val="1963513231"/>
+        <p14:creationId xmlns:p14="http://schemas.microsoft.com/office/powerpoint/2010/main" val="1963513231"/>
       </p:ext>
     </p:extLst>
   </p:cSld>
@@ -2224,7 +2226,7 @@
     </p:spTree>
     <p:extLst>
       <p:ext uri="{BB962C8B-B14F-4D97-AF65-F5344CB8AC3E}">
-        <p14:creationId xmlns:p14="http://schemas.microsoft.com/office/powerpoint/2010/main" xmlns="" val="2218195436"/>
+        <p14:creationId xmlns:p14="http://schemas.microsoft.com/office/powerpoint/2010/main" val="2218195436"/>
       </p:ext>
     </p:extLst>
   </p:cSld>
@@ -2373,7 +2375,7 @@
     </p:spTree>
     <p:extLst>
       <p:ext uri="{BB962C8B-B14F-4D97-AF65-F5344CB8AC3E}">
-        <p14:creationId xmlns:p14="http://schemas.microsoft.com/office/powerpoint/2010/main" xmlns="" val="1171497205"/>
+        <p14:creationId xmlns:p14="http://schemas.microsoft.com/office/powerpoint/2010/main" val="1171497205"/>
       </p:ext>
     </p:extLst>
   </p:cSld>
@@ -2704,7 +2706,7 @@
     </p:spTree>
     <p:extLst>
       <p:ext uri="{BB962C8B-B14F-4D97-AF65-F5344CB8AC3E}">
-        <p14:creationId xmlns:p14="http://schemas.microsoft.com/office/powerpoint/2010/main" xmlns="" val="2730479000"/>
+        <p14:creationId xmlns:p14="http://schemas.microsoft.com/office/powerpoint/2010/main" val="2730479000"/>
       </p:ext>
     </p:extLst>
   </p:cSld>
@@ -3012,7 +3014,7 @@
     </p:spTree>
     <p:extLst>
       <p:ext uri="{BB962C8B-B14F-4D97-AF65-F5344CB8AC3E}">
-        <p14:creationId xmlns:p14="http://schemas.microsoft.com/office/powerpoint/2010/main" xmlns="" val="2177943095"/>
+        <p14:creationId xmlns:p14="http://schemas.microsoft.com/office/powerpoint/2010/main" val="2177943095"/>
       </p:ext>
     </p:extLst>
   </p:cSld>
@@ -3072,14 +3074,14 @@
           <a:effectLst/>
           <a:extLst>
             <a:ext uri="{909E8E84-426E-40DD-AFC4-6F175D3DCCD1}">
-              <a14:hiddenFill xmlns:a14="http://schemas.microsoft.com/office/drawing/2010/main" xmlns="">
+              <a14:hiddenFill xmlns:a14="http://schemas.microsoft.com/office/drawing/2010/main">
                 <a:solidFill>
                   <a:schemeClr val="accent1"/>
                 </a:solidFill>
               </a14:hiddenFill>
             </a:ext>
             <a:ext uri="{91240B29-F687-4F45-9708-019B960494DF}">
-              <a14:hiddenLine xmlns:a14="http://schemas.microsoft.com/office/drawing/2010/main" xmlns="" w="9525">
+              <a14:hiddenLine xmlns:a14="http://schemas.microsoft.com/office/drawing/2010/main" w="9525">
                 <a:solidFill>
                   <a:schemeClr val="tx1"/>
                 </a:solidFill>
@@ -3089,7 +3091,7 @@
               </a14:hiddenLine>
             </a:ext>
             <a:ext uri="{AF507438-7753-43E0-B8FC-AC1667EBCBE1}">
-              <a14:hiddenEffects xmlns:a14="http://schemas.microsoft.com/office/drawing/2010/main" xmlns="">
+              <a14:hiddenEffects xmlns:a14="http://schemas.microsoft.com/office/drawing/2010/main">
                 <a:effectLst>
                   <a:outerShdw dist="35921" dir="2700000" algn="ctr" rotWithShape="0">
                     <a:schemeClr val="bg2"/>
@@ -3140,14 +3142,14 @@
           <a:effectLst/>
           <a:extLst>
             <a:ext uri="{909E8E84-426E-40DD-AFC4-6F175D3DCCD1}">
-              <a14:hiddenFill xmlns:a14="http://schemas.microsoft.com/office/drawing/2010/main" xmlns="">
+              <a14:hiddenFill xmlns:a14="http://schemas.microsoft.com/office/drawing/2010/main">
                 <a:solidFill>
                   <a:schemeClr val="accent1"/>
                 </a:solidFill>
               </a14:hiddenFill>
             </a:ext>
             <a:ext uri="{91240B29-F687-4F45-9708-019B960494DF}">
-              <a14:hiddenLine xmlns:a14="http://schemas.microsoft.com/office/drawing/2010/main" xmlns="" w="9525">
+              <a14:hiddenLine xmlns:a14="http://schemas.microsoft.com/office/drawing/2010/main" w="9525">
                 <a:solidFill>
                   <a:schemeClr val="tx1"/>
                 </a:solidFill>
@@ -3157,7 +3159,7 @@
               </a14:hiddenLine>
             </a:ext>
             <a:ext uri="{AF507438-7753-43E0-B8FC-AC1667EBCBE1}">
-              <a14:hiddenEffects xmlns:a14="http://schemas.microsoft.com/office/drawing/2010/main" xmlns="">
+              <a14:hiddenEffects xmlns:a14="http://schemas.microsoft.com/office/drawing/2010/main">
                 <a:effectLst>
                   <a:outerShdw dist="35921" dir="2700000" algn="ctr" rotWithShape="0">
                     <a:schemeClr val="bg2"/>
@@ -3705,14 +3707,14 @@
           </a:ln>
           <a:extLst>
             <a:ext uri="{909E8E84-426E-40DD-AFC4-6F175D3DCCD1}">
-              <a14:hiddenFill xmlns:a14="http://schemas.microsoft.com/office/drawing/2010/main" xmlns="">
+              <a14:hiddenFill xmlns:a14="http://schemas.microsoft.com/office/drawing/2010/main">
                 <a:solidFill>
                   <a:srgbClr val="FFFFFF"/>
                 </a:solidFill>
               </a14:hiddenFill>
             </a:ext>
             <a:ext uri="{91240B29-F687-4F45-9708-019B960494DF}">
-              <a14:hiddenLine xmlns:a14="http://schemas.microsoft.com/office/drawing/2010/main" xmlns="" w="9525">
+              <a14:hiddenLine xmlns:a14="http://schemas.microsoft.com/office/drawing/2010/main" w="9525">
                 <a:solidFill>
                   <a:srgbClr val="000000"/>
                 </a:solidFill>
@@ -3921,13 +3923,8 @@
           <a:p>
             <a:r>
               <a:rPr lang="en-GB" dirty="0"/>
-              <a:t>Composite Structure </a:t>
-            </a:r>
-            <a:r>
-              <a:rPr lang="en-GB" dirty="0" smtClean="0"/>
-              <a:t>Diagram</a:t>
-            </a:r>
-            <a:endParaRPr lang="en-GB" dirty="0"/>
+              <a:t>Composite Structure Diagrams</a:t>
+            </a:r>
           </a:p>
         </p:txBody>
       </p:sp>
@@ -3941,54 +3938,170 @@
             <p:ph idx="1"/>
           </p:nvPr>
         </p:nvSpPr>
-        <p:spPr/>
-        <p:txBody>
-          <a:bodyPr/>
+        <p:spPr>
+          <a:xfrm>
+            <a:off x="685800" y="1981200"/>
+            <a:ext cx="7772400" cy="4419600"/>
+          </a:xfrm>
+        </p:spPr>
+        <p:txBody>
+          <a:bodyPr>
+            <a:normAutofit fontScale="70000" lnSpcReduction="20000"/>
+          </a:bodyPr>
           <a:lstStyle/>
           <a:p>
             <a:r>
               <a:rPr lang="en-GB" dirty="0"/>
-              <a:t>Composite structure diagrams provide a way to depict a structured classifier with</a:t>
-            </a:r>
-            <a:br>
-              <a:rPr lang="en-GB" dirty="0"/>
-            </a:br>
-            <a:r>
-              <a:rPr lang="en-GB" dirty="0"/>
-              <a:t>the definition of its internal </a:t>
-            </a:r>
-            <a:r>
-              <a:rPr lang="en-GB" dirty="0" smtClean="0"/>
-              <a:t>structure.</a:t>
-            </a:r>
-          </a:p>
-          <a:p>
-            <a:r>
-              <a:rPr lang="en-GB" dirty="0" smtClean="0"/>
-              <a:t>This </a:t>
-            </a:r>
-            <a:r>
-              <a:rPr lang="en-GB" dirty="0"/>
-              <a:t>internal structure is comprised of </a:t>
-            </a:r>
-            <a:r>
-              <a:rPr lang="en-GB" dirty="0" smtClean="0"/>
-              <a:t>parts and </a:t>
-            </a:r>
-            <a:r>
-              <a:rPr lang="en-GB" dirty="0"/>
-              <a:t>their interconnections, all within the namespace of the composite structure.</a:t>
-            </a:r>
-            <a:br>
-              <a:rPr lang="en-GB" dirty="0"/>
-            </a:br>
-            <a:r>
-              <a:rPr lang="en-GB" dirty="0"/>
-              <a:t/>
-            </a:r>
-            <a:br>
-              <a:rPr lang="en-GB" dirty="0"/>
-            </a:br>
+              <a:t>Package </a:t>
+            </a:r>
+            <a:r>
+              <a:rPr lang="en-GB" dirty="0" smtClean="0"/>
+              <a:t>Diagrams</a:t>
+            </a:r>
+            <a:endParaRPr lang="en-GB" dirty="0"/>
+          </a:p>
+          <a:p>
+            <a:r>
+              <a:rPr lang="en-GB" dirty="0"/>
+              <a:t>Component </a:t>
+            </a:r>
+            <a:r>
+              <a:rPr lang="en-GB" dirty="0" smtClean="0"/>
+              <a:t>Diagrams</a:t>
+            </a:r>
+            <a:endParaRPr lang="en-GB" dirty="0"/>
+          </a:p>
+          <a:p>
+            <a:r>
+              <a:rPr lang="en-GB" dirty="0"/>
+              <a:t>Deployment </a:t>
+            </a:r>
+            <a:r>
+              <a:rPr lang="en-GB" dirty="0" smtClean="0"/>
+              <a:t>Diagrams</a:t>
+            </a:r>
+            <a:endParaRPr lang="en-GB" dirty="0"/>
+          </a:p>
+          <a:p>
+            <a:r>
+              <a:rPr lang="en-GB" dirty="0"/>
+              <a:t>Use </a:t>
+            </a:r>
+            <a:r>
+              <a:rPr lang="en-GB" dirty="0" smtClean="0"/>
+              <a:t>Case Diagrams</a:t>
+            </a:r>
+            <a:endParaRPr lang="en-GB" dirty="0"/>
+          </a:p>
+          <a:p>
+            <a:r>
+              <a:rPr lang="en-GB" dirty="0"/>
+              <a:t>Activity </a:t>
+            </a:r>
+            <a:r>
+              <a:rPr lang="en-GB" dirty="0" smtClean="0"/>
+              <a:t>Diagrams</a:t>
+            </a:r>
+            <a:endParaRPr lang="en-GB" dirty="0"/>
+          </a:p>
+          <a:p>
+            <a:r>
+              <a:rPr lang="en-GB" dirty="0"/>
+              <a:t>Class </a:t>
+            </a:r>
+            <a:r>
+              <a:rPr lang="en-GB" dirty="0" smtClean="0"/>
+              <a:t>Diagrams</a:t>
+            </a:r>
+            <a:endParaRPr lang="en-GB" dirty="0"/>
+          </a:p>
+          <a:p>
+            <a:r>
+              <a:rPr lang="en-GB" dirty="0"/>
+              <a:t>Sequence </a:t>
+            </a:r>
+            <a:r>
+              <a:rPr lang="en-GB" dirty="0" smtClean="0"/>
+              <a:t>Diagrams</a:t>
+            </a:r>
+            <a:endParaRPr lang="en-GB" dirty="0"/>
+          </a:p>
+          <a:p>
+            <a:r>
+              <a:rPr lang="en-GB" dirty="0"/>
+              <a:t>Interaction </a:t>
+            </a:r>
+            <a:r>
+              <a:rPr lang="en-GB" dirty="0" smtClean="0"/>
+              <a:t>Overview Diagrams</a:t>
+            </a:r>
+            <a:endParaRPr lang="en-GB" dirty="0"/>
+          </a:p>
+          <a:p>
+            <a:r>
+              <a:rPr lang="en-GB" b="1" dirty="0">
+                <a:solidFill>
+                  <a:srgbClr val="FF0000"/>
+                </a:solidFill>
+              </a:rPr>
+              <a:t>Composite </a:t>
+            </a:r>
+            <a:r>
+              <a:rPr lang="en-GB" b="1" dirty="0" smtClean="0">
+                <a:solidFill>
+                  <a:srgbClr val="FF0000"/>
+                </a:solidFill>
+              </a:rPr>
+              <a:t>Structure Diagrams</a:t>
+            </a:r>
+            <a:endParaRPr lang="en-GB" b="1" dirty="0">
+              <a:solidFill>
+                <a:srgbClr val="FF0000"/>
+              </a:solidFill>
+            </a:endParaRPr>
+          </a:p>
+          <a:p>
+            <a:r>
+              <a:rPr lang="en-GB" dirty="0"/>
+              <a:t>State </a:t>
+            </a:r>
+            <a:r>
+              <a:rPr lang="en-GB" dirty="0" smtClean="0"/>
+              <a:t>Machine Diagrams</a:t>
+            </a:r>
+            <a:endParaRPr lang="en-GB" dirty="0"/>
+          </a:p>
+          <a:p>
+            <a:r>
+              <a:rPr lang="en-GB" dirty="0"/>
+              <a:t>Timing </a:t>
+            </a:r>
+            <a:r>
+              <a:rPr lang="en-GB" dirty="0" smtClean="0"/>
+              <a:t>Diagrams</a:t>
+            </a:r>
+            <a:endParaRPr lang="en-GB" dirty="0"/>
+          </a:p>
+          <a:p>
+            <a:r>
+              <a:rPr lang="en-GB" dirty="0"/>
+              <a:t>Object </a:t>
+            </a:r>
+            <a:r>
+              <a:rPr lang="en-GB" dirty="0" smtClean="0"/>
+              <a:t>Diagrams</a:t>
+            </a:r>
+            <a:endParaRPr lang="en-GB" dirty="0"/>
+          </a:p>
+          <a:p>
+            <a:r>
+              <a:rPr lang="en-GB" dirty="0"/>
+              <a:t>Communication </a:t>
+            </a:r>
+            <a:r>
+              <a:rPr lang="en-GB" dirty="0" smtClean="0"/>
+              <a:t>Diagrams</a:t>
+            </a:r>
             <a:endParaRPr lang="en-GB" dirty="0"/>
           </a:p>
         </p:txBody>
@@ -3996,7 +4109,7 @@
     </p:spTree>
     <p:extLst>
       <p:ext uri="{BB962C8B-B14F-4D97-AF65-F5344CB8AC3E}">
-        <p14:creationId xmlns:p14="http://schemas.microsoft.com/office/powerpoint/2010/main" xmlns="" val="3088272837"/>
+        <p14:creationId xmlns:p14="http://schemas.microsoft.com/office/powerpoint/2010/main" val="1112626206"/>
       </p:ext>
     </p:extLst>
   </p:cSld>
@@ -4046,8 +4159,12 @@
           <a:lstStyle/>
           <a:p>
             <a:r>
-              <a:rPr lang="en-GB" dirty="0" smtClean="0"/>
-              <a:t>Example</a:t>
+              <a:rPr lang="en-GB" dirty="0"/>
+              <a:t>Composite Structure </a:t>
+            </a:r>
+            <a:r>
+              <a:rPr lang="en-GB" dirty="0" smtClean="0"/>
+              <a:t>Diagram</a:t>
             </a:r>
             <a:endParaRPr lang="en-GB" dirty="0"/>
           </a:p>
@@ -4068,38 +4185,57 @@
           <a:bodyPr/>
           <a:lstStyle/>
           <a:p>
-            <a:endParaRPr lang="en-GB"/>
-          </a:p>
-        </p:txBody>
-      </p:sp>
-      <p:pic>
-        <p:nvPicPr>
-          <p:cNvPr id="4" name="Picture 3"/>
-          <p:cNvPicPr>
-            <a:picLocks noChangeAspect="1"/>
-          </p:cNvPicPr>
-          <p:nvPr/>
-        </p:nvPicPr>
-        <p:blipFill>
-          <a:blip r:embed="rId2"/>
-          <a:stretch>
-            <a:fillRect/>
-          </a:stretch>
-        </p:blipFill>
-        <p:spPr>
-          <a:xfrm>
-            <a:off x="744834" y="2736056"/>
-            <a:ext cx="7654332" cy="2605088"/>
-          </a:xfrm>
-          <a:prstGeom prst="rect">
-            <a:avLst/>
-          </a:prstGeom>
-        </p:spPr>
-      </p:pic>
+            <a:r>
+              <a:rPr lang="en-GB" dirty="0"/>
+              <a:t>Composite structure diagrams provide a way to depict a structured classifier with</a:t>
+            </a:r>
+            <a:br>
+              <a:rPr lang="en-GB" dirty="0"/>
+            </a:br>
+            <a:r>
+              <a:rPr lang="en-GB" dirty="0"/>
+              <a:t>the definition of its internal </a:t>
+            </a:r>
+            <a:r>
+              <a:rPr lang="en-GB" dirty="0" smtClean="0"/>
+              <a:t>structure.</a:t>
+            </a:r>
+          </a:p>
+          <a:p>
+            <a:r>
+              <a:rPr lang="en-GB" dirty="0" smtClean="0"/>
+              <a:t>This </a:t>
+            </a:r>
+            <a:r>
+              <a:rPr lang="en-GB" dirty="0"/>
+              <a:t>internal structure is comprised of </a:t>
+            </a:r>
+            <a:r>
+              <a:rPr lang="en-GB" dirty="0" smtClean="0"/>
+              <a:t>parts and </a:t>
+            </a:r>
+            <a:r>
+              <a:rPr lang="en-GB" dirty="0"/>
+              <a:t>their interconnections, all within the namespace of the composite structure.</a:t>
+            </a:r>
+            <a:br>
+              <a:rPr lang="en-GB" dirty="0"/>
+            </a:br>
+            <a:r>
+              <a:rPr lang="en-GB" dirty="0"/>
+              <a:t/>
+            </a:r>
+            <a:br>
+              <a:rPr lang="en-GB" dirty="0"/>
+            </a:br>
+            <a:endParaRPr lang="en-GB" dirty="0"/>
+          </a:p>
+        </p:txBody>
+      </p:sp>
     </p:spTree>
     <p:extLst>
       <p:ext uri="{BB962C8B-B14F-4D97-AF65-F5344CB8AC3E}">
-        <p14:creationId xmlns:p14="http://schemas.microsoft.com/office/powerpoint/2010/main" xmlns="" val="334759954"/>
+        <p14:creationId xmlns:p14="http://schemas.microsoft.com/office/powerpoint/2010/main" val="3088272837"/>
       </p:ext>
     </p:extLst>
   </p:cSld>
@@ -4149,9 +4285,10 @@
           <a:lstStyle/>
           <a:p>
             <a:r>
-              <a:rPr lang="en-GB" dirty="0"/>
-              <a:t>State Machine Diagrams</a:t>
-            </a:r>
+              <a:rPr lang="en-GB" dirty="0" smtClean="0"/>
+              <a:t>Example</a:t>
+            </a:r>
+            <a:endParaRPr lang="en-GB" dirty="0"/>
           </a:p>
         </p:txBody>
       </p:sp>
@@ -4165,178 +4302,43 @@
             <p:ph idx="1"/>
           </p:nvPr>
         </p:nvSpPr>
+        <p:spPr/>
+        <p:txBody>
+          <a:bodyPr/>
+          <a:lstStyle/>
+          <a:p>
+            <a:endParaRPr lang="en-GB"/>
+          </a:p>
+        </p:txBody>
+      </p:sp>
+      <p:pic>
+        <p:nvPicPr>
+          <p:cNvPr id="4" name="Picture 3"/>
+          <p:cNvPicPr>
+            <a:picLocks noChangeAspect="1"/>
+          </p:cNvPicPr>
+          <p:nvPr/>
+        </p:nvPicPr>
+        <p:blipFill>
+          <a:blip r:embed="rId2"/>
+          <a:stretch>
+            <a:fillRect/>
+          </a:stretch>
+        </p:blipFill>
         <p:spPr>
           <a:xfrm>
-            <a:off x="685800" y="1981200"/>
-            <a:ext cx="7772400" cy="4419600"/>
+            <a:off x="744834" y="2736056"/>
+            <a:ext cx="7654332" cy="2605088"/>
           </a:xfrm>
+          <a:prstGeom prst="rect">
+            <a:avLst/>
+          </a:prstGeom>
         </p:spPr>
-        <p:txBody>
-          <a:bodyPr>
-            <a:normAutofit fontScale="70000" lnSpcReduction="20000"/>
-          </a:bodyPr>
-          <a:lstStyle/>
-          <a:p>
-            <a:r>
-              <a:rPr lang="en-GB" dirty="0"/>
-              <a:t>Package </a:t>
-            </a:r>
-            <a:r>
-              <a:rPr lang="en-GB" dirty="0" smtClean="0"/>
-              <a:t>Diagrams</a:t>
-            </a:r>
-            <a:endParaRPr lang="en-GB" dirty="0"/>
-          </a:p>
-          <a:p>
-            <a:r>
-              <a:rPr lang="en-GB" dirty="0"/>
-              <a:t>Component </a:t>
-            </a:r>
-            <a:r>
-              <a:rPr lang="en-GB" dirty="0" smtClean="0"/>
-              <a:t>Diagrams</a:t>
-            </a:r>
-            <a:endParaRPr lang="en-GB" dirty="0"/>
-          </a:p>
-          <a:p>
-            <a:r>
-              <a:rPr lang="en-GB" dirty="0"/>
-              <a:t>Deployment </a:t>
-            </a:r>
-            <a:r>
-              <a:rPr lang="en-GB" dirty="0" smtClean="0"/>
-              <a:t>Diagrams</a:t>
-            </a:r>
-            <a:endParaRPr lang="en-GB" dirty="0"/>
-          </a:p>
-          <a:p>
-            <a:r>
-              <a:rPr lang="en-GB" dirty="0"/>
-              <a:t>Use </a:t>
-            </a:r>
-            <a:r>
-              <a:rPr lang="en-GB" dirty="0" smtClean="0"/>
-              <a:t>Case Diagrams</a:t>
-            </a:r>
-            <a:endParaRPr lang="en-GB" dirty="0"/>
-          </a:p>
-          <a:p>
-            <a:r>
-              <a:rPr lang="en-GB" dirty="0"/>
-              <a:t>Activity </a:t>
-            </a:r>
-            <a:r>
-              <a:rPr lang="en-GB" dirty="0" smtClean="0"/>
-              <a:t>Diagrams</a:t>
-            </a:r>
-            <a:endParaRPr lang="en-GB" dirty="0"/>
-          </a:p>
-          <a:p>
-            <a:r>
-              <a:rPr lang="en-GB" dirty="0"/>
-              <a:t>Class </a:t>
-            </a:r>
-            <a:r>
-              <a:rPr lang="en-GB" dirty="0" smtClean="0"/>
-              <a:t>Diagrams</a:t>
-            </a:r>
-            <a:endParaRPr lang="en-GB" dirty="0"/>
-          </a:p>
-          <a:p>
-            <a:r>
-              <a:rPr lang="en-GB" dirty="0"/>
-              <a:t>Sequence </a:t>
-            </a:r>
-            <a:r>
-              <a:rPr lang="en-GB" dirty="0" smtClean="0"/>
-              <a:t>Diagrams</a:t>
-            </a:r>
-            <a:endParaRPr lang="en-GB" dirty="0"/>
-          </a:p>
-          <a:p>
-            <a:r>
-              <a:rPr lang="en-GB" dirty="0"/>
-              <a:t>Interaction </a:t>
-            </a:r>
-            <a:r>
-              <a:rPr lang="en-GB" dirty="0" smtClean="0"/>
-              <a:t>Overview Diagrams</a:t>
-            </a:r>
-            <a:endParaRPr lang="en-GB" dirty="0"/>
-          </a:p>
-          <a:p>
-            <a:r>
-              <a:rPr lang="en-GB" dirty="0"/>
-              <a:t>Composite </a:t>
-            </a:r>
-            <a:r>
-              <a:rPr lang="en-GB" dirty="0" smtClean="0"/>
-              <a:t>Structure Diagrams</a:t>
-            </a:r>
-            <a:endParaRPr lang="en-GB" dirty="0"/>
-          </a:p>
-          <a:p>
-            <a:r>
-              <a:rPr lang="en-GB" b="1" dirty="0">
-                <a:solidFill>
-                  <a:srgbClr val="FF0000"/>
-                </a:solidFill>
-              </a:rPr>
-              <a:t>State </a:t>
-            </a:r>
-            <a:r>
-              <a:rPr lang="en-GB" b="1" dirty="0" smtClean="0">
-                <a:solidFill>
-                  <a:srgbClr val="FF0000"/>
-                </a:solidFill>
-              </a:rPr>
-              <a:t>Machine Diagrams</a:t>
-            </a:r>
-            <a:endParaRPr lang="en-GB" b="1" dirty="0">
-              <a:solidFill>
-                <a:srgbClr val="FF0000"/>
-              </a:solidFill>
-            </a:endParaRPr>
-          </a:p>
-          <a:p>
-            <a:r>
-              <a:rPr lang="en-GB" dirty="0"/>
-              <a:t>Timing </a:t>
-            </a:r>
-            <a:r>
-              <a:rPr lang="en-GB" dirty="0" smtClean="0"/>
-              <a:t>Diagrams</a:t>
-            </a:r>
-            <a:endParaRPr lang="en-GB" dirty="0"/>
-          </a:p>
-          <a:p>
-            <a:r>
-              <a:rPr lang="en-GB" dirty="0"/>
-              <a:t>Object </a:t>
-            </a:r>
-            <a:r>
-              <a:rPr lang="en-GB" dirty="0" smtClean="0"/>
-              <a:t>Diagrams</a:t>
-            </a:r>
-            <a:endParaRPr lang="en-GB" dirty="0"/>
-          </a:p>
-          <a:p>
-            <a:r>
-              <a:rPr lang="en-GB" dirty="0"/>
-              <a:t>Communication </a:t>
-            </a:r>
-            <a:r>
-              <a:rPr lang="en-GB" dirty="0" smtClean="0"/>
-              <a:t>Diagrams</a:t>
-            </a:r>
-            <a:endParaRPr lang="en-GB" dirty="0"/>
-          </a:p>
-        </p:txBody>
-      </p:sp>
+      </p:pic>
     </p:spTree>
     <p:extLst>
       <p:ext uri="{BB962C8B-B14F-4D97-AF65-F5344CB8AC3E}">
-        <p14:creationId xmlns:p14="http://schemas.microsoft.com/office/powerpoint/2010/main" xmlns="" val="2997175923"/>
+        <p14:creationId xmlns:p14="http://schemas.microsoft.com/office/powerpoint/2010/main" val="334759954"/>
       </p:ext>
     </p:extLst>
   </p:cSld>
@@ -4386,10 +4388,9 @@
           <a:lstStyle/>
           <a:p>
             <a:r>
-              <a:rPr lang="en-GB" dirty="0" smtClean="0"/>
-              <a:t>Example</a:t>
-            </a:r>
-            <a:endParaRPr lang="en-GB" dirty="0"/>
+              <a:rPr lang="en-GB" dirty="0"/>
+              <a:t>State Machine Diagrams</a:t>
+            </a:r>
           </a:p>
         </p:txBody>
       </p:sp>
@@ -4403,43 +4404,178 @@
             <p:ph idx="1"/>
           </p:nvPr>
         </p:nvSpPr>
-        <p:spPr/>
-        <p:txBody>
-          <a:bodyPr/>
-          <a:lstStyle/>
-          <a:p>
-            <a:endParaRPr lang="en-GB"/>
-          </a:p>
-        </p:txBody>
-      </p:sp>
-      <p:pic>
-        <p:nvPicPr>
-          <p:cNvPr id="4" name="Picture 3"/>
-          <p:cNvPicPr>
-            <a:picLocks noChangeAspect="1"/>
-          </p:cNvPicPr>
-          <p:nvPr/>
-        </p:nvPicPr>
-        <p:blipFill>
-          <a:blip r:embed="rId2"/>
-          <a:stretch>
-            <a:fillRect/>
-          </a:stretch>
-        </p:blipFill>
         <p:spPr>
           <a:xfrm>
-            <a:off x="838200" y="2362200"/>
-            <a:ext cx="7896225" cy="3438525"/>
+            <a:off x="685800" y="1981200"/>
+            <a:ext cx="7772400" cy="4419600"/>
           </a:xfrm>
-          <a:prstGeom prst="rect">
-            <a:avLst/>
-          </a:prstGeom>
         </p:spPr>
-      </p:pic>
+        <p:txBody>
+          <a:bodyPr>
+            <a:normAutofit fontScale="70000" lnSpcReduction="20000"/>
+          </a:bodyPr>
+          <a:lstStyle/>
+          <a:p>
+            <a:r>
+              <a:rPr lang="en-GB" dirty="0"/>
+              <a:t>Package </a:t>
+            </a:r>
+            <a:r>
+              <a:rPr lang="en-GB" dirty="0" smtClean="0"/>
+              <a:t>Diagrams</a:t>
+            </a:r>
+            <a:endParaRPr lang="en-GB" dirty="0"/>
+          </a:p>
+          <a:p>
+            <a:r>
+              <a:rPr lang="en-GB" dirty="0"/>
+              <a:t>Component </a:t>
+            </a:r>
+            <a:r>
+              <a:rPr lang="en-GB" dirty="0" smtClean="0"/>
+              <a:t>Diagrams</a:t>
+            </a:r>
+            <a:endParaRPr lang="en-GB" dirty="0"/>
+          </a:p>
+          <a:p>
+            <a:r>
+              <a:rPr lang="en-GB" dirty="0"/>
+              <a:t>Deployment </a:t>
+            </a:r>
+            <a:r>
+              <a:rPr lang="en-GB" dirty="0" smtClean="0"/>
+              <a:t>Diagrams</a:t>
+            </a:r>
+            <a:endParaRPr lang="en-GB" dirty="0"/>
+          </a:p>
+          <a:p>
+            <a:r>
+              <a:rPr lang="en-GB" dirty="0"/>
+              <a:t>Use </a:t>
+            </a:r>
+            <a:r>
+              <a:rPr lang="en-GB" dirty="0" smtClean="0"/>
+              <a:t>Case Diagrams</a:t>
+            </a:r>
+            <a:endParaRPr lang="en-GB" dirty="0"/>
+          </a:p>
+          <a:p>
+            <a:r>
+              <a:rPr lang="en-GB" dirty="0"/>
+              <a:t>Activity </a:t>
+            </a:r>
+            <a:r>
+              <a:rPr lang="en-GB" dirty="0" smtClean="0"/>
+              <a:t>Diagrams</a:t>
+            </a:r>
+            <a:endParaRPr lang="en-GB" dirty="0"/>
+          </a:p>
+          <a:p>
+            <a:r>
+              <a:rPr lang="en-GB" dirty="0"/>
+              <a:t>Class </a:t>
+            </a:r>
+            <a:r>
+              <a:rPr lang="en-GB" dirty="0" smtClean="0"/>
+              <a:t>Diagrams</a:t>
+            </a:r>
+            <a:endParaRPr lang="en-GB" dirty="0"/>
+          </a:p>
+          <a:p>
+            <a:r>
+              <a:rPr lang="en-GB" dirty="0"/>
+              <a:t>Sequence </a:t>
+            </a:r>
+            <a:r>
+              <a:rPr lang="en-GB" dirty="0" smtClean="0"/>
+              <a:t>Diagrams</a:t>
+            </a:r>
+            <a:endParaRPr lang="en-GB" dirty="0"/>
+          </a:p>
+          <a:p>
+            <a:r>
+              <a:rPr lang="en-GB" dirty="0"/>
+              <a:t>Interaction </a:t>
+            </a:r>
+            <a:r>
+              <a:rPr lang="en-GB" dirty="0" smtClean="0"/>
+              <a:t>Overview Diagrams</a:t>
+            </a:r>
+            <a:endParaRPr lang="en-GB" dirty="0"/>
+          </a:p>
+          <a:p>
+            <a:r>
+              <a:rPr lang="en-GB" dirty="0"/>
+              <a:t>Composite </a:t>
+            </a:r>
+            <a:r>
+              <a:rPr lang="en-GB" dirty="0" smtClean="0"/>
+              <a:t>Structure Diagrams</a:t>
+            </a:r>
+            <a:endParaRPr lang="en-GB" dirty="0"/>
+          </a:p>
+          <a:p>
+            <a:r>
+              <a:rPr lang="en-GB" b="1" dirty="0">
+                <a:solidFill>
+                  <a:srgbClr val="FF0000"/>
+                </a:solidFill>
+              </a:rPr>
+              <a:t>State </a:t>
+            </a:r>
+            <a:r>
+              <a:rPr lang="en-GB" b="1" dirty="0" smtClean="0">
+                <a:solidFill>
+                  <a:srgbClr val="FF0000"/>
+                </a:solidFill>
+              </a:rPr>
+              <a:t>Machine Diagrams</a:t>
+            </a:r>
+            <a:endParaRPr lang="en-GB" b="1" dirty="0">
+              <a:solidFill>
+                <a:srgbClr val="FF0000"/>
+              </a:solidFill>
+            </a:endParaRPr>
+          </a:p>
+          <a:p>
+            <a:r>
+              <a:rPr lang="en-GB" dirty="0"/>
+              <a:t>Timing </a:t>
+            </a:r>
+            <a:r>
+              <a:rPr lang="en-GB" dirty="0" smtClean="0"/>
+              <a:t>Diagrams</a:t>
+            </a:r>
+            <a:endParaRPr lang="en-GB" dirty="0"/>
+          </a:p>
+          <a:p>
+            <a:r>
+              <a:rPr lang="en-GB" dirty="0"/>
+              <a:t>Object </a:t>
+            </a:r>
+            <a:r>
+              <a:rPr lang="en-GB" dirty="0" smtClean="0"/>
+              <a:t>Diagrams</a:t>
+            </a:r>
+            <a:endParaRPr lang="en-GB" dirty="0"/>
+          </a:p>
+          <a:p>
+            <a:r>
+              <a:rPr lang="en-GB" dirty="0"/>
+              <a:t>Communication </a:t>
+            </a:r>
+            <a:r>
+              <a:rPr lang="en-GB" dirty="0" smtClean="0"/>
+              <a:t>Diagrams</a:t>
+            </a:r>
+            <a:endParaRPr lang="en-GB" dirty="0"/>
+          </a:p>
+        </p:txBody>
+      </p:sp>
     </p:spTree>
     <p:extLst>
       <p:ext uri="{BB962C8B-B14F-4D97-AF65-F5344CB8AC3E}">
-        <p14:creationId xmlns:p14="http://schemas.microsoft.com/office/powerpoint/2010/main" xmlns="" val="3143873876"/>
+        <p14:creationId xmlns:p14="http://schemas.microsoft.com/office/powerpoint/2010/main" val="2997175923"/>
       </p:ext>
     </p:extLst>
   </p:cSld>
@@ -4490,8 +4626,13 @@
           <a:p>
             <a:r>
               <a:rPr lang="en-GB" dirty="0"/>
-              <a:t>Timing Diagrams</a:t>
-            </a:r>
+              <a:t>State Machine </a:t>
+            </a:r>
+            <a:r>
+              <a:rPr lang="en-GB" dirty="0" smtClean="0"/>
+              <a:t>Diagram</a:t>
+            </a:r>
+            <a:endParaRPr lang="en-GB" dirty="0"/>
           </a:p>
         </p:txBody>
       </p:sp>
@@ -4505,169 +4646,72 @@
             <p:ph idx="1"/>
           </p:nvPr>
         </p:nvSpPr>
-        <p:spPr>
-          <a:xfrm>
-            <a:off x="685800" y="1981200"/>
-            <a:ext cx="7772400" cy="4419600"/>
-          </a:xfrm>
-        </p:spPr>
+        <p:spPr/>
         <p:txBody>
           <a:bodyPr>
-            <a:normAutofit fontScale="70000" lnSpcReduction="20000"/>
+            <a:normAutofit fontScale="92500"/>
           </a:bodyPr>
           <a:lstStyle/>
           <a:p>
             <a:r>
               <a:rPr lang="en-GB" dirty="0"/>
-              <a:t>Package </a:t>
-            </a:r>
-            <a:r>
-              <a:rPr lang="en-GB" dirty="0" smtClean="0"/>
-              <a:t>Diagrams</a:t>
-            </a:r>
-            <a:endParaRPr lang="en-GB" dirty="0"/>
-          </a:p>
-          <a:p>
-            <a:r>
-              <a:rPr lang="en-GB" dirty="0"/>
-              <a:t>Component </a:t>
-            </a:r>
-            <a:r>
-              <a:rPr lang="en-GB" dirty="0" smtClean="0"/>
-              <a:t>Diagrams</a:t>
-            </a:r>
-            <a:endParaRPr lang="en-GB" dirty="0"/>
-          </a:p>
-          <a:p>
-            <a:r>
-              <a:rPr lang="en-GB" dirty="0"/>
-              <a:t>Deployment </a:t>
-            </a:r>
-            <a:r>
-              <a:rPr lang="en-GB" dirty="0" smtClean="0"/>
-              <a:t>Diagrams</a:t>
-            </a:r>
-            <a:endParaRPr lang="en-GB" dirty="0"/>
-          </a:p>
-          <a:p>
-            <a:r>
-              <a:rPr lang="en-GB" dirty="0"/>
-              <a:t>Use </a:t>
-            </a:r>
-            <a:r>
-              <a:rPr lang="en-GB" dirty="0" smtClean="0"/>
-              <a:t>Case Diagrams</a:t>
-            </a:r>
-            <a:endParaRPr lang="en-GB" dirty="0"/>
-          </a:p>
-          <a:p>
-            <a:r>
-              <a:rPr lang="en-GB" dirty="0"/>
-              <a:t>Activity </a:t>
-            </a:r>
-            <a:r>
-              <a:rPr lang="en-GB" dirty="0" smtClean="0"/>
-              <a:t>Diagrams</a:t>
-            </a:r>
-            <a:endParaRPr lang="en-GB" dirty="0"/>
-          </a:p>
-          <a:p>
-            <a:r>
-              <a:rPr lang="en-GB" dirty="0"/>
-              <a:t>Class </a:t>
-            </a:r>
-            <a:r>
-              <a:rPr lang="en-GB" dirty="0" smtClean="0"/>
-              <a:t>Diagrams</a:t>
-            </a:r>
-            <a:endParaRPr lang="en-GB" dirty="0"/>
-          </a:p>
-          <a:p>
-            <a:r>
-              <a:rPr lang="en-GB" dirty="0"/>
-              <a:t>Sequence </a:t>
-            </a:r>
-            <a:r>
-              <a:rPr lang="en-GB" dirty="0" smtClean="0"/>
-              <a:t>Diagrams</a:t>
-            </a:r>
-            <a:endParaRPr lang="en-GB" dirty="0"/>
-          </a:p>
-          <a:p>
-            <a:r>
-              <a:rPr lang="en-GB" dirty="0"/>
-              <a:t>Interaction </a:t>
-            </a:r>
-            <a:r>
-              <a:rPr lang="en-GB" dirty="0" smtClean="0"/>
-              <a:t>Overview Diagrams</a:t>
-            </a:r>
-            <a:endParaRPr lang="en-GB" dirty="0"/>
-          </a:p>
-          <a:p>
-            <a:r>
-              <a:rPr lang="en-GB" dirty="0"/>
-              <a:t>Composite </a:t>
-            </a:r>
-            <a:r>
-              <a:rPr lang="en-GB" dirty="0" smtClean="0"/>
-              <a:t>Structure Diagrams</a:t>
-            </a:r>
-            <a:endParaRPr lang="en-GB" dirty="0"/>
-          </a:p>
-          <a:p>
-            <a:r>
-              <a:rPr lang="en-GB" dirty="0"/>
-              <a:t>State </a:t>
-            </a:r>
-            <a:r>
-              <a:rPr lang="en-GB" dirty="0" smtClean="0"/>
-              <a:t>Machine Diagrams</a:t>
-            </a:r>
-            <a:endParaRPr lang="en-GB" dirty="0"/>
-          </a:p>
-          <a:p>
-            <a:r>
-              <a:rPr lang="en-GB" b="1" dirty="0">
-                <a:solidFill>
-                  <a:srgbClr val="FF0000"/>
-                </a:solidFill>
-              </a:rPr>
-              <a:t>Timing </a:t>
-            </a:r>
-            <a:r>
-              <a:rPr lang="en-GB" b="1" dirty="0" smtClean="0">
-                <a:solidFill>
-                  <a:srgbClr val="FF0000"/>
-                </a:solidFill>
-              </a:rPr>
-              <a:t>Diagrams</a:t>
-            </a:r>
-            <a:endParaRPr lang="en-GB" b="1" dirty="0">
-              <a:solidFill>
-                <a:srgbClr val="FF0000"/>
-              </a:solidFill>
-            </a:endParaRPr>
-          </a:p>
-          <a:p>
-            <a:r>
-              <a:rPr lang="en-GB" dirty="0"/>
-              <a:t>Object </a:t>
-            </a:r>
-            <a:r>
-              <a:rPr lang="en-GB" dirty="0" smtClean="0"/>
-              <a:t>Diagrams</a:t>
-            </a:r>
-            <a:endParaRPr lang="en-GB" dirty="0"/>
-          </a:p>
-          <a:p>
-            <a:r>
-              <a:rPr lang="en-GB" dirty="0"/>
-              <a:t>Communication </a:t>
-            </a:r>
-            <a:r>
-              <a:rPr lang="en-GB" dirty="0" smtClean="0"/>
-              <a:t>Diagrams</a:t>
+              <a:t>A state machine diagram is used to design and understand time-critical </a:t>
+            </a:r>
+            <a:r>
+              <a:rPr lang="en-GB" dirty="0" smtClean="0"/>
+              <a:t>systems</a:t>
+            </a:r>
+          </a:p>
+          <a:p>
+            <a:r>
+              <a:rPr lang="en-GB" dirty="0" smtClean="0"/>
+              <a:t>A </a:t>
+            </a:r>
+            <a:r>
+              <a:rPr lang="en-GB" dirty="0"/>
+              <a:t>state machine diagram expresses </a:t>
+            </a:r>
+            <a:r>
+              <a:rPr lang="en-GB" dirty="0" err="1"/>
+              <a:t>behavior</a:t>
+            </a:r>
+            <a:r>
+              <a:rPr lang="en-GB" dirty="0"/>
+              <a:t> as a progression </a:t>
+            </a:r>
+            <a:r>
+              <a:rPr lang="en-GB" dirty="0" smtClean="0"/>
+              <a:t>through a </a:t>
+            </a:r>
+            <a:r>
+              <a:rPr lang="en-GB" dirty="0"/>
+              <a:t>series of states, triggered by events, and the related actions that may </a:t>
+            </a:r>
+            <a:r>
+              <a:rPr lang="en-GB" dirty="0" smtClean="0"/>
+              <a:t>occur</a:t>
+            </a:r>
+          </a:p>
+          <a:p>
+            <a:r>
+              <a:rPr lang="en-GB" dirty="0" smtClean="0"/>
+              <a:t>These </a:t>
+            </a:r>
+            <a:r>
+              <a:rPr lang="en-GB" dirty="0"/>
+              <a:t>are also known as </a:t>
+            </a:r>
+            <a:r>
+              <a:rPr lang="en-GB" dirty="0" err="1"/>
+              <a:t>behavioral</a:t>
+            </a:r>
+            <a:r>
+              <a:rPr lang="en-GB" dirty="0"/>
+              <a:t> state </a:t>
+            </a:r>
+            <a:r>
+              <a:rPr lang="en-GB" dirty="0" smtClean="0"/>
+              <a:t>machines</a:t>
             </a:r>
             <a:endParaRPr lang="en-GB" dirty="0"/>
           </a:p>
@@ -4676,20 +4720,13 @@
     </p:spTree>
     <p:extLst>
       <p:ext uri="{BB962C8B-B14F-4D97-AF65-F5344CB8AC3E}">
-        <p14:creationId xmlns:p14="http://schemas.microsoft.com/office/powerpoint/2010/main" xmlns="" val="1121814747"/>
+        <p14:creationId xmlns:p14="http://schemas.microsoft.com/office/powerpoint/2010/main" val="2537771398"/>
       </p:ext>
     </p:extLst>
   </p:cSld>
   <p:clrMapOvr>
     <a:masterClrMapping/>
   </p:clrMapOvr>
-  <p:timing>
-    <p:tnLst>
-      <p:par>
-        <p:cTn id="1" dur="indefinite" restart="never" nodeType="tmRoot"/>
-      </p:par>
-    </p:tnLst>
-  </p:timing>
 </p:sld>
 </file>
 
@@ -4727,7 +4764,7 @@
           <a:p>
             <a:r>
               <a:rPr lang="en-GB" dirty="0" smtClean="0"/>
-              <a:t>Timing Diagrams</a:t>
+              <a:t>Example</a:t>
             </a:r>
             <a:endParaRPr lang="en-GB" dirty="0"/>
           </a:p>
@@ -4748,58 +4785,38 @@
           <a:bodyPr/>
           <a:lstStyle/>
           <a:p>
-            <a:r>
-              <a:rPr lang="en-GB" dirty="0"/>
-              <a:t>Timing diagrams are a type of interaction </a:t>
-            </a:r>
-            <a:r>
-              <a:rPr lang="en-GB" dirty="0" smtClean="0"/>
-              <a:t>diagram</a:t>
-            </a:r>
-          </a:p>
-          <a:p>
-            <a:r>
-              <a:rPr lang="en-GB" dirty="0" smtClean="0"/>
-              <a:t>Their </a:t>
-            </a:r>
-            <a:r>
-              <a:rPr lang="en-GB" dirty="0"/>
-              <a:t>purpose is to show </a:t>
-            </a:r>
-            <a:r>
-              <a:rPr lang="en-GB" dirty="0" smtClean="0"/>
-              <a:t>how the </a:t>
-            </a:r>
-            <a:r>
-              <a:rPr lang="en-GB" dirty="0"/>
-              <a:t>states of an element or elements change over time and how events </a:t>
-            </a:r>
-            <a:r>
-              <a:rPr lang="en-GB" dirty="0" smtClean="0"/>
-              <a:t>change those states</a:t>
-            </a:r>
-            <a:r>
-              <a:rPr lang="en-GB" dirty="0"/>
-              <a:t/>
-            </a:r>
-            <a:br>
-              <a:rPr lang="en-GB" dirty="0"/>
-            </a:br>
-            <a:r>
-              <a:rPr lang="en-GB" dirty="0"/>
-              <a:t/>
-            </a:r>
-            <a:br>
-              <a:rPr lang="en-GB" dirty="0"/>
-            </a:br>
-            <a:endParaRPr lang="en-GB" dirty="0"/>
-          </a:p>
-        </p:txBody>
-      </p:sp>
+            <a:endParaRPr lang="en-GB"/>
+          </a:p>
+        </p:txBody>
+      </p:sp>
+      <p:pic>
+        <p:nvPicPr>
+          <p:cNvPr id="4" name="Picture 3"/>
+          <p:cNvPicPr>
+            <a:picLocks noChangeAspect="1"/>
+          </p:cNvPicPr>
+          <p:nvPr/>
+        </p:nvPicPr>
+        <p:blipFill>
+          <a:blip r:embed="rId2"/>
+          <a:stretch>
+            <a:fillRect/>
+          </a:stretch>
+        </p:blipFill>
+        <p:spPr>
+          <a:xfrm>
+            <a:off x="838200" y="2362200"/>
+            <a:ext cx="7896225" cy="3438525"/>
+          </a:xfrm>
+          <a:prstGeom prst="rect">
+            <a:avLst/>
+          </a:prstGeom>
+        </p:spPr>
+      </p:pic>
     </p:spTree>
     <p:extLst>
       <p:ext uri="{BB962C8B-B14F-4D97-AF65-F5344CB8AC3E}">
-        <p14:creationId xmlns:p14="http://schemas.microsoft.com/office/powerpoint/2010/main" xmlns="" val="1447592189"/>
+        <p14:creationId xmlns:p14="http://schemas.microsoft.com/office/powerpoint/2010/main" val="3143873876"/>
       </p:ext>
     </p:extLst>
   </p:cSld>
@@ -4849,10 +4866,9 @@
           <a:lstStyle/>
           <a:p>
             <a:r>
-              <a:rPr lang="en-GB" dirty="0" smtClean="0"/>
-              <a:t>Example</a:t>
-            </a:r>
-            <a:endParaRPr lang="en-GB" dirty="0"/>
+              <a:rPr lang="en-GB" dirty="0"/>
+              <a:t>Timing Diagrams</a:t>
+            </a:r>
           </a:p>
         </p:txBody>
       </p:sp>
@@ -4866,43 +4882,178 @@
             <p:ph idx="1"/>
           </p:nvPr>
         </p:nvSpPr>
-        <p:spPr/>
-        <p:txBody>
-          <a:bodyPr/>
-          <a:lstStyle/>
-          <a:p>
-            <a:endParaRPr lang="en-GB"/>
-          </a:p>
-        </p:txBody>
-      </p:sp>
-      <p:pic>
-        <p:nvPicPr>
-          <p:cNvPr id="4" name="Picture 3"/>
-          <p:cNvPicPr>
-            <a:picLocks noChangeAspect="1"/>
-          </p:cNvPicPr>
-          <p:nvPr/>
-        </p:nvPicPr>
-        <p:blipFill>
-          <a:blip r:embed="rId2"/>
-          <a:stretch>
-            <a:fillRect/>
-          </a:stretch>
-        </p:blipFill>
         <p:spPr>
           <a:xfrm>
-            <a:off x="2362200" y="1981200"/>
-            <a:ext cx="3924300" cy="4267200"/>
+            <a:off x="685800" y="1981200"/>
+            <a:ext cx="7772400" cy="4419600"/>
           </a:xfrm>
-          <a:prstGeom prst="rect">
-            <a:avLst/>
-          </a:prstGeom>
         </p:spPr>
-      </p:pic>
+        <p:txBody>
+          <a:bodyPr>
+            <a:normAutofit fontScale="70000" lnSpcReduction="20000"/>
+          </a:bodyPr>
+          <a:lstStyle/>
+          <a:p>
+            <a:r>
+              <a:rPr lang="en-GB" dirty="0"/>
+              <a:t>Package </a:t>
+            </a:r>
+            <a:r>
+              <a:rPr lang="en-GB" dirty="0" smtClean="0"/>
+              <a:t>Diagrams</a:t>
+            </a:r>
+            <a:endParaRPr lang="en-GB" dirty="0"/>
+          </a:p>
+          <a:p>
+            <a:r>
+              <a:rPr lang="en-GB" dirty="0"/>
+              <a:t>Component </a:t>
+            </a:r>
+            <a:r>
+              <a:rPr lang="en-GB" dirty="0" smtClean="0"/>
+              <a:t>Diagrams</a:t>
+            </a:r>
+            <a:endParaRPr lang="en-GB" dirty="0"/>
+          </a:p>
+          <a:p>
+            <a:r>
+              <a:rPr lang="en-GB" dirty="0"/>
+              <a:t>Deployment </a:t>
+            </a:r>
+            <a:r>
+              <a:rPr lang="en-GB" dirty="0" smtClean="0"/>
+              <a:t>Diagrams</a:t>
+            </a:r>
+            <a:endParaRPr lang="en-GB" dirty="0"/>
+          </a:p>
+          <a:p>
+            <a:r>
+              <a:rPr lang="en-GB" dirty="0"/>
+              <a:t>Use </a:t>
+            </a:r>
+            <a:r>
+              <a:rPr lang="en-GB" dirty="0" smtClean="0"/>
+              <a:t>Case Diagrams</a:t>
+            </a:r>
+            <a:endParaRPr lang="en-GB" dirty="0"/>
+          </a:p>
+          <a:p>
+            <a:r>
+              <a:rPr lang="en-GB" dirty="0"/>
+              <a:t>Activity </a:t>
+            </a:r>
+            <a:r>
+              <a:rPr lang="en-GB" dirty="0" smtClean="0"/>
+              <a:t>Diagrams</a:t>
+            </a:r>
+            <a:endParaRPr lang="en-GB" dirty="0"/>
+          </a:p>
+          <a:p>
+            <a:r>
+              <a:rPr lang="en-GB" dirty="0"/>
+              <a:t>Class </a:t>
+            </a:r>
+            <a:r>
+              <a:rPr lang="en-GB" dirty="0" smtClean="0"/>
+              <a:t>Diagrams</a:t>
+            </a:r>
+            <a:endParaRPr lang="en-GB" dirty="0"/>
+          </a:p>
+          <a:p>
+            <a:r>
+              <a:rPr lang="en-GB" dirty="0"/>
+              <a:t>Sequence </a:t>
+            </a:r>
+            <a:r>
+              <a:rPr lang="en-GB" dirty="0" smtClean="0"/>
+              <a:t>Diagrams</a:t>
+            </a:r>
+            <a:endParaRPr lang="en-GB" dirty="0"/>
+          </a:p>
+          <a:p>
+            <a:r>
+              <a:rPr lang="en-GB" dirty="0"/>
+              <a:t>Interaction </a:t>
+            </a:r>
+            <a:r>
+              <a:rPr lang="en-GB" dirty="0" smtClean="0"/>
+              <a:t>Overview Diagrams</a:t>
+            </a:r>
+            <a:endParaRPr lang="en-GB" dirty="0"/>
+          </a:p>
+          <a:p>
+            <a:r>
+              <a:rPr lang="en-GB" dirty="0"/>
+              <a:t>Composite </a:t>
+            </a:r>
+            <a:r>
+              <a:rPr lang="en-GB" dirty="0" smtClean="0"/>
+              <a:t>Structure Diagrams</a:t>
+            </a:r>
+            <a:endParaRPr lang="en-GB" dirty="0"/>
+          </a:p>
+          <a:p>
+            <a:r>
+              <a:rPr lang="en-GB" dirty="0"/>
+              <a:t>State </a:t>
+            </a:r>
+            <a:r>
+              <a:rPr lang="en-GB" dirty="0" smtClean="0"/>
+              <a:t>Machine Diagrams</a:t>
+            </a:r>
+            <a:endParaRPr lang="en-GB" dirty="0"/>
+          </a:p>
+          <a:p>
+            <a:r>
+              <a:rPr lang="en-GB" b="1" dirty="0">
+                <a:solidFill>
+                  <a:srgbClr val="FF0000"/>
+                </a:solidFill>
+              </a:rPr>
+              <a:t>Timing </a:t>
+            </a:r>
+            <a:r>
+              <a:rPr lang="en-GB" b="1" dirty="0" smtClean="0">
+                <a:solidFill>
+                  <a:srgbClr val="FF0000"/>
+                </a:solidFill>
+              </a:rPr>
+              <a:t>Diagrams</a:t>
+            </a:r>
+            <a:endParaRPr lang="en-GB" b="1" dirty="0">
+              <a:solidFill>
+                <a:srgbClr val="FF0000"/>
+              </a:solidFill>
+            </a:endParaRPr>
+          </a:p>
+          <a:p>
+            <a:r>
+              <a:rPr lang="en-GB" dirty="0"/>
+              <a:t>Object </a:t>
+            </a:r>
+            <a:r>
+              <a:rPr lang="en-GB" dirty="0" smtClean="0"/>
+              <a:t>Diagrams</a:t>
+            </a:r>
+            <a:endParaRPr lang="en-GB" dirty="0"/>
+          </a:p>
+          <a:p>
+            <a:r>
+              <a:rPr lang="en-GB" dirty="0"/>
+              <a:t>Communication </a:t>
+            </a:r>
+            <a:r>
+              <a:rPr lang="en-GB" dirty="0" smtClean="0"/>
+              <a:t>Diagrams</a:t>
+            </a:r>
+            <a:endParaRPr lang="en-GB" dirty="0"/>
+          </a:p>
+        </p:txBody>
+      </p:sp>
     </p:spTree>
     <p:extLst>
       <p:ext uri="{BB962C8B-B14F-4D97-AF65-F5344CB8AC3E}">
-        <p14:creationId xmlns:p14="http://schemas.microsoft.com/office/powerpoint/2010/main" xmlns="" val="3843290255"/>
+        <p14:creationId xmlns:p14="http://schemas.microsoft.com/office/powerpoint/2010/main" val="1121814747"/>
       </p:ext>
     </p:extLst>
   </p:cSld>
@@ -4952,9 +5103,10 @@
           <a:lstStyle/>
           <a:p>
             <a:r>
-              <a:rPr lang="en-GB" dirty="0"/>
-              <a:t>Object Diagrams</a:t>
-            </a:r>
+              <a:rPr lang="en-GB" dirty="0" smtClean="0"/>
+              <a:t>Timing Diagrams</a:t>
+            </a:r>
+            <a:endParaRPr lang="en-GB" dirty="0"/>
           </a:p>
         </p:txBody>
       </p:sp>
@@ -4968,170 +5120,55 @@
             <p:ph idx="1"/>
           </p:nvPr>
         </p:nvSpPr>
-        <p:spPr>
-          <a:xfrm>
-            <a:off x="685800" y="1981200"/>
-            <a:ext cx="7772400" cy="4419600"/>
-          </a:xfrm>
-        </p:spPr>
-        <p:txBody>
-          <a:bodyPr>
-            <a:normAutofit fontScale="70000" lnSpcReduction="20000"/>
-          </a:bodyPr>
+        <p:spPr/>
+        <p:txBody>
+          <a:bodyPr/>
           <a:lstStyle/>
           <a:p>
             <a:r>
               <a:rPr lang="en-GB" dirty="0"/>
-              <a:t>Package </a:t>
-            </a:r>
-            <a:r>
-              <a:rPr lang="en-GB" dirty="0" smtClean="0"/>
-              <a:t>Diagrams</a:t>
-            </a:r>
-            <a:endParaRPr lang="en-GB" dirty="0"/>
-          </a:p>
-          <a:p>
-            <a:r>
-              <a:rPr lang="en-GB" dirty="0"/>
-              <a:t>Component </a:t>
-            </a:r>
-            <a:r>
-              <a:rPr lang="en-GB" dirty="0" smtClean="0"/>
-              <a:t>Diagrams</a:t>
-            </a:r>
-            <a:endParaRPr lang="en-GB" dirty="0"/>
-          </a:p>
-          <a:p>
-            <a:r>
-              <a:rPr lang="en-GB" dirty="0"/>
-              <a:t>Deployment </a:t>
-            </a:r>
-            <a:r>
-              <a:rPr lang="en-GB" dirty="0" smtClean="0"/>
-              <a:t>Diagrams</a:t>
-            </a:r>
-            <a:endParaRPr lang="en-GB" dirty="0"/>
-          </a:p>
-          <a:p>
-            <a:r>
-              <a:rPr lang="en-GB" dirty="0"/>
-              <a:t>Use </a:t>
-            </a:r>
-            <a:r>
-              <a:rPr lang="en-GB" dirty="0" smtClean="0"/>
-              <a:t>Case Diagrams</a:t>
-            </a:r>
-            <a:endParaRPr lang="en-GB" dirty="0"/>
-          </a:p>
-          <a:p>
-            <a:r>
-              <a:rPr lang="en-GB" dirty="0"/>
-              <a:t>Activity </a:t>
-            </a:r>
-            <a:r>
-              <a:rPr lang="en-GB" dirty="0" smtClean="0"/>
-              <a:t>Diagrams</a:t>
-            </a:r>
-            <a:endParaRPr lang="en-GB" dirty="0"/>
-          </a:p>
-          <a:p>
-            <a:r>
-              <a:rPr lang="en-GB" dirty="0"/>
-              <a:t>Class </a:t>
-            </a:r>
-            <a:r>
-              <a:rPr lang="en-GB" dirty="0" smtClean="0"/>
-              <a:t>Diagrams</a:t>
-            </a:r>
-            <a:endParaRPr lang="en-GB" dirty="0"/>
-          </a:p>
-          <a:p>
-            <a:r>
-              <a:rPr lang="en-GB" dirty="0"/>
-              <a:t>Sequence </a:t>
-            </a:r>
-            <a:r>
-              <a:rPr lang="en-GB" dirty="0" smtClean="0"/>
-              <a:t>Diagrams</a:t>
-            </a:r>
-            <a:endParaRPr lang="en-GB" dirty="0"/>
-          </a:p>
-          <a:p>
-            <a:r>
-              <a:rPr lang="en-GB" dirty="0"/>
-              <a:t>Interaction </a:t>
-            </a:r>
-            <a:r>
-              <a:rPr lang="en-GB" dirty="0" smtClean="0"/>
-              <a:t>Overview Diagrams</a:t>
-            </a:r>
-            <a:endParaRPr lang="en-GB" dirty="0"/>
-          </a:p>
-          <a:p>
-            <a:r>
-              <a:rPr lang="en-GB" dirty="0"/>
-              <a:t>Composite </a:t>
-            </a:r>
-            <a:r>
-              <a:rPr lang="en-GB" dirty="0" smtClean="0"/>
-              <a:t>Structure Diagrams</a:t>
-            </a:r>
-            <a:endParaRPr lang="en-GB" dirty="0"/>
-          </a:p>
-          <a:p>
-            <a:r>
-              <a:rPr lang="en-GB" dirty="0"/>
-              <a:t>State </a:t>
-            </a:r>
-            <a:r>
-              <a:rPr lang="en-GB" dirty="0" smtClean="0"/>
-              <a:t>Machine Diagrams</a:t>
-            </a:r>
-            <a:endParaRPr lang="en-GB" dirty="0"/>
-          </a:p>
-          <a:p>
-            <a:r>
-              <a:rPr lang="en-GB" dirty="0"/>
-              <a:t>Timing </a:t>
-            </a:r>
-            <a:r>
-              <a:rPr lang="en-GB" dirty="0" smtClean="0"/>
-              <a:t>Diagrams</a:t>
-            </a:r>
-            <a:endParaRPr lang="en-GB" dirty="0"/>
-          </a:p>
-          <a:p>
-            <a:r>
-              <a:rPr lang="en-GB" b="1" dirty="0">
-                <a:solidFill>
-                  <a:srgbClr val="FF0000"/>
-                </a:solidFill>
-              </a:rPr>
-              <a:t>Object </a:t>
-            </a:r>
-            <a:r>
-              <a:rPr lang="en-GB" b="1" dirty="0" smtClean="0">
-                <a:solidFill>
-                  <a:srgbClr val="FF0000"/>
-                </a:solidFill>
-              </a:rPr>
-              <a:t>Diagrams</a:t>
-            </a:r>
-            <a:endParaRPr lang="en-GB" b="1" dirty="0">
-              <a:solidFill>
-                <a:srgbClr val="FF0000"/>
-              </a:solidFill>
-            </a:endParaRPr>
-          </a:p>
-          <a:p>
-            <a:r>
-              <a:rPr lang="en-GB" dirty="0"/>
-              <a:t>Communication </a:t>
-            </a:r>
-            <a:r>
-              <a:rPr lang="en-GB" dirty="0" smtClean="0"/>
-              <a:t>Diagrams</a:t>
-            </a:r>
+              <a:t>Timing diagrams are a type of interaction </a:t>
+            </a:r>
+            <a:r>
+              <a:rPr lang="en-GB" dirty="0" smtClean="0"/>
+              <a:t>diagram</a:t>
+            </a:r>
+          </a:p>
+          <a:p>
+            <a:r>
+              <a:rPr lang="en-GB" dirty="0" smtClean="0"/>
+              <a:t>Their </a:t>
+            </a:r>
+            <a:r>
+              <a:rPr lang="en-GB" dirty="0"/>
+              <a:t>purpose is to show </a:t>
+            </a:r>
+            <a:r>
+              <a:rPr lang="en-GB" dirty="0" smtClean="0"/>
+              <a:t>how the </a:t>
+            </a:r>
+            <a:r>
+              <a:rPr lang="en-GB" dirty="0"/>
+              <a:t>states of an element or elements change over time and how events </a:t>
+            </a:r>
+            <a:r>
+              <a:rPr lang="en-GB" dirty="0" smtClean="0"/>
+              <a:t>change those states</a:t>
+            </a:r>
+            <a:r>
+              <a:rPr lang="en-GB" dirty="0"/>
+              <a:t/>
+            </a:r>
+            <a:br>
+              <a:rPr lang="en-GB" dirty="0"/>
+            </a:br>
+            <a:r>
+              <a:rPr lang="en-GB" dirty="0"/>
+              <a:t/>
+            </a:r>
+            <a:br>
+              <a:rPr lang="en-GB" dirty="0"/>
+            </a:br>
             <a:endParaRPr lang="en-GB" dirty="0"/>
           </a:p>
         </p:txBody>
@@ -5139,7 +5176,7 @@
     </p:spTree>
     <p:extLst>
       <p:ext uri="{BB962C8B-B14F-4D97-AF65-F5344CB8AC3E}">
-        <p14:creationId xmlns:p14="http://schemas.microsoft.com/office/powerpoint/2010/main" xmlns="" val="2036547419"/>
+        <p14:creationId xmlns:p14="http://schemas.microsoft.com/office/powerpoint/2010/main" val="1447592189"/>
       </p:ext>
     </p:extLst>
   </p:cSld>
@@ -5190,7 +5227,7 @@
           <a:p>
             <a:r>
               <a:rPr lang="en-GB" dirty="0" smtClean="0"/>
-              <a:t>Object Diagram</a:t>
+              <a:t>Example</a:t>
             </a:r>
             <a:endParaRPr lang="en-GB" dirty="0"/>
           </a:p>
@@ -5211,58 +5248,38 @@
           <a:bodyPr/>
           <a:lstStyle/>
           <a:p>
-            <a:r>
-              <a:rPr lang="en-GB" dirty="0"/>
-              <a:t>An object diagram is used to show the existence of objects and their </a:t>
-            </a:r>
-            <a:r>
-              <a:rPr lang="en-GB" dirty="0" smtClean="0"/>
-              <a:t>relationships in </a:t>
-            </a:r>
-            <a:r>
-              <a:rPr lang="en-GB" dirty="0"/>
-              <a:t>the logical design of a </a:t>
-            </a:r>
-            <a:r>
-              <a:rPr lang="en-GB" dirty="0" smtClean="0"/>
-              <a:t>system </a:t>
-            </a:r>
-          </a:p>
-          <a:p>
-            <a:r>
-              <a:rPr lang="en-GB" dirty="0" smtClean="0"/>
-              <a:t>Stated </a:t>
-            </a:r>
-            <a:r>
-              <a:rPr lang="en-GB" dirty="0"/>
-              <a:t>another way, an object diagram represents a snapshot in time of an otherwise transitory stream of events over a </a:t>
-            </a:r>
-            <a:r>
-              <a:rPr lang="en-GB" dirty="0" smtClean="0"/>
-              <a:t>certain configuration </a:t>
-            </a:r>
-            <a:r>
-              <a:rPr lang="en-GB" dirty="0"/>
-              <a:t>of objects. </a:t>
-            </a:r>
-            <a:br>
-              <a:rPr lang="en-GB" dirty="0"/>
-            </a:br>
-            <a:r>
-              <a:rPr lang="en-GB" dirty="0"/>
-              <a:t/>
-            </a:r>
-            <a:br>
-              <a:rPr lang="en-GB" dirty="0"/>
-            </a:br>
-            <a:endParaRPr lang="en-GB" dirty="0"/>
-          </a:p>
-        </p:txBody>
-      </p:sp>
+            <a:endParaRPr lang="en-GB"/>
+          </a:p>
+        </p:txBody>
+      </p:sp>
+      <p:pic>
+        <p:nvPicPr>
+          <p:cNvPr id="4" name="Picture 3"/>
+          <p:cNvPicPr>
+            <a:picLocks noChangeAspect="1"/>
+          </p:cNvPicPr>
+          <p:nvPr/>
+        </p:nvPicPr>
+        <p:blipFill>
+          <a:blip r:embed="rId2"/>
+          <a:stretch>
+            <a:fillRect/>
+          </a:stretch>
+        </p:blipFill>
+        <p:spPr>
+          <a:xfrm>
+            <a:off x="2362200" y="1981200"/>
+            <a:ext cx="3924300" cy="4267200"/>
+          </a:xfrm>
+          <a:prstGeom prst="rect">
+            <a:avLst/>
+          </a:prstGeom>
+        </p:spPr>
+      </p:pic>
     </p:spTree>
     <p:extLst>
       <p:ext uri="{BB962C8B-B14F-4D97-AF65-F5344CB8AC3E}">
-        <p14:creationId xmlns:p14="http://schemas.microsoft.com/office/powerpoint/2010/main" xmlns="" val="4066592543"/>
+        <p14:creationId xmlns:p14="http://schemas.microsoft.com/office/powerpoint/2010/main" val="3843290255"/>
       </p:ext>
     </p:extLst>
   </p:cSld>
@@ -5306,71 +5323,200 @@
             <p:ph type="title"/>
           </p:nvPr>
         </p:nvSpPr>
+        <p:spPr/>
+        <p:txBody>
+          <a:bodyPr/>
+          <a:lstStyle/>
+          <a:p>
+            <a:r>
+              <a:rPr lang="en-GB" dirty="0"/>
+              <a:t>Object Diagrams</a:t>
+            </a:r>
+          </a:p>
+        </p:txBody>
+      </p:sp>
+      <p:sp>
+        <p:nvSpPr>
+          <p:cNvPr id="3" name="Content Placeholder 2"/>
+          <p:cNvSpPr>
+            <a:spLocks noGrp="1"/>
+          </p:cNvSpPr>
+          <p:nvPr>
+            <p:ph idx="1"/>
+          </p:nvPr>
+        </p:nvSpPr>
         <p:spPr>
           <a:xfrm>
-            <a:off x="685800" y="387879"/>
-            <a:ext cx="7772400" cy="1143000"/>
+            <a:off x="685800" y="1981200"/>
+            <a:ext cx="7772400" cy="4419600"/>
           </a:xfrm>
         </p:spPr>
         <p:txBody>
-          <a:bodyPr/>
+          <a:bodyPr>
+            <a:normAutofit fontScale="70000" lnSpcReduction="20000"/>
+          </a:bodyPr>
           <a:lstStyle/>
           <a:p>
             <a:r>
-              <a:rPr lang="en-GB" dirty="0" smtClean="0"/>
-              <a:t>Example</a:t>
-            </a:r>
-            <a:endParaRPr lang="en-GB" dirty="0"/>
-          </a:p>
-        </p:txBody>
-      </p:sp>
-      <p:sp>
-        <p:nvSpPr>
-          <p:cNvPr id="3" name="Content Placeholder 2"/>
-          <p:cNvSpPr>
-            <a:spLocks noGrp="1"/>
-          </p:cNvSpPr>
-          <p:nvPr>
-            <p:ph idx="1"/>
-          </p:nvPr>
-        </p:nvSpPr>
-        <p:spPr/>
-        <p:txBody>
-          <a:bodyPr/>
-          <a:lstStyle/>
-          <a:p>
-            <a:endParaRPr lang="en-GB"/>
-          </a:p>
-        </p:txBody>
-      </p:sp>
-      <p:pic>
-        <p:nvPicPr>
-          <p:cNvPr id="4" name="Picture 3"/>
-          <p:cNvPicPr>
-            <a:picLocks noChangeAspect="1"/>
-          </p:cNvPicPr>
-          <p:nvPr/>
-        </p:nvPicPr>
-        <p:blipFill>
-          <a:blip r:embed="rId2"/>
-          <a:stretch>
-            <a:fillRect/>
-          </a:stretch>
-        </p:blipFill>
-        <p:spPr>
-          <a:xfrm>
-            <a:off x="1790700" y="1547812"/>
-            <a:ext cx="5562600" cy="4981575"/>
-          </a:xfrm>
-          <a:prstGeom prst="rect">
-            <a:avLst/>
-          </a:prstGeom>
-        </p:spPr>
-      </p:pic>
+              <a:rPr lang="en-GB" dirty="0"/>
+              <a:t>Package </a:t>
+            </a:r>
+            <a:r>
+              <a:rPr lang="en-GB" dirty="0" smtClean="0"/>
+              <a:t>Diagrams</a:t>
+            </a:r>
+            <a:endParaRPr lang="en-GB" dirty="0"/>
+          </a:p>
+          <a:p>
+            <a:r>
+              <a:rPr lang="en-GB" dirty="0"/>
+              <a:t>Component </a:t>
+            </a:r>
+            <a:r>
+              <a:rPr lang="en-GB" dirty="0" smtClean="0"/>
+              <a:t>Diagrams</a:t>
+            </a:r>
+            <a:endParaRPr lang="en-GB" dirty="0"/>
+          </a:p>
+          <a:p>
+            <a:r>
+              <a:rPr lang="en-GB" dirty="0"/>
+              <a:t>Deployment </a:t>
+            </a:r>
+            <a:r>
+              <a:rPr lang="en-GB" dirty="0" smtClean="0"/>
+              <a:t>Diagrams</a:t>
+            </a:r>
+            <a:endParaRPr lang="en-GB" dirty="0"/>
+          </a:p>
+          <a:p>
+            <a:r>
+              <a:rPr lang="en-GB" dirty="0"/>
+              <a:t>Use </a:t>
+            </a:r>
+            <a:r>
+              <a:rPr lang="en-GB" dirty="0" smtClean="0"/>
+              <a:t>Case Diagrams</a:t>
+            </a:r>
+            <a:endParaRPr lang="en-GB" dirty="0"/>
+          </a:p>
+          <a:p>
+            <a:r>
+              <a:rPr lang="en-GB" dirty="0"/>
+              <a:t>Activity </a:t>
+            </a:r>
+            <a:r>
+              <a:rPr lang="en-GB" dirty="0" smtClean="0"/>
+              <a:t>Diagrams</a:t>
+            </a:r>
+            <a:endParaRPr lang="en-GB" dirty="0"/>
+          </a:p>
+          <a:p>
+            <a:r>
+              <a:rPr lang="en-GB" dirty="0"/>
+              <a:t>Class </a:t>
+            </a:r>
+            <a:r>
+              <a:rPr lang="en-GB" dirty="0" smtClean="0"/>
+              <a:t>Diagrams</a:t>
+            </a:r>
+            <a:endParaRPr lang="en-GB" dirty="0"/>
+          </a:p>
+          <a:p>
+            <a:r>
+              <a:rPr lang="en-GB" dirty="0"/>
+              <a:t>Sequence </a:t>
+            </a:r>
+            <a:r>
+              <a:rPr lang="en-GB" dirty="0" smtClean="0"/>
+              <a:t>Diagrams</a:t>
+            </a:r>
+            <a:endParaRPr lang="en-GB" dirty="0"/>
+          </a:p>
+          <a:p>
+            <a:r>
+              <a:rPr lang="en-GB" dirty="0"/>
+              <a:t>Interaction </a:t>
+            </a:r>
+            <a:r>
+              <a:rPr lang="en-GB" dirty="0" smtClean="0"/>
+              <a:t>Overview Diagrams</a:t>
+            </a:r>
+            <a:endParaRPr lang="en-GB" dirty="0"/>
+          </a:p>
+          <a:p>
+            <a:r>
+              <a:rPr lang="en-GB" dirty="0"/>
+              <a:t>Composite </a:t>
+            </a:r>
+            <a:r>
+              <a:rPr lang="en-GB" dirty="0" smtClean="0"/>
+              <a:t>Structure Diagrams</a:t>
+            </a:r>
+            <a:endParaRPr lang="en-GB" dirty="0"/>
+          </a:p>
+          <a:p>
+            <a:r>
+              <a:rPr lang="en-GB" dirty="0"/>
+              <a:t>State </a:t>
+            </a:r>
+            <a:r>
+              <a:rPr lang="en-GB" dirty="0" smtClean="0"/>
+              <a:t>Machine Diagrams</a:t>
+            </a:r>
+            <a:endParaRPr lang="en-GB" dirty="0"/>
+          </a:p>
+          <a:p>
+            <a:r>
+              <a:rPr lang="en-GB" dirty="0"/>
+              <a:t>Timing </a:t>
+            </a:r>
+            <a:r>
+              <a:rPr lang="en-GB" dirty="0" smtClean="0"/>
+              <a:t>Diagrams</a:t>
+            </a:r>
+            <a:endParaRPr lang="en-GB" dirty="0"/>
+          </a:p>
+          <a:p>
+            <a:r>
+              <a:rPr lang="en-GB" b="1" dirty="0">
+                <a:solidFill>
+                  <a:srgbClr val="FF0000"/>
+                </a:solidFill>
+              </a:rPr>
+              <a:t>Object </a:t>
+            </a:r>
+            <a:r>
+              <a:rPr lang="en-GB" b="1" dirty="0" smtClean="0">
+                <a:solidFill>
+                  <a:srgbClr val="FF0000"/>
+                </a:solidFill>
+              </a:rPr>
+              <a:t>Diagrams</a:t>
+            </a:r>
+            <a:endParaRPr lang="en-GB" b="1" dirty="0">
+              <a:solidFill>
+                <a:srgbClr val="FF0000"/>
+              </a:solidFill>
+            </a:endParaRPr>
+          </a:p>
+          <a:p>
+            <a:r>
+              <a:rPr lang="en-GB" dirty="0"/>
+              <a:t>Communication </a:t>
+            </a:r>
+            <a:r>
+              <a:rPr lang="en-GB" dirty="0" smtClean="0"/>
+              <a:t>Diagrams</a:t>
+            </a:r>
+            <a:endParaRPr lang="en-GB" dirty="0"/>
+          </a:p>
+        </p:txBody>
+      </p:sp>
     </p:spTree>
     <p:extLst>
       <p:ext uri="{BB962C8B-B14F-4D97-AF65-F5344CB8AC3E}">
-        <p14:creationId xmlns:p14="http://schemas.microsoft.com/office/powerpoint/2010/main" xmlns="" val="2033297992"/>
+        <p14:creationId xmlns:p14="http://schemas.microsoft.com/office/powerpoint/2010/main" val="2036547419"/>
       </p:ext>
     </p:extLst>
   </p:cSld>
@@ -5473,7 +5619,6 @@
               <a:rPr lang="en-GB" b="1" dirty="0" smtClean="0"/>
               <a:t>Continue UML Diagram Types</a:t>
             </a:r>
-            <a:endParaRPr lang="en-GB" b="1" dirty="0" smtClean="0"/>
           </a:p>
           <a:p>
             <a:pPr eaLnBrk="1" hangingPunct="1"/>
@@ -5544,9 +5689,10 @@
           <a:lstStyle/>
           <a:p>
             <a:r>
-              <a:rPr lang="en-GB" dirty="0"/>
-              <a:t>Communication Diagrams</a:t>
-            </a:r>
+              <a:rPr lang="en-GB" dirty="0" smtClean="0"/>
+              <a:t>Object Diagram</a:t>
+            </a:r>
+            <a:endParaRPr lang="en-GB" dirty="0"/>
           </a:p>
         </p:txBody>
       </p:sp>
@@ -5560,178 +5706,63 @@
             <p:ph idx="1"/>
           </p:nvPr>
         </p:nvSpPr>
-        <p:spPr>
-          <a:xfrm>
-            <a:off x="685800" y="1981200"/>
-            <a:ext cx="7772400" cy="4419600"/>
-          </a:xfrm>
-        </p:spPr>
-        <p:txBody>
-          <a:bodyPr>
-            <a:normAutofit fontScale="70000" lnSpcReduction="20000"/>
-          </a:bodyPr>
+        <p:spPr/>
+        <p:txBody>
+          <a:bodyPr/>
           <a:lstStyle/>
           <a:p>
             <a:r>
               <a:rPr lang="en-GB" dirty="0"/>
-              <a:t>Package </a:t>
-            </a:r>
-            <a:r>
-              <a:rPr lang="en-GB" dirty="0" smtClean="0"/>
-              <a:t>Diagrams</a:t>
-            </a:r>
-            <a:endParaRPr lang="en-GB" dirty="0"/>
-          </a:p>
-          <a:p>
-            <a:r>
-              <a:rPr lang="en-GB" dirty="0"/>
-              <a:t>Component </a:t>
-            </a:r>
-            <a:r>
-              <a:rPr lang="en-GB" dirty="0" smtClean="0"/>
-              <a:t>Diagrams</a:t>
-            </a:r>
-            <a:endParaRPr lang="en-GB" dirty="0"/>
-          </a:p>
-          <a:p>
-            <a:r>
-              <a:rPr lang="en-GB" dirty="0"/>
-              <a:t>Deployment </a:t>
-            </a:r>
-            <a:r>
-              <a:rPr lang="en-GB" dirty="0" smtClean="0"/>
-              <a:t>Diagrams</a:t>
-            </a:r>
-            <a:endParaRPr lang="en-GB" dirty="0"/>
-          </a:p>
-          <a:p>
-            <a:r>
-              <a:rPr lang="en-GB" dirty="0"/>
-              <a:t>Use </a:t>
-            </a:r>
-            <a:r>
-              <a:rPr lang="en-GB" dirty="0" smtClean="0"/>
-              <a:t>Case Diagrams</a:t>
-            </a:r>
-            <a:endParaRPr lang="en-GB" dirty="0"/>
-          </a:p>
-          <a:p>
-            <a:r>
-              <a:rPr lang="en-GB" dirty="0"/>
-              <a:t>Activity </a:t>
-            </a:r>
-            <a:r>
-              <a:rPr lang="en-GB" dirty="0" smtClean="0"/>
-              <a:t>Diagrams</a:t>
-            </a:r>
-            <a:endParaRPr lang="en-GB" dirty="0"/>
-          </a:p>
-          <a:p>
-            <a:r>
-              <a:rPr lang="en-GB" dirty="0"/>
-              <a:t>Class </a:t>
-            </a:r>
-            <a:r>
-              <a:rPr lang="en-GB" dirty="0" smtClean="0"/>
-              <a:t>Diagrams</a:t>
-            </a:r>
-            <a:endParaRPr lang="en-GB" dirty="0"/>
-          </a:p>
-          <a:p>
-            <a:r>
-              <a:rPr lang="en-GB" dirty="0"/>
-              <a:t>Sequence </a:t>
-            </a:r>
-            <a:r>
-              <a:rPr lang="en-GB" dirty="0" smtClean="0"/>
-              <a:t>Diagrams</a:t>
-            </a:r>
-            <a:endParaRPr lang="en-GB" dirty="0"/>
-          </a:p>
-          <a:p>
-            <a:r>
-              <a:rPr lang="en-GB" dirty="0"/>
-              <a:t>Interaction </a:t>
-            </a:r>
-            <a:r>
-              <a:rPr lang="en-GB" dirty="0" smtClean="0"/>
-              <a:t>Overview Diagrams</a:t>
-            </a:r>
-            <a:endParaRPr lang="en-GB" dirty="0"/>
-          </a:p>
-          <a:p>
-            <a:r>
-              <a:rPr lang="en-GB" dirty="0"/>
-              <a:t>Composite </a:t>
-            </a:r>
-            <a:r>
-              <a:rPr lang="en-GB" dirty="0" smtClean="0"/>
-              <a:t>Structure Diagrams</a:t>
-            </a:r>
-            <a:endParaRPr lang="en-GB" dirty="0"/>
-          </a:p>
-          <a:p>
-            <a:r>
-              <a:rPr lang="en-GB" dirty="0"/>
-              <a:t>State </a:t>
-            </a:r>
-            <a:r>
-              <a:rPr lang="en-GB" dirty="0" smtClean="0"/>
-              <a:t>Machine Diagrams</a:t>
-            </a:r>
-            <a:endParaRPr lang="en-GB" dirty="0"/>
-          </a:p>
-          <a:p>
-            <a:r>
-              <a:rPr lang="en-GB" dirty="0"/>
-              <a:t>Timing </a:t>
-            </a:r>
-            <a:r>
-              <a:rPr lang="en-GB" dirty="0" smtClean="0"/>
-              <a:t>Diagrams</a:t>
-            </a:r>
-            <a:endParaRPr lang="en-GB" dirty="0"/>
-          </a:p>
-          <a:p>
-            <a:r>
-              <a:rPr lang="en-GB" dirty="0"/>
-              <a:t>Object </a:t>
-            </a:r>
-            <a:r>
-              <a:rPr lang="en-GB" dirty="0" smtClean="0"/>
-              <a:t>Diagrams</a:t>
-            </a:r>
-            <a:endParaRPr lang="en-GB" dirty="0"/>
-          </a:p>
-          <a:p>
-            <a:r>
-              <a:rPr lang="en-GB" b="1" dirty="0">
-                <a:solidFill>
-                  <a:srgbClr val="FF0000"/>
-                </a:solidFill>
-              </a:rPr>
-              <a:t>Communication </a:t>
-            </a:r>
-            <a:r>
-              <a:rPr lang="en-GB" b="1" dirty="0" smtClean="0">
-                <a:solidFill>
-                  <a:srgbClr val="FF0000"/>
-                </a:solidFill>
-              </a:rPr>
-              <a:t>Diagrams</a:t>
-            </a:r>
-            <a:endParaRPr lang="en-GB" b="1" dirty="0">
-              <a:solidFill>
-                <a:srgbClr val="FF0000"/>
-              </a:solidFill>
-            </a:endParaRPr>
+              <a:t>An object diagram is used to show the existence of objects and their </a:t>
+            </a:r>
+            <a:r>
+              <a:rPr lang="en-GB" dirty="0" smtClean="0"/>
+              <a:t>relationships in </a:t>
+            </a:r>
+            <a:r>
+              <a:rPr lang="en-GB" dirty="0"/>
+              <a:t>the logical design of a </a:t>
+            </a:r>
+            <a:r>
+              <a:rPr lang="en-GB" dirty="0" smtClean="0"/>
+              <a:t>system </a:t>
+            </a:r>
+          </a:p>
+          <a:p>
+            <a:r>
+              <a:rPr lang="en-GB" dirty="0" smtClean="0"/>
+              <a:t>Stated </a:t>
+            </a:r>
+            <a:r>
+              <a:rPr lang="en-GB" dirty="0"/>
+              <a:t>another way, an object diagram represents a snapshot in time of an otherwise transitory stream of events over a </a:t>
+            </a:r>
+            <a:r>
+              <a:rPr lang="en-GB" dirty="0" smtClean="0"/>
+              <a:t>certain configuration </a:t>
+            </a:r>
+            <a:r>
+              <a:rPr lang="en-GB" dirty="0"/>
+              <a:t>of objects. </a:t>
+            </a:r>
+            <a:br>
+              <a:rPr lang="en-GB" dirty="0"/>
+            </a:br>
+            <a:r>
+              <a:rPr lang="en-GB" dirty="0"/>
+              <a:t/>
+            </a:r>
+            <a:br>
+              <a:rPr lang="en-GB" dirty="0"/>
+            </a:br>
+            <a:endParaRPr lang="en-GB" dirty="0"/>
           </a:p>
         </p:txBody>
       </p:sp>
     </p:spTree>
     <p:extLst>
       <p:ext uri="{BB962C8B-B14F-4D97-AF65-F5344CB8AC3E}">
-        <p14:creationId xmlns:p14="http://schemas.microsoft.com/office/powerpoint/2010/main" xmlns="" val="876791485"/>
+        <p14:creationId xmlns:p14="http://schemas.microsoft.com/office/powerpoint/2010/main" val="4066592543"/>
       </p:ext>
     </p:extLst>
   </p:cSld>
@@ -5775,14 +5806,19 @@
             <p:ph type="title"/>
           </p:nvPr>
         </p:nvSpPr>
-        <p:spPr/>
+        <p:spPr>
+          <a:xfrm>
+            <a:off x="685800" y="387879"/>
+            <a:ext cx="7772400" cy="1143000"/>
+          </a:xfrm>
+        </p:spPr>
         <p:txBody>
           <a:bodyPr/>
           <a:lstStyle/>
           <a:p>
             <a:r>
               <a:rPr lang="en-GB" dirty="0" smtClean="0"/>
-              <a:t>Communication Diagram</a:t>
+              <a:t>Example</a:t>
             </a:r>
             <a:endParaRPr lang="en-GB" dirty="0"/>
           </a:p>
@@ -5803,47 +5839,38 @@
           <a:bodyPr/>
           <a:lstStyle/>
           <a:p>
-            <a:r>
-              <a:rPr lang="en-GB" dirty="0" smtClean="0"/>
-              <a:t>A communication </a:t>
-            </a:r>
-            <a:r>
-              <a:rPr lang="en-GB" dirty="0"/>
-              <a:t>diagram is a type of interaction diagram that focuses on how</a:t>
-            </a:r>
-            <a:br>
-              <a:rPr lang="en-GB" dirty="0"/>
-            </a:br>
-            <a:r>
-              <a:rPr lang="en-GB" dirty="0"/>
-              <a:t>objects are linked and what messages they pass as they participate in a </a:t>
-            </a:r>
-            <a:r>
-              <a:rPr lang="en-GB" dirty="0" smtClean="0"/>
-              <a:t>specific interaction</a:t>
-            </a:r>
-            <a:r>
-              <a:rPr lang="en-GB" dirty="0"/>
-              <a:t/>
-            </a:r>
-            <a:br>
-              <a:rPr lang="en-GB" dirty="0"/>
-            </a:br>
-            <a:r>
-              <a:rPr lang="en-GB" dirty="0"/>
-              <a:t/>
-            </a:r>
-            <a:br>
-              <a:rPr lang="en-GB" dirty="0"/>
-            </a:br>
-            <a:endParaRPr lang="en-GB" dirty="0"/>
-          </a:p>
-        </p:txBody>
-      </p:sp>
+            <a:endParaRPr lang="en-GB"/>
+          </a:p>
+        </p:txBody>
+      </p:sp>
+      <p:pic>
+        <p:nvPicPr>
+          <p:cNvPr id="4" name="Picture 3"/>
+          <p:cNvPicPr>
+            <a:picLocks noChangeAspect="1"/>
+          </p:cNvPicPr>
+          <p:nvPr/>
+        </p:nvPicPr>
+        <p:blipFill>
+          <a:blip r:embed="rId2"/>
+          <a:stretch>
+            <a:fillRect/>
+          </a:stretch>
+        </p:blipFill>
+        <p:spPr>
+          <a:xfrm>
+            <a:off x="1790700" y="1547812"/>
+            <a:ext cx="5562600" cy="4981575"/>
+          </a:xfrm>
+          <a:prstGeom prst="rect">
+            <a:avLst/>
+          </a:prstGeom>
+        </p:spPr>
+      </p:pic>
     </p:spTree>
     <p:extLst>
       <p:ext uri="{BB962C8B-B14F-4D97-AF65-F5344CB8AC3E}">
-        <p14:creationId xmlns:p14="http://schemas.microsoft.com/office/powerpoint/2010/main" xmlns="" val="1012127932"/>
+        <p14:creationId xmlns:p14="http://schemas.microsoft.com/office/powerpoint/2010/main" val="2033297992"/>
       </p:ext>
     </p:extLst>
   </p:cSld>
@@ -5887,71 +5914,200 @@
             <p:ph type="title"/>
           </p:nvPr>
         </p:nvSpPr>
+        <p:spPr/>
+        <p:txBody>
+          <a:bodyPr/>
+          <a:lstStyle/>
+          <a:p>
+            <a:r>
+              <a:rPr lang="en-GB" dirty="0"/>
+              <a:t>Communication Diagrams</a:t>
+            </a:r>
+          </a:p>
+        </p:txBody>
+      </p:sp>
+      <p:sp>
+        <p:nvSpPr>
+          <p:cNvPr id="3" name="Content Placeholder 2"/>
+          <p:cNvSpPr>
+            <a:spLocks noGrp="1"/>
+          </p:cNvSpPr>
+          <p:nvPr>
+            <p:ph idx="1"/>
+          </p:nvPr>
+        </p:nvSpPr>
         <p:spPr>
           <a:xfrm>
-            <a:off x="533400" y="0"/>
-            <a:ext cx="7772400" cy="1143000"/>
+            <a:off x="685800" y="1981200"/>
+            <a:ext cx="7772400" cy="4419600"/>
           </a:xfrm>
         </p:spPr>
         <p:txBody>
-          <a:bodyPr/>
+          <a:bodyPr>
+            <a:normAutofit fontScale="70000" lnSpcReduction="20000"/>
+          </a:bodyPr>
           <a:lstStyle/>
           <a:p>
             <a:r>
-              <a:rPr lang="en-GB" dirty="0" smtClean="0"/>
-              <a:t>Example</a:t>
-            </a:r>
-            <a:endParaRPr lang="en-GB" dirty="0"/>
-          </a:p>
-        </p:txBody>
-      </p:sp>
-      <p:sp>
-        <p:nvSpPr>
-          <p:cNvPr id="3" name="Content Placeholder 2"/>
-          <p:cNvSpPr>
-            <a:spLocks noGrp="1"/>
-          </p:cNvSpPr>
-          <p:nvPr>
-            <p:ph idx="1"/>
-          </p:nvPr>
-        </p:nvSpPr>
-        <p:spPr/>
-        <p:txBody>
-          <a:bodyPr/>
-          <a:lstStyle/>
-          <a:p>
-            <a:endParaRPr lang="en-GB"/>
-          </a:p>
-        </p:txBody>
-      </p:sp>
-      <p:pic>
-        <p:nvPicPr>
-          <p:cNvPr id="4" name="Picture 3"/>
-          <p:cNvPicPr>
-            <a:picLocks noChangeAspect="1"/>
-          </p:cNvPicPr>
-          <p:nvPr/>
-        </p:nvPicPr>
-        <p:blipFill>
-          <a:blip r:embed="rId2"/>
-          <a:stretch>
-            <a:fillRect/>
-          </a:stretch>
-        </p:blipFill>
-        <p:spPr>
-          <a:xfrm>
-            <a:off x="1981200" y="1447800"/>
-            <a:ext cx="5019675" cy="4972050"/>
-          </a:xfrm>
-          <a:prstGeom prst="rect">
-            <a:avLst/>
-          </a:prstGeom>
-        </p:spPr>
-      </p:pic>
+              <a:rPr lang="en-GB" dirty="0"/>
+              <a:t>Package </a:t>
+            </a:r>
+            <a:r>
+              <a:rPr lang="en-GB" dirty="0" smtClean="0"/>
+              <a:t>Diagrams</a:t>
+            </a:r>
+            <a:endParaRPr lang="en-GB" dirty="0"/>
+          </a:p>
+          <a:p>
+            <a:r>
+              <a:rPr lang="en-GB" dirty="0"/>
+              <a:t>Component </a:t>
+            </a:r>
+            <a:r>
+              <a:rPr lang="en-GB" dirty="0" smtClean="0"/>
+              <a:t>Diagrams</a:t>
+            </a:r>
+            <a:endParaRPr lang="en-GB" dirty="0"/>
+          </a:p>
+          <a:p>
+            <a:r>
+              <a:rPr lang="en-GB" dirty="0"/>
+              <a:t>Deployment </a:t>
+            </a:r>
+            <a:r>
+              <a:rPr lang="en-GB" dirty="0" smtClean="0"/>
+              <a:t>Diagrams</a:t>
+            </a:r>
+            <a:endParaRPr lang="en-GB" dirty="0"/>
+          </a:p>
+          <a:p>
+            <a:r>
+              <a:rPr lang="en-GB" dirty="0"/>
+              <a:t>Use </a:t>
+            </a:r>
+            <a:r>
+              <a:rPr lang="en-GB" dirty="0" smtClean="0"/>
+              <a:t>Case Diagrams</a:t>
+            </a:r>
+            <a:endParaRPr lang="en-GB" dirty="0"/>
+          </a:p>
+          <a:p>
+            <a:r>
+              <a:rPr lang="en-GB" dirty="0"/>
+              <a:t>Activity </a:t>
+            </a:r>
+            <a:r>
+              <a:rPr lang="en-GB" dirty="0" smtClean="0"/>
+              <a:t>Diagrams</a:t>
+            </a:r>
+            <a:endParaRPr lang="en-GB" dirty="0"/>
+          </a:p>
+          <a:p>
+            <a:r>
+              <a:rPr lang="en-GB" dirty="0"/>
+              <a:t>Class </a:t>
+            </a:r>
+            <a:r>
+              <a:rPr lang="en-GB" dirty="0" smtClean="0"/>
+              <a:t>Diagrams</a:t>
+            </a:r>
+            <a:endParaRPr lang="en-GB" dirty="0"/>
+          </a:p>
+          <a:p>
+            <a:r>
+              <a:rPr lang="en-GB" dirty="0"/>
+              <a:t>Sequence </a:t>
+            </a:r>
+            <a:r>
+              <a:rPr lang="en-GB" dirty="0" smtClean="0"/>
+              <a:t>Diagrams</a:t>
+            </a:r>
+            <a:endParaRPr lang="en-GB" dirty="0"/>
+          </a:p>
+          <a:p>
+            <a:r>
+              <a:rPr lang="en-GB" dirty="0"/>
+              <a:t>Interaction </a:t>
+            </a:r>
+            <a:r>
+              <a:rPr lang="en-GB" dirty="0" smtClean="0"/>
+              <a:t>Overview Diagrams</a:t>
+            </a:r>
+            <a:endParaRPr lang="en-GB" dirty="0"/>
+          </a:p>
+          <a:p>
+            <a:r>
+              <a:rPr lang="en-GB" dirty="0"/>
+              <a:t>Composite </a:t>
+            </a:r>
+            <a:r>
+              <a:rPr lang="en-GB" dirty="0" smtClean="0"/>
+              <a:t>Structure Diagrams</a:t>
+            </a:r>
+            <a:endParaRPr lang="en-GB" dirty="0"/>
+          </a:p>
+          <a:p>
+            <a:r>
+              <a:rPr lang="en-GB" dirty="0"/>
+              <a:t>State </a:t>
+            </a:r>
+            <a:r>
+              <a:rPr lang="en-GB" dirty="0" smtClean="0"/>
+              <a:t>Machine Diagrams</a:t>
+            </a:r>
+            <a:endParaRPr lang="en-GB" dirty="0"/>
+          </a:p>
+          <a:p>
+            <a:r>
+              <a:rPr lang="en-GB" dirty="0"/>
+              <a:t>Timing </a:t>
+            </a:r>
+            <a:r>
+              <a:rPr lang="en-GB" dirty="0" smtClean="0"/>
+              <a:t>Diagrams</a:t>
+            </a:r>
+            <a:endParaRPr lang="en-GB" dirty="0"/>
+          </a:p>
+          <a:p>
+            <a:r>
+              <a:rPr lang="en-GB" dirty="0"/>
+              <a:t>Object </a:t>
+            </a:r>
+            <a:r>
+              <a:rPr lang="en-GB" dirty="0" smtClean="0"/>
+              <a:t>Diagrams</a:t>
+            </a:r>
+            <a:endParaRPr lang="en-GB" dirty="0"/>
+          </a:p>
+          <a:p>
+            <a:r>
+              <a:rPr lang="en-GB" b="1" dirty="0">
+                <a:solidFill>
+                  <a:srgbClr val="FF0000"/>
+                </a:solidFill>
+              </a:rPr>
+              <a:t>Communication </a:t>
+            </a:r>
+            <a:r>
+              <a:rPr lang="en-GB" b="1" dirty="0" smtClean="0">
+                <a:solidFill>
+                  <a:srgbClr val="FF0000"/>
+                </a:solidFill>
+              </a:rPr>
+              <a:t>Diagrams</a:t>
+            </a:r>
+            <a:endParaRPr lang="en-GB" b="1" dirty="0">
+              <a:solidFill>
+                <a:srgbClr val="FF0000"/>
+              </a:solidFill>
+            </a:endParaRPr>
+          </a:p>
+        </p:txBody>
+      </p:sp>
     </p:spTree>
     <p:extLst>
       <p:ext uri="{BB962C8B-B14F-4D97-AF65-F5344CB8AC3E}">
-        <p14:creationId xmlns:p14="http://schemas.microsoft.com/office/powerpoint/2010/main" xmlns="" val="1175813799"/>
+        <p14:creationId xmlns:p14="http://schemas.microsoft.com/office/powerpoint/2010/main" val="876791485"/>
       </p:ext>
     </p:extLst>
   </p:cSld>
@@ -5987,6 +6143,226 @@
       </p:grpSpPr>
       <p:sp>
         <p:nvSpPr>
+          <p:cNvPr id="2" name="Title 1"/>
+          <p:cNvSpPr>
+            <a:spLocks noGrp="1"/>
+          </p:cNvSpPr>
+          <p:nvPr>
+            <p:ph type="title"/>
+          </p:nvPr>
+        </p:nvSpPr>
+        <p:spPr/>
+        <p:txBody>
+          <a:bodyPr/>
+          <a:lstStyle/>
+          <a:p>
+            <a:r>
+              <a:rPr lang="en-GB" dirty="0" smtClean="0"/>
+              <a:t>Communication Diagram</a:t>
+            </a:r>
+            <a:endParaRPr lang="en-GB" dirty="0"/>
+          </a:p>
+        </p:txBody>
+      </p:sp>
+      <p:sp>
+        <p:nvSpPr>
+          <p:cNvPr id="3" name="Content Placeholder 2"/>
+          <p:cNvSpPr>
+            <a:spLocks noGrp="1"/>
+          </p:cNvSpPr>
+          <p:nvPr>
+            <p:ph idx="1"/>
+          </p:nvPr>
+        </p:nvSpPr>
+        <p:spPr/>
+        <p:txBody>
+          <a:bodyPr/>
+          <a:lstStyle/>
+          <a:p>
+            <a:r>
+              <a:rPr lang="en-GB" dirty="0" smtClean="0"/>
+              <a:t>A communication </a:t>
+            </a:r>
+            <a:r>
+              <a:rPr lang="en-GB" dirty="0"/>
+              <a:t>diagram is a type of interaction diagram that focuses on how</a:t>
+            </a:r>
+            <a:br>
+              <a:rPr lang="en-GB" dirty="0"/>
+            </a:br>
+            <a:r>
+              <a:rPr lang="en-GB" dirty="0"/>
+              <a:t>objects are linked and what messages they pass as they participate in a </a:t>
+            </a:r>
+            <a:r>
+              <a:rPr lang="en-GB" dirty="0" smtClean="0"/>
+              <a:t>specific interaction</a:t>
+            </a:r>
+            <a:r>
+              <a:rPr lang="en-GB" dirty="0"/>
+              <a:t/>
+            </a:r>
+            <a:br>
+              <a:rPr lang="en-GB" dirty="0"/>
+            </a:br>
+            <a:r>
+              <a:rPr lang="en-GB" dirty="0"/>
+              <a:t/>
+            </a:r>
+            <a:br>
+              <a:rPr lang="en-GB" dirty="0"/>
+            </a:br>
+            <a:endParaRPr lang="en-GB" dirty="0"/>
+          </a:p>
+        </p:txBody>
+      </p:sp>
+    </p:spTree>
+    <p:extLst>
+      <p:ext uri="{BB962C8B-B14F-4D97-AF65-F5344CB8AC3E}">
+        <p14:creationId xmlns:p14="http://schemas.microsoft.com/office/powerpoint/2010/main" val="1012127932"/>
+      </p:ext>
+    </p:extLst>
+  </p:cSld>
+  <p:clrMapOvr>
+    <a:masterClrMapping/>
+  </p:clrMapOvr>
+  <p:timing>
+    <p:tnLst>
+      <p:par>
+        <p:cTn id="1" dur="indefinite" restart="never" nodeType="tmRoot"/>
+      </p:par>
+    </p:tnLst>
+  </p:timing>
+</p:sld>
+</file>
+
+<file path=ppt/slides/slide24.xml><?xml version="1.0" encoding="utf-8"?>
+<p:sld xmlns:a="http://schemas.openxmlformats.org/drawingml/2006/main" xmlns:r="http://schemas.openxmlformats.org/officeDocument/2006/relationships" xmlns:p="http://schemas.openxmlformats.org/presentationml/2006/main">
+  <p:cSld>
+    <p:spTree>
+      <p:nvGrpSpPr>
+        <p:cNvPr id="1" name=""/>
+        <p:cNvGrpSpPr/>
+        <p:nvPr/>
+      </p:nvGrpSpPr>
+      <p:grpSpPr>
+        <a:xfrm>
+          <a:off x="0" y="0"/>
+          <a:ext cx="0" cy="0"/>
+          <a:chOff x="0" y="0"/>
+          <a:chExt cx="0" cy="0"/>
+        </a:xfrm>
+      </p:grpSpPr>
+      <p:sp>
+        <p:nvSpPr>
+          <p:cNvPr id="2" name="Title 1"/>
+          <p:cNvSpPr>
+            <a:spLocks noGrp="1"/>
+          </p:cNvSpPr>
+          <p:nvPr>
+            <p:ph type="title"/>
+          </p:nvPr>
+        </p:nvSpPr>
+        <p:spPr>
+          <a:xfrm>
+            <a:off x="533400" y="0"/>
+            <a:ext cx="7772400" cy="1143000"/>
+          </a:xfrm>
+        </p:spPr>
+        <p:txBody>
+          <a:bodyPr/>
+          <a:lstStyle/>
+          <a:p>
+            <a:r>
+              <a:rPr lang="en-GB" dirty="0" smtClean="0"/>
+              <a:t>Example</a:t>
+            </a:r>
+            <a:endParaRPr lang="en-GB" dirty="0"/>
+          </a:p>
+        </p:txBody>
+      </p:sp>
+      <p:sp>
+        <p:nvSpPr>
+          <p:cNvPr id="3" name="Content Placeholder 2"/>
+          <p:cNvSpPr>
+            <a:spLocks noGrp="1"/>
+          </p:cNvSpPr>
+          <p:nvPr>
+            <p:ph idx="1"/>
+          </p:nvPr>
+        </p:nvSpPr>
+        <p:spPr/>
+        <p:txBody>
+          <a:bodyPr/>
+          <a:lstStyle/>
+          <a:p>
+            <a:endParaRPr lang="en-GB"/>
+          </a:p>
+        </p:txBody>
+      </p:sp>
+      <p:pic>
+        <p:nvPicPr>
+          <p:cNvPr id="4" name="Picture 3"/>
+          <p:cNvPicPr>
+            <a:picLocks noChangeAspect="1"/>
+          </p:cNvPicPr>
+          <p:nvPr/>
+        </p:nvPicPr>
+        <p:blipFill>
+          <a:blip r:embed="rId2"/>
+          <a:stretch>
+            <a:fillRect/>
+          </a:stretch>
+        </p:blipFill>
+        <p:spPr>
+          <a:xfrm>
+            <a:off x="1981200" y="1447800"/>
+            <a:ext cx="5019675" cy="4972050"/>
+          </a:xfrm>
+          <a:prstGeom prst="rect">
+            <a:avLst/>
+          </a:prstGeom>
+        </p:spPr>
+      </p:pic>
+    </p:spTree>
+    <p:extLst>
+      <p:ext uri="{BB962C8B-B14F-4D97-AF65-F5344CB8AC3E}">
+        <p14:creationId xmlns:p14="http://schemas.microsoft.com/office/powerpoint/2010/main" val="1175813799"/>
+      </p:ext>
+    </p:extLst>
+  </p:cSld>
+  <p:clrMapOvr>
+    <a:masterClrMapping/>
+  </p:clrMapOvr>
+  <p:timing>
+    <p:tnLst>
+      <p:par>
+        <p:cTn id="1" dur="indefinite" restart="never" nodeType="tmRoot"/>
+      </p:par>
+    </p:tnLst>
+  </p:timing>
+</p:sld>
+</file>
+
+<file path=ppt/slides/slide25.xml><?xml version="1.0" encoding="utf-8"?>
+<p:sld xmlns:a="http://schemas.openxmlformats.org/drawingml/2006/main" xmlns:r="http://schemas.openxmlformats.org/officeDocument/2006/relationships" xmlns:p="http://schemas.openxmlformats.org/presentationml/2006/main">
+  <p:cSld>
+    <p:spTree>
+      <p:nvGrpSpPr>
+        <p:cNvPr id="1" name=""/>
+        <p:cNvGrpSpPr/>
+        <p:nvPr/>
+      </p:nvGrpSpPr>
+      <p:grpSpPr>
+        <a:xfrm>
+          <a:off x="0" y="0"/>
+          <a:ext cx="0" cy="0"/>
+          <a:chOff x="0" y="0"/>
+          <a:chExt cx="0" cy="0"/>
+        </a:xfrm>
+      </p:grpSpPr>
+      <p:sp>
+        <p:nvSpPr>
           <p:cNvPr id="11266" name="Title 1"/>
           <p:cNvSpPr>
             <a:spLocks noGrp="1"/>
@@ -6047,11 +6423,7 @@
           <a:p>
             <a:r>
               <a:rPr lang="en-GB" b="1" dirty="0" smtClean="0"/>
-              <a:t>UML </a:t>
-            </a:r>
-            <a:r>
-              <a:rPr lang="en-GB" b="1" dirty="0" smtClean="0"/>
-              <a:t>Diagrams</a:t>
+              <a:t>UML Diagrams</a:t>
             </a:r>
             <a:endParaRPr lang="en-GB" altLang="en-US" dirty="0" smtClean="0"/>
           </a:p>
@@ -6122,7 +6494,7 @@
 </p:sld>
 </file>
 
-<file path=ppt/slides/slide24.xml><?xml version="1.0" encoding="utf-8"?>
+<file path=ppt/slides/slide26.xml><?xml version="1.0" encoding="utf-8"?>
 <p:sld xmlns:a="http://schemas.openxmlformats.org/drawingml/2006/main" xmlns:r="http://schemas.openxmlformats.org/officeDocument/2006/relationships" xmlns:p="http://schemas.openxmlformats.org/presentationml/2006/main">
   <p:cSld>
     <p:spTree>
@@ -6188,11 +6560,7 @@
             </a:r>
             <a:r>
               <a:rPr lang="en-GB" altLang="en-US" smtClean="0"/>
-              <a:t>Chapter </a:t>
-            </a:r>
-            <a:r>
-              <a:rPr lang="en-GB" altLang="en-US" smtClean="0"/>
-              <a:t>6</a:t>
+              <a:t>Chapter 6</a:t>
             </a:r>
             <a:endParaRPr lang="en-GB" altLang="en-US" dirty="0" smtClean="0"/>
           </a:p>
@@ -6225,7 +6593,7 @@
 </p:sld>
 </file>
 
-<file path=ppt/slides/slide25.xml><?xml version="1.0" encoding="utf-8"?>
+<file path=ppt/slides/slide27.xml><?xml version="1.0" encoding="utf-8"?>
 <p:sld xmlns:a="http://schemas.openxmlformats.org/drawingml/2006/main" xmlns:r="http://schemas.openxmlformats.org/officeDocument/2006/relationships" xmlns:p="http://schemas.openxmlformats.org/presentationml/2006/main">
   <p:cSld>
     <p:spTree>
@@ -6601,7 +6969,7 @@
     </p:spTree>
     <p:extLst>
       <p:ext uri="{BB962C8B-B14F-4D97-AF65-F5344CB8AC3E}">
-        <p14:creationId xmlns:p14="http://schemas.microsoft.com/office/powerpoint/2010/main" xmlns="" val="671100035"/>
+        <p14:creationId xmlns:p14="http://schemas.microsoft.com/office/powerpoint/2010/main" val="671100035"/>
       </p:ext>
     </p:extLst>
   </p:cSld>
@@ -6838,7 +7206,7 @@
     </p:spTree>
     <p:extLst>
       <p:ext uri="{BB962C8B-B14F-4D97-AF65-F5344CB8AC3E}">
-        <p14:creationId xmlns:p14="http://schemas.microsoft.com/office/powerpoint/2010/main" xmlns="" val="671100035"/>
+        <p14:creationId xmlns:p14="http://schemas.microsoft.com/office/powerpoint/2010/main" val="671100035"/>
       </p:ext>
     </p:extLst>
   </p:cSld>
@@ -6888,6 +7256,111 @@
           <a:lstStyle/>
           <a:p>
             <a:r>
+              <a:rPr lang="en-GB" dirty="0"/>
+              <a:t>Sequence </a:t>
+            </a:r>
+            <a:r>
+              <a:rPr lang="en-GB" dirty="0" smtClean="0"/>
+              <a:t>Diagram</a:t>
+            </a:r>
+            <a:endParaRPr lang="en-GB" dirty="0"/>
+          </a:p>
+        </p:txBody>
+      </p:sp>
+      <p:sp>
+        <p:nvSpPr>
+          <p:cNvPr id="3" name="Content Placeholder 2"/>
+          <p:cNvSpPr>
+            <a:spLocks noGrp="1"/>
+          </p:cNvSpPr>
+          <p:nvPr>
+            <p:ph idx="1"/>
+          </p:nvPr>
+        </p:nvSpPr>
+        <p:spPr/>
+        <p:txBody>
+          <a:bodyPr/>
+          <a:lstStyle/>
+          <a:p>
+            <a:r>
+              <a:rPr lang="en-GB" dirty="0"/>
+              <a:t>A sequence diagram traces the execution of a scenario in the same </a:t>
+            </a:r>
+            <a:r>
+              <a:rPr lang="en-GB" dirty="0" smtClean="0"/>
+              <a:t>context as </a:t>
+            </a:r>
+            <a:r>
+              <a:rPr lang="en-GB" dirty="0"/>
+              <a:t>an object diagram. To a large degree, a sequence diagram is simply</a:t>
+            </a:r>
+            <a:br>
+              <a:rPr lang="en-GB" dirty="0"/>
+            </a:br>
+            <a:r>
+              <a:rPr lang="en-GB" dirty="0"/>
+              <a:t>another way to represent an object diagram</a:t>
+            </a:r>
+            <a:br>
+              <a:rPr lang="en-GB" dirty="0"/>
+            </a:br>
+            <a:r>
+              <a:rPr lang="en-GB" dirty="0"/>
+              <a:t/>
+            </a:r>
+            <a:br>
+              <a:rPr lang="en-GB" dirty="0"/>
+            </a:br>
+            <a:endParaRPr lang="en-GB" dirty="0"/>
+          </a:p>
+        </p:txBody>
+      </p:sp>
+    </p:spTree>
+    <p:extLst>
+      <p:ext uri="{BB962C8B-B14F-4D97-AF65-F5344CB8AC3E}">
+        <p14:creationId xmlns:p14="http://schemas.microsoft.com/office/powerpoint/2010/main" val="1505864923"/>
+      </p:ext>
+    </p:extLst>
+  </p:cSld>
+  <p:clrMapOvr>
+    <a:masterClrMapping/>
+  </p:clrMapOvr>
+</p:sld>
+</file>
+
+<file path=ppt/slides/slide6.xml><?xml version="1.0" encoding="utf-8"?>
+<p:sld xmlns:a="http://schemas.openxmlformats.org/drawingml/2006/main" xmlns:r="http://schemas.openxmlformats.org/officeDocument/2006/relationships" xmlns:p="http://schemas.openxmlformats.org/presentationml/2006/main">
+  <p:cSld>
+    <p:spTree>
+      <p:nvGrpSpPr>
+        <p:cNvPr id="1" name=""/>
+        <p:cNvGrpSpPr/>
+        <p:nvPr/>
+      </p:nvGrpSpPr>
+      <p:grpSpPr>
+        <a:xfrm>
+          <a:off x="0" y="0"/>
+          <a:ext cx="0" cy="0"/>
+          <a:chOff x="0" y="0"/>
+          <a:chExt cx="0" cy="0"/>
+        </a:xfrm>
+      </p:grpSpPr>
+      <p:sp>
+        <p:nvSpPr>
+          <p:cNvPr id="2" name="Title 1"/>
+          <p:cNvSpPr>
+            <a:spLocks noGrp="1"/>
+          </p:cNvSpPr>
+          <p:nvPr>
+            <p:ph type="title"/>
+          </p:nvPr>
+        </p:nvSpPr>
+        <p:spPr/>
+        <p:txBody>
+          <a:bodyPr/>
+          <a:lstStyle/>
+          <a:p>
+            <a:r>
               <a:rPr lang="en-GB" dirty="0" smtClean="0"/>
               <a:t>Example</a:t>
             </a:r>
@@ -6941,244 +7414,7 @@
     </p:spTree>
     <p:extLst>
       <p:ext uri="{BB962C8B-B14F-4D97-AF65-F5344CB8AC3E}">
-        <p14:creationId xmlns:p14="http://schemas.microsoft.com/office/powerpoint/2010/main" xmlns="" val="1652512450"/>
-      </p:ext>
-    </p:extLst>
-  </p:cSld>
-  <p:clrMapOvr>
-    <a:masterClrMapping/>
-  </p:clrMapOvr>
-  <p:timing>
-    <p:tnLst>
-      <p:par>
-        <p:cTn id="1" dur="indefinite" restart="never" nodeType="tmRoot"/>
-      </p:par>
-    </p:tnLst>
-  </p:timing>
-</p:sld>
-</file>
-
-<file path=ppt/slides/slide6.xml><?xml version="1.0" encoding="utf-8"?>
-<p:sld xmlns:a="http://schemas.openxmlformats.org/drawingml/2006/main" xmlns:r="http://schemas.openxmlformats.org/officeDocument/2006/relationships" xmlns:p="http://schemas.openxmlformats.org/presentationml/2006/main">
-  <p:cSld>
-    <p:spTree>
-      <p:nvGrpSpPr>
-        <p:cNvPr id="1" name=""/>
-        <p:cNvGrpSpPr/>
-        <p:nvPr/>
-      </p:nvGrpSpPr>
-      <p:grpSpPr>
-        <a:xfrm>
-          <a:off x="0" y="0"/>
-          <a:ext cx="0" cy="0"/>
-          <a:chOff x="0" y="0"/>
-          <a:chExt cx="0" cy="0"/>
-        </a:xfrm>
-      </p:grpSpPr>
-      <p:sp>
-        <p:nvSpPr>
-          <p:cNvPr id="2" name="Title 1"/>
-          <p:cNvSpPr>
-            <a:spLocks noGrp="1"/>
-          </p:cNvSpPr>
-          <p:nvPr>
-            <p:ph type="title"/>
-          </p:nvPr>
-        </p:nvSpPr>
-        <p:spPr/>
-        <p:txBody>
-          <a:bodyPr/>
-          <a:lstStyle/>
-          <a:p>
-            <a:r>
-              <a:rPr lang="en-GB" dirty="0"/>
-              <a:t>Interaction Overview Diagrams</a:t>
-            </a:r>
-          </a:p>
-        </p:txBody>
-      </p:sp>
-      <p:sp>
-        <p:nvSpPr>
-          <p:cNvPr id="3" name="Content Placeholder 2"/>
-          <p:cNvSpPr>
-            <a:spLocks noGrp="1"/>
-          </p:cNvSpPr>
-          <p:nvPr>
-            <p:ph idx="1"/>
-          </p:nvPr>
-        </p:nvSpPr>
-        <p:spPr>
-          <a:xfrm>
-            <a:off x="685800" y="1981200"/>
-            <a:ext cx="7772400" cy="4419600"/>
-          </a:xfrm>
-        </p:spPr>
-        <p:txBody>
-          <a:bodyPr>
-            <a:normAutofit fontScale="70000" lnSpcReduction="20000"/>
-          </a:bodyPr>
-          <a:lstStyle/>
-          <a:p>
-            <a:r>
-              <a:rPr lang="en-GB" dirty="0"/>
-              <a:t>Package </a:t>
-            </a:r>
-            <a:r>
-              <a:rPr lang="en-GB" dirty="0" smtClean="0"/>
-              <a:t>Diagrams</a:t>
-            </a:r>
-            <a:endParaRPr lang="en-GB" dirty="0"/>
-          </a:p>
-          <a:p>
-            <a:r>
-              <a:rPr lang="en-GB" dirty="0"/>
-              <a:t>Component </a:t>
-            </a:r>
-            <a:r>
-              <a:rPr lang="en-GB" dirty="0" smtClean="0"/>
-              <a:t>Diagrams</a:t>
-            </a:r>
-            <a:endParaRPr lang="en-GB" dirty="0"/>
-          </a:p>
-          <a:p>
-            <a:r>
-              <a:rPr lang="en-GB" dirty="0"/>
-              <a:t>Deployment </a:t>
-            </a:r>
-            <a:r>
-              <a:rPr lang="en-GB" dirty="0" smtClean="0"/>
-              <a:t>Diagrams</a:t>
-            </a:r>
-            <a:endParaRPr lang="en-GB" dirty="0"/>
-          </a:p>
-          <a:p>
-            <a:r>
-              <a:rPr lang="en-GB" dirty="0"/>
-              <a:t>Use </a:t>
-            </a:r>
-            <a:r>
-              <a:rPr lang="en-GB" dirty="0" smtClean="0"/>
-              <a:t>Case Diagrams</a:t>
-            </a:r>
-            <a:endParaRPr lang="en-GB" dirty="0"/>
-          </a:p>
-          <a:p>
-            <a:r>
-              <a:rPr lang="en-GB" dirty="0"/>
-              <a:t>Activity </a:t>
-            </a:r>
-            <a:r>
-              <a:rPr lang="en-GB" dirty="0" smtClean="0"/>
-              <a:t>Diagrams</a:t>
-            </a:r>
-            <a:endParaRPr lang="en-GB" dirty="0"/>
-          </a:p>
-          <a:p>
-            <a:r>
-              <a:rPr lang="en-GB" dirty="0"/>
-              <a:t>Class </a:t>
-            </a:r>
-            <a:r>
-              <a:rPr lang="en-GB" dirty="0" smtClean="0"/>
-              <a:t>Diagrams</a:t>
-            </a:r>
-            <a:endParaRPr lang="en-GB" dirty="0"/>
-          </a:p>
-          <a:p>
-            <a:r>
-              <a:rPr lang="en-GB" dirty="0"/>
-              <a:t>Sequence </a:t>
-            </a:r>
-            <a:r>
-              <a:rPr lang="en-GB" dirty="0" smtClean="0"/>
-              <a:t>Diagrams</a:t>
-            </a:r>
-            <a:endParaRPr lang="en-GB" dirty="0"/>
-          </a:p>
-          <a:p>
-            <a:r>
-              <a:rPr lang="en-GB" b="1" dirty="0">
-                <a:solidFill>
-                  <a:srgbClr val="FF0000"/>
-                </a:solidFill>
-              </a:rPr>
-              <a:t>Interaction </a:t>
-            </a:r>
-            <a:r>
-              <a:rPr lang="en-GB" b="1" dirty="0" smtClean="0">
-                <a:solidFill>
-                  <a:srgbClr val="FF0000"/>
-                </a:solidFill>
-              </a:rPr>
-              <a:t>Overview Diagrams</a:t>
-            </a:r>
-            <a:endParaRPr lang="en-GB" b="1" dirty="0">
-              <a:solidFill>
-                <a:srgbClr val="FF0000"/>
-              </a:solidFill>
-            </a:endParaRPr>
-          </a:p>
-          <a:p>
-            <a:r>
-              <a:rPr lang="en-GB" dirty="0"/>
-              <a:t>Composite </a:t>
-            </a:r>
-            <a:r>
-              <a:rPr lang="en-GB" dirty="0" smtClean="0"/>
-              <a:t>Structure Diagrams</a:t>
-            </a:r>
-            <a:endParaRPr lang="en-GB" dirty="0"/>
-          </a:p>
-          <a:p>
-            <a:r>
-              <a:rPr lang="en-GB" dirty="0"/>
-              <a:t>State </a:t>
-            </a:r>
-            <a:r>
-              <a:rPr lang="en-GB" dirty="0" smtClean="0"/>
-              <a:t>Machine Diagrams</a:t>
-            </a:r>
-            <a:endParaRPr lang="en-GB" dirty="0"/>
-          </a:p>
-          <a:p>
-            <a:r>
-              <a:rPr lang="en-GB" dirty="0"/>
-              <a:t>Timing </a:t>
-            </a:r>
-            <a:r>
-              <a:rPr lang="en-GB" dirty="0" smtClean="0"/>
-              <a:t>Diagrams</a:t>
-            </a:r>
-            <a:endParaRPr lang="en-GB" dirty="0"/>
-          </a:p>
-          <a:p>
-            <a:r>
-              <a:rPr lang="en-GB" dirty="0"/>
-              <a:t>Object </a:t>
-            </a:r>
-            <a:r>
-              <a:rPr lang="en-GB" dirty="0" smtClean="0"/>
-              <a:t>Diagrams</a:t>
-            </a:r>
-            <a:endParaRPr lang="en-GB" dirty="0"/>
-          </a:p>
-          <a:p>
-            <a:r>
-              <a:rPr lang="en-GB" dirty="0"/>
-              <a:t>Communication </a:t>
-            </a:r>
-            <a:r>
-              <a:rPr lang="en-GB" dirty="0" smtClean="0"/>
-              <a:t>Diagrams</a:t>
-            </a:r>
-            <a:endParaRPr lang="en-GB" dirty="0"/>
-          </a:p>
-        </p:txBody>
-      </p:sp>
-    </p:spTree>
-    <p:extLst>
-      <p:ext uri="{BB962C8B-B14F-4D97-AF65-F5344CB8AC3E}">
-        <p14:creationId xmlns:p14="http://schemas.microsoft.com/office/powerpoint/2010/main" xmlns="" val="2735570689"/>
+        <p14:creationId xmlns:p14="http://schemas.microsoft.com/office/powerpoint/2010/main" val="1652512450"/>
       </p:ext>
     </p:extLst>
   </p:cSld>
@@ -7228,10 +7464,9 @@
           <a:lstStyle/>
           <a:p>
             <a:r>
-              <a:rPr lang="en-GB" dirty="0" smtClean="0"/>
-              <a:t>Interaction Overview Diagram</a:t>
-            </a:r>
-            <a:endParaRPr lang="en-GB" dirty="0"/>
+              <a:rPr lang="en-GB" dirty="0"/>
+              <a:t>Interaction Overview Diagrams</a:t>
+            </a:r>
           </a:p>
         </p:txBody>
       </p:sp>
@@ -7245,44 +7480,170 @@
             <p:ph idx="1"/>
           </p:nvPr>
         </p:nvSpPr>
-        <p:spPr/>
-        <p:txBody>
-          <a:bodyPr/>
+        <p:spPr>
+          <a:xfrm>
+            <a:off x="685800" y="1981200"/>
+            <a:ext cx="7772400" cy="4419600"/>
+          </a:xfrm>
+        </p:spPr>
+        <p:txBody>
+          <a:bodyPr>
+            <a:normAutofit fontScale="70000" lnSpcReduction="20000"/>
+          </a:bodyPr>
           <a:lstStyle/>
           <a:p>
             <a:r>
               <a:rPr lang="en-GB" dirty="0"/>
-              <a:t>Interaction overview diagrams are a combination of activity diagrams and interaction diagrams </a:t>
-            </a:r>
-            <a:endParaRPr lang="en-GB" dirty="0" smtClean="0"/>
-          </a:p>
-          <a:p>
-            <a:r>
-              <a:rPr lang="en-GB" dirty="0" smtClean="0"/>
-              <a:t>Intended </a:t>
-            </a:r>
-            <a:r>
-              <a:rPr lang="en-GB" dirty="0"/>
-              <a:t>to provide an overview of the flow of </a:t>
-            </a:r>
-            <a:r>
-              <a:rPr lang="en-GB" dirty="0" smtClean="0"/>
-              <a:t>control between </a:t>
-            </a:r>
-            <a:r>
-              <a:rPr lang="en-GB" dirty="0"/>
-              <a:t>interaction diagram elements</a:t>
-            </a:r>
-            <a:br>
-              <a:rPr lang="en-GB" dirty="0"/>
-            </a:br>
-            <a:r>
-              <a:rPr lang="en-GB" dirty="0"/>
-              <a:t/>
-            </a:r>
-            <a:br>
-              <a:rPr lang="en-GB" dirty="0"/>
-            </a:br>
+              <a:t>Package </a:t>
+            </a:r>
+            <a:r>
+              <a:rPr lang="en-GB" dirty="0" smtClean="0"/>
+              <a:t>Diagrams</a:t>
+            </a:r>
+            <a:endParaRPr lang="en-GB" dirty="0"/>
+          </a:p>
+          <a:p>
+            <a:r>
+              <a:rPr lang="en-GB" dirty="0"/>
+              <a:t>Component </a:t>
+            </a:r>
+            <a:r>
+              <a:rPr lang="en-GB" dirty="0" smtClean="0"/>
+              <a:t>Diagrams</a:t>
+            </a:r>
+            <a:endParaRPr lang="en-GB" dirty="0"/>
+          </a:p>
+          <a:p>
+            <a:r>
+              <a:rPr lang="en-GB" dirty="0"/>
+              <a:t>Deployment </a:t>
+            </a:r>
+            <a:r>
+              <a:rPr lang="en-GB" dirty="0" smtClean="0"/>
+              <a:t>Diagrams</a:t>
+            </a:r>
+            <a:endParaRPr lang="en-GB" dirty="0"/>
+          </a:p>
+          <a:p>
+            <a:r>
+              <a:rPr lang="en-GB" dirty="0"/>
+              <a:t>Use </a:t>
+            </a:r>
+            <a:r>
+              <a:rPr lang="en-GB" dirty="0" smtClean="0"/>
+              <a:t>Case Diagrams</a:t>
+            </a:r>
+            <a:endParaRPr lang="en-GB" dirty="0"/>
+          </a:p>
+          <a:p>
+            <a:r>
+              <a:rPr lang="en-GB" dirty="0"/>
+              <a:t>Activity </a:t>
+            </a:r>
+            <a:r>
+              <a:rPr lang="en-GB" dirty="0" smtClean="0"/>
+              <a:t>Diagrams</a:t>
+            </a:r>
+            <a:endParaRPr lang="en-GB" dirty="0"/>
+          </a:p>
+          <a:p>
+            <a:r>
+              <a:rPr lang="en-GB" dirty="0"/>
+              <a:t>Class </a:t>
+            </a:r>
+            <a:r>
+              <a:rPr lang="en-GB" dirty="0" smtClean="0"/>
+              <a:t>Diagrams</a:t>
+            </a:r>
+            <a:endParaRPr lang="en-GB" dirty="0"/>
+          </a:p>
+          <a:p>
+            <a:r>
+              <a:rPr lang="en-GB" dirty="0"/>
+              <a:t>Sequence </a:t>
+            </a:r>
+            <a:r>
+              <a:rPr lang="en-GB" dirty="0" smtClean="0"/>
+              <a:t>Diagrams</a:t>
+            </a:r>
+            <a:endParaRPr lang="en-GB" dirty="0"/>
+          </a:p>
+          <a:p>
+            <a:r>
+              <a:rPr lang="en-GB" b="1" dirty="0">
+                <a:solidFill>
+                  <a:srgbClr val="FF0000"/>
+                </a:solidFill>
+              </a:rPr>
+              <a:t>Interaction </a:t>
+            </a:r>
+            <a:r>
+              <a:rPr lang="en-GB" b="1" dirty="0" smtClean="0">
+                <a:solidFill>
+                  <a:srgbClr val="FF0000"/>
+                </a:solidFill>
+              </a:rPr>
+              <a:t>Overview Diagrams</a:t>
+            </a:r>
+            <a:endParaRPr lang="en-GB" b="1" dirty="0">
+              <a:solidFill>
+                <a:srgbClr val="FF0000"/>
+              </a:solidFill>
+            </a:endParaRPr>
+          </a:p>
+          <a:p>
+            <a:r>
+              <a:rPr lang="en-GB" dirty="0"/>
+              <a:t>Composite </a:t>
+            </a:r>
+            <a:r>
+              <a:rPr lang="en-GB" dirty="0" smtClean="0"/>
+              <a:t>Structure Diagrams</a:t>
+            </a:r>
+            <a:endParaRPr lang="en-GB" dirty="0"/>
+          </a:p>
+          <a:p>
+            <a:r>
+              <a:rPr lang="en-GB" dirty="0"/>
+              <a:t>State </a:t>
+            </a:r>
+            <a:r>
+              <a:rPr lang="en-GB" dirty="0" smtClean="0"/>
+              <a:t>Machine Diagrams</a:t>
+            </a:r>
+            <a:endParaRPr lang="en-GB" dirty="0"/>
+          </a:p>
+          <a:p>
+            <a:r>
+              <a:rPr lang="en-GB" dirty="0"/>
+              <a:t>Timing </a:t>
+            </a:r>
+            <a:r>
+              <a:rPr lang="en-GB" dirty="0" smtClean="0"/>
+              <a:t>Diagrams</a:t>
+            </a:r>
+            <a:endParaRPr lang="en-GB" dirty="0"/>
+          </a:p>
+          <a:p>
+            <a:r>
+              <a:rPr lang="en-GB" dirty="0"/>
+              <a:t>Object </a:t>
+            </a:r>
+            <a:r>
+              <a:rPr lang="en-GB" dirty="0" smtClean="0"/>
+              <a:t>Diagrams</a:t>
+            </a:r>
+            <a:endParaRPr lang="en-GB" dirty="0"/>
+          </a:p>
+          <a:p>
+            <a:r>
+              <a:rPr lang="en-GB" dirty="0"/>
+              <a:t>Communication </a:t>
+            </a:r>
+            <a:r>
+              <a:rPr lang="en-GB" dirty="0" smtClean="0"/>
+              <a:t>Diagrams</a:t>
+            </a:r>
             <a:endParaRPr lang="en-GB" dirty="0"/>
           </a:p>
         </p:txBody>
@@ -7290,7 +7651,7 @@
     </p:spTree>
     <p:extLst>
       <p:ext uri="{BB962C8B-B14F-4D97-AF65-F5344CB8AC3E}">
-        <p14:creationId xmlns:p14="http://schemas.microsoft.com/office/powerpoint/2010/main" xmlns="" val="314924256"/>
+        <p14:creationId xmlns:p14="http://schemas.microsoft.com/office/powerpoint/2010/main" val="2735570689"/>
       </p:ext>
     </p:extLst>
   </p:cSld>
@@ -7334,19 +7695,14 @@
             <p:ph type="title"/>
           </p:nvPr>
         </p:nvSpPr>
-        <p:spPr>
-          <a:xfrm>
-            <a:off x="685800" y="-133349"/>
-            <a:ext cx="7772400" cy="1143000"/>
-          </a:xfrm>
-        </p:spPr>
+        <p:spPr/>
         <p:txBody>
           <a:bodyPr/>
           <a:lstStyle/>
           <a:p>
             <a:r>
               <a:rPr lang="en-GB" dirty="0" smtClean="0"/>
-              <a:t>Example</a:t>
+              <a:t>Interaction Overview Diagram</a:t>
             </a:r>
             <a:endParaRPr lang="en-GB" dirty="0"/>
           </a:p>
@@ -7367,38 +7723,71 @@
           <a:bodyPr/>
           <a:lstStyle/>
           <a:p>
-            <a:endParaRPr lang="en-GB"/>
-          </a:p>
-        </p:txBody>
-      </p:sp>
-      <p:pic>
-        <p:nvPicPr>
-          <p:cNvPr id="4" name="Picture 3"/>
-          <p:cNvPicPr>
-            <a:picLocks noChangeAspect="1"/>
-          </p:cNvPicPr>
-          <p:nvPr/>
-        </p:nvPicPr>
-        <p:blipFill>
-          <a:blip r:embed="rId2"/>
-          <a:stretch>
-            <a:fillRect/>
-          </a:stretch>
-        </p:blipFill>
-        <p:spPr>
-          <a:xfrm>
-            <a:off x="2133600" y="838200"/>
-            <a:ext cx="4983451" cy="5926667"/>
-          </a:xfrm>
-          <a:prstGeom prst="rect">
-            <a:avLst/>
-          </a:prstGeom>
-        </p:spPr>
-      </p:pic>
+            <a:r>
+              <a:rPr lang="en-GB" dirty="0"/>
+              <a:t>Interaction overview diagrams are a combination of </a:t>
+            </a:r>
+            <a:r>
+              <a:rPr lang="en-GB" dirty="0">
+                <a:solidFill>
+                  <a:srgbClr val="FF0000"/>
+                </a:solidFill>
+              </a:rPr>
+              <a:t>activity diagrams </a:t>
+            </a:r>
+            <a:r>
+              <a:rPr lang="en-GB" dirty="0"/>
+              <a:t>and </a:t>
+            </a:r>
+            <a:r>
+              <a:rPr lang="en-GB" dirty="0">
+                <a:solidFill>
+                  <a:srgbClr val="FF0000"/>
+                </a:solidFill>
+              </a:rPr>
+              <a:t>interaction diagrams </a:t>
+            </a:r>
+            <a:endParaRPr lang="en-GB" dirty="0" smtClean="0">
+              <a:solidFill>
+                <a:srgbClr val="FF0000"/>
+              </a:solidFill>
+            </a:endParaRPr>
+          </a:p>
+          <a:p>
+            <a:r>
+              <a:rPr lang="en-GB" dirty="0" smtClean="0"/>
+              <a:t>Intended </a:t>
+            </a:r>
+            <a:r>
+              <a:rPr lang="en-GB" dirty="0"/>
+              <a:t>to provide an overview of the flow of </a:t>
+            </a:r>
+            <a:r>
+              <a:rPr lang="en-GB" dirty="0" smtClean="0"/>
+              <a:t>control between </a:t>
+            </a:r>
+            <a:r>
+              <a:rPr lang="en-GB" dirty="0"/>
+              <a:t>interaction diagram elements</a:t>
+            </a:r>
+            <a:br>
+              <a:rPr lang="en-GB" dirty="0"/>
+            </a:br>
+            <a:r>
+              <a:rPr lang="en-GB" dirty="0"/>
+              <a:t/>
+            </a:r>
+            <a:br>
+              <a:rPr lang="en-GB" dirty="0"/>
+            </a:br>
+            <a:endParaRPr lang="en-GB" dirty="0"/>
+          </a:p>
+        </p:txBody>
+      </p:sp>
     </p:spTree>
     <p:extLst>
       <p:ext uri="{BB962C8B-B14F-4D97-AF65-F5344CB8AC3E}">
-        <p14:creationId xmlns:p14="http://schemas.microsoft.com/office/powerpoint/2010/main" xmlns="" val="3077947700"/>
+        <p14:creationId xmlns:p14="http://schemas.microsoft.com/office/powerpoint/2010/main" val="314924256"/>
       </p:ext>
     </p:extLst>
   </p:cSld>
@@ -7442,15 +7831,21 @@
             <p:ph type="title"/>
           </p:nvPr>
         </p:nvSpPr>
-        <p:spPr/>
+        <p:spPr>
+          <a:xfrm>
+            <a:off x="685800" y="-133349"/>
+            <a:ext cx="7772400" cy="1143000"/>
+          </a:xfrm>
+        </p:spPr>
         <p:txBody>
           <a:bodyPr/>
           <a:lstStyle/>
           <a:p>
             <a:r>
-              <a:rPr lang="en-GB" dirty="0"/>
-              <a:t>Composite Structure Diagrams</a:t>
-            </a:r>
+              <a:rPr lang="en-GB" dirty="0" smtClean="0"/>
+              <a:t>Example</a:t>
+            </a:r>
+            <a:endParaRPr lang="en-GB" dirty="0"/>
           </a:p>
         </p:txBody>
       </p:sp>
@@ -7464,178 +7859,43 @@
             <p:ph idx="1"/>
           </p:nvPr>
         </p:nvSpPr>
+        <p:spPr/>
+        <p:txBody>
+          <a:bodyPr/>
+          <a:lstStyle/>
+          <a:p>
+            <a:endParaRPr lang="en-GB"/>
+          </a:p>
+        </p:txBody>
+      </p:sp>
+      <p:pic>
+        <p:nvPicPr>
+          <p:cNvPr id="4" name="Picture 3"/>
+          <p:cNvPicPr>
+            <a:picLocks noChangeAspect="1"/>
+          </p:cNvPicPr>
+          <p:nvPr/>
+        </p:nvPicPr>
+        <p:blipFill>
+          <a:blip r:embed="rId2"/>
+          <a:stretch>
+            <a:fillRect/>
+          </a:stretch>
+        </p:blipFill>
         <p:spPr>
           <a:xfrm>
-            <a:off x="685800" y="1981200"/>
-            <a:ext cx="7772400" cy="4419600"/>
+            <a:off x="2133600" y="838200"/>
+            <a:ext cx="4983451" cy="5926667"/>
           </a:xfrm>
+          <a:prstGeom prst="rect">
+            <a:avLst/>
+          </a:prstGeom>
         </p:spPr>
-        <p:txBody>
-          <a:bodyPr>
-            <a:normAutofit fontScale="70000" lnSpcReduction="20000"/>
-          </a:bodyPr>
-          <a:lstStyle/>
-          <a:p>
-            <a:r>
-              <a:rPr lang="en-GB" dirty="0"/>
-              <a:t>Package </a:t>
-            </a:r>
-            <a:r>
-              <a:rPr lang="en-GB" dirty="0" smtClean="0"/>
-              <a:t>Diagrams</a:t>
-            </a:r>
-            <a:endParaRPr lang="en-GB" dirty="0"/>
-          </a:p>
-          <a:p>
-            <a:r>
-              <a:rPr lang="en-GB" dirty="0"/>
-              <a:t>Component </a:t>
-            </a:r>
-            <a:r>
-              <a:rPr lang="en-GB" dirty="0" smtClean="0"/>
-              <a:t>Diagrams</a:t>
-            </a:r>
-            <a:endParaRPr lang="en-GB" dirty="0"/>
-          </a:p>
-          <a:p>
-            <a:r>
-              <a:rPr lang="en-GB" dirty="0"/>
-              <a:t>Deployment </a:t>
-            </a:r>
-            <a:r>
-              <a:rPr lang="en-GB" dirty="0" smtClean="0"/>
-              <a:t>Diagrams</a:t>
-            </a:r>
-            <a:endParaRPr lang="en-GB" dirty="0"/>
-          </a:p>
-          <a:p>
-            <a:r>
-              <a:rPr lang="en-GB" dirty="0"/>
-              <a:t>Use </a:t>
-            </a:r>
-            <a:r>
-              <a:rPr lang="en-GB" dirty="0" smtClean="0"/>
-              <a:t>Case Diagrams</a:t>
-            </a:r>
-            <a:endParaRPr lang="en-GB" dirty="0"/>
-          </a:p>
-          <a:p>
-            <a:r>
-              <a:rPr lang="en-GB" dirty="0"/>
-              <a:t>Activity </a:t>
-            </a:r>
-            <a:r>
-              <a:rPr lang="en-GB" dirty="0" smtClean="0"/>
-              <a:t>Diagrams</a:t>
-            </a:r>
-            <a:endParaRPr lang="en-GB" dirty="0"/>
-          </a:p>
-          <a:p>
-            <a:r>
-              <a:rPr lang="en-GB" dirty="0"/>
-              <a:t>Class </a:t>
-            </a:r>
-            <a:r>
-              <a:rPr lang="en-GB" dirty="0" smtClean="0"/>
-              <a:t>Diagrams</a:t>
-            </a:r>
-            <a:endParaRPr lang="en-GB" dirty="0"/>
-          </a:p>
-          <a:p>
-            <a:r>
-              <a:rPr lang="en-GB" dirty="0"/>
-              <a:t>Sequence </a:t>
-            </a:r>
-            <a:r>
-              <a:rPr lang="en-GB" dirty="0" smtClean="0"/>
-              <a:t>Diagrams</a:t>
-            </a:r>
-            <a:endParaRPr lang="en-GB" dirty="0"/>
-          </a:p>
-          <a:p>
-            <a:r>
-              <a:rPr lang="en-GB" dirty="0"/>
-              <a:t>Interaction </a:t>
-            </a:r>
-            <a:r>
-              <a:rPr lang="en-GB" dirty="0" smtClean="0"/>
-              <a:t>Overview Diagrams</a:t>
-            </a:r>
-            <a:endParaRPr lang="en-GB" dirty="0"/>
-          </a:p>
-          <a:p>
-            <a:r>
-              <a:rPr lang="en-GB" b="1" dirty="0">
-                <a:solidFill>
-                  <a:srgbClr val="FF0000"/>
-                </a:solidFill>
-              </a:rPr>
-              <a:t>Composite </a:t>
-            </a:r>
-            <a:r>
-              <a:rPr lang="en-GB" b="1" dirty="0" smtClean="0">
-                <a:solidFill>
-                  <a:srgbClr val="FF0000"/>
-                </a:solidFill>
-              </a:rPr>
-              <a:t>Structure Diagrams</a:t>
-            </a:r>
-            <a:endParaRPr lang="en-GB" b="1" dirty="0">
-              <a:solidFill>
-                <a:srgbClr val="FF0000"/>
-              </a:solidFill>
-            </a:endParaRPr>
-          </a:p>
-          <a:p>
-            <a:r>
-              <a:rPr lang="en-GB" dirty="0"/>
-              <a:t>State </a:t>
-            </a:r>
-            <a:r>
-              <a:rPr lang="en-GB" dirty="0" smtClean="0"/>
-              <a:t>Machine Diagrams</a:t>
-            </a:r>
-            <a:endParaRPr lang="en-GB" dirty="0"/>
-          </a:p>
-          <a:p>
-            <a:r>
-              <a:rPr lang="en-GB" dirty="0"/>
-              <a:t>Timing </a:t>
-            </a:r>
-            <a:r>
-              <a:rPr lang="en-GB" dirty="0" smtClean="0"/>
-              <a:t>Diagrams</a:t>
-            </a:r>
-            <a:endParaRPr lang="en-GB" dirty="0"/>
-          </a:p>
-          <a:p>
-            <a:r>
-              <a:rPr lang="en-GB" dirty="0"/>
-              <a:t>Object </a:t>
-            </a:r>
-            <a:r>
-              <a:rPr lang="en-GB" dirty="0" smtClean="0"/>
-              <a:t>Diagrams</a:t>
-            </a:r>
-            <a:endParaRPr lang="en-GB" dirty="0"/>
-          </a:p>
-          <a:p>
-            <a:r>
-              <a:rPr lang="en-GB" dirty="0"/>
-              <a:t>Communication </a:t>
-            </a:r>
-            <a:r>
-              <a:rPr lang="en-GB" dirty="0" smtClean="0"/>
-              <a:t>Diagrams</a:t>
-            </a:r>
-            <a:endParaRPr lang="en-GB" dirty="0"/>
-          </a:p>
-        </p:txBody>
-      </p:sp>
+      </p:pic>
     </p:spTree>
     <p:extLst>
       <p:ext uri="{BB962C8B-B14F-4D97-AF65-F5344CB8AC3E}">
-        <p14:creationId xmlns:p14="http://schemas.microsoft.com/office/powerpoint/2010/main" xmlns="" val="1112626206"/>
+        <p14:creationId xmlns:p14="http://schemas.microsoft.com/office/powerpoint/2010/main" val="3077947700"/>
       </p:ext>
     </p:extLst>
   </p:cSld>
@@ -8135,7 +8395,7 @@
   </a:extraClrSchemeLst>
   <a:extLst>
     <a:ext uri="{05A4C25C-085E-4340-85A3-A5531E510DB2}">
-      <thm15:themeFamily xmlns:thm15="http://schemas.microsoft.com/office/thememl/2012/main" xmlns="" name="Office Theme" id="{62F939B6-93AF-4DB8-9C6B-D6C7DFDC589F}" vid="{4A3C46E8-61CC-4603-A589-7422A47A8E4A}"/>
+      <thm15:themeFamily xmlns:thm15="http://schemas.microsoft.com/office/thememl/2012/main" name="Office Theme" id="{62F939B6-93AF-4DB8-9C6B-D6C7DFDC589F}" vid="{4A3C46E8-61CC-4603-A589-7422A47A8E4A}"/>
     </a:ext>
   </a:extLst>
 </a:theme>
@@ -8396,7 +8656,7 @@
   <a:extraClrSchemeLst/>
   <a:extLst>
     <a:ext uri="{05A4C25C-085E-4340-85A3-A5531E510DB2}">
-      <thm15:themeFamily xmlns:thm15="http://schemas.microsoft.com/office/thememl/2012/main" xmlns="" name="Office Theme" id="{62F939B6-93AF-4DB8-9C6B-D6C7DFDC589F}" vid="{4A3C46E8-61CC-4603-A589-7422A47A8E4A}"/>
+      <thm15:themeFamily xmlns:thm15="http://schemas.microsoft.com/office/thememl/2012/main" name="Office Theme" id="{62F939B6-93AF-4DB8-9C6B-D6C7DFDC589F}" vid="{4A3C46E8-61CC-4603-A589-7422A47A8E4A}"/>
     </a:ext>
   </a:extLst>
 </a:theme>

</xml_diff>

<commit_message>
Update slides for OOP and OOAD
</commit_message>
<xml_diff>
--- a/OOAD/lectures/070--Notation.Part.2.pptx
+++ b/OOAD/lectures/070--Notation.Part.2.pptx
@@ -59,7 +59,7 @@
     <p:sldId id="329" r:id="rId50"/>
   </p:sldIdLst>
   <p:sldSz cx="9144000" cy="6858000" type="screen4x3"/>
-  <p:notesSz cx="6858000" cy="9144000"/>
+  <p:notesSz cx="7315200" cy="9601200"/>
   <p:defaultTextStyle>
     <a:defPPr>
       <a:defRPr lang="en-US"/>
@@ -187,7 +187,7 @@
   </p:defaultTextStyle>
   <p:extLst>
     <p:ext uri="{EFAFB233-063F-42B5-8137-9DF3F51BA10A}">
-      <p15:sldGuideLst xmlns:p15="http://schemas.microsoft.com/office/powerpoint/2012/main">
+      <p15:sldGuideLst xmlns:p15="http://schemas.microsoft.com/office/powerpoint/2012/main" xmlns="">
         <p15:guide id="1" orient="horz" pos="2160">
           <p15:clr>
             <a:srgbClr val="A4A3A4"/>
@@ -242,7 +242,7 @@
         <p:spPr bwMode="auto">
           <a:xfrm>
             <a:off x="0" y="0"/>
-            <a:ext cx="2971800" cy="457200"/>
+            <a:ext cx="3169920" cy="480060"/>
           </a:xfrm>
           <a:prstGeom prst="rect">
             <a:avLst/>
@@ -254,14 +254,14 @@
           <a:effectLst/>
           <a:extLst>
             <a:ext uri="{909E8E84-426E-40DD-AFC4-6F175D3DCCD1}">
-              <a14:hiddenFill xmlns:a14="http://schemas.microsoft.com/office/drawing/2010/main">
+              <a14:hiddenFill xmlns:a14="http://schemas.microsoft.com/office/drawing/2010/main" xmlns="">
                 <a:solidFill>
                   <a:schemeClr val="accent1"/>
                 </a:solidFill>
               </a14:hiddenFill>
             </a:ext>
             <a:ext uri="{91240B29-F687-4F45-9708-019B960494DF}">
-              <a14:hiddenLine xmlns:a14="http://schemas.microsoft.com/office/drawing/2010/main" w="9525">
+              <a14:hiddenLine xmlns:a14="http://schemas.microsoft.com/office/drawing/2010/main" xmlns="" w="9525">
                 <a:solidFill>
                   <a:schemeClr val="tx1"/>
                 </a:solidFill>
@@ -271,7 +271,7 @@
               </a14:hiddenLine>
             </a:ext>
             <a:ext uri="{AF507438-7753-43E0-B8FC-AC1667EBCBE1}">
-              <a14:hiddenEffects xmlns:a14="http://schemas.microsoft.com/office/drawing/2010/main">
+              <a14:hiddenEffects xmlns:a14="http://schemas.microsoft.com/office/drawing/2010/main" xmlns="">
                 <a:effectLst>
                   <a:outerShdw dist="35921" dir="2700000" algn="ctr" rotWithShape="0">
                     <a:schemeClr val="bg2"/>
@@ -282,14 +282,14 @@
           </a:extLst>
         </p:spPr>
         <p:txBody>
-          <a:bodyPr vert="horz" wrap="square" lIns="91440" tIns="45720" rIns="91440" bIns="45720" numCol="1" anchor="t" anchorCtr="0" compatLnSpc="1">
+          <a:bodyPr vert="horz" wrap="square" lIns="96661" tIns="48331" rIns="96661" bIns="48331" numCol="1" anchor="t" anchorCtr="0" compatLnSpc="1">
             <a:prstTxWarp prst="textNoShape">
               <a:avLst/>
             </a:prstTxWarp>
           </a:bodyPr>
           <a:lstStyle>
             <a:lvl1pPr eaLnBrk="0" hangingPunct="0">
-              <a:defRPr sz="1200"/>
+              <a:defRPr sz="1300"/>
             </a:lvl1pPr>
           </a:lstStyle>
           <a:p>
@@ -312,8 +312,8 @@
         </p:nvSpPr>
         <p:spPr bwMode="auto">
           <a:xfrm>
-            <a:off x="3884613" y="0"/>
-            <a:ext cx="2971800" cy="457200"/>
+            <a:off x="4143587" y="0"/>
+            <a:ext cx="3169920" cy="480060"/>
           </a:xfrm>
           <a:prstGeom prst="rect">
             <a:avLst/>
@@ -325,14 +325,14 @@
           <a:effectLst/>
           <a:extLst>
             <a:ext uri="{909E8E84-426E-40DD-AFC4-6F175D3DCCD1}">
-              <a14:hiddenFill xmlns:a14="http://schemas.microsoft.com/office/drawing/2010/main">
+              <a14:hiddenFill xmlns:a14="http://schemas.microsoft.com/office/drawing/2010/main" xmlns="">
                 <a:solidFill>
                   <a:schemeClr val="accent1"/>
                 </a:solidFill>
               </a14:hiddenFill>
             </a:ext>
             <a:ext uri="{91240B29-F687-4F45-9708-019B960494DF}">
-              <a14:hiddenLine xmlns:a14="http://schemas.microsoft.com/office/drawing/2010/main" w="9525">
+              <a14:hiddenLine xmlns:a14="http://schemas.microsoft.com/office/drawing/2010/main" xmlns="" w="9525">
                 <a:solidFill>
                   <a:schemeClr val="tx1"/>
                 </a:solidFill>
@@ -342,7 +342,7 @@
               </a14:hiddenLine>
             </a:ext>
             <a:ext uri="{AF507438-7753-43E0-B8FC-AC1667EBCBE1}">
-              <a14:hiddenEffects xmlns:a14="http://schemas.microsoft.com/office/drawing/2010/main">
+              <a14:hiddenEffects xmlns:a14="http://schemas.microsoft.com/office/drawing/2010/main" xmlns="">
                 <a:effectLst>
                   <a:outerShdw dist="35921" dir="2700000" algn="ctr" rotWithShape="0">
                     <a:schemeClr val="bg2"/>
@@ -353,14 +353,14 @@
           </a:extLst>
         </p:spPr>
         <p:txBody>
-          <a:bodyPr vert="horz" wrap="square" lIns="91440" tIns="45720" rIns="91440" bIns="45720" numCol="1" anchor="t" anchorCtr="0" compatLnSpc="1">
+          <a:bodyPr vert="horz" wrap="square" lIns="96661" tIns="48331" rIns="96661" bIns="48331" numCol="1" anchor="t" anchorCtr="0" compatLnSpc="1">
             <a:prstTxWarp prst="textNoShape">
               <a:avLst/>
             </a:prstTxWarp>
           </a:bodyPr>
           <a:lstStyle>
             <a:lvl1pPr algn="r" eaLnBrk="0" hangingPunct="0">
-              <a:defRPr sz="1200"/>
+              <a:defRPr sz="1300"/>
             </a:lvl1pPr>
           </a:lstStyle>
           <a:p>
@@ -383,8 +383,8 @@
         </p:nvSpPr>
         <p:spPr bwMode="auto">
           <a:xfrm>
-            <a:off x="1143000" y="685800"/>
-            <a:ext cx="4572000" cy="3429000"/>
+            <a:off x="1257300" y="720725"/>
+            <a:ext cx="4800600" cy="3600450"/>
           </a:xfrm>
           <a:prstGeom prst="rect">
             <a:avLst/>
@@ -401,14 +401,14 @@
           <a:effectLst/>
           <a:extLst>
             <a:ext uri="{909E8E84-426E-40DD-AFC4-6F175D3DCCD1}">
-              <a14:hiddenFill xmlns:a14="http://schemas.microsoft.com/office/drawing/2010/main">
+              <a14:hiddenFill xmlns:a14="http://schemas.microsoft.com/office/drawing/2010/main" xmlns="">
                 <a:solidFill>
                   <a:srgbClr val="FFFFFF"/>
                 </a:solidFill>
               </a14:hiddenFill>
             </a:ext>
             <a:ext uri="{AF507438-7753-43E0-B8FC-AC1667EBCBE1}">
-              <a14:hiddenEffects xmlns:a14="http://schemas.microsoft.com/office/drawing/2010/main">
+              <a14:hiddenEffects xmlns:a14="http://schemas.microsoft.com/office/drawing/2010/main" xmlns="">
                 <a:effectLst>
                   <a:outerShdw dist="35921" dir="2700000" algn="ctr" rotWithShape="0">
                     <a:srgbClr val="808080"/>
@@ -417,7 +417,7 @@
               </a14:hiddenEffects>
             </a:ext>
             <a:ext uri="{53640926-AAD7-44D8-BBD7-CCE9431645EC}">
-              <a14:shadowObscured xmlns:a14="http://schemas.microsoft.com/office/drawing/2010/main" val="1"/>
+              <a14:shadowObscured xmlns:a14="http://schemas.microsoft.com/office/drawing/2010/main" xmlns="" val="1"/>
             </a:ext>
           </a:extLst>
         </p:spPr>
@@ -434,8 +434,8 @@
         </p:nvSpPr>
         <p:spPr bwMode="auto">
           <a:xfrm>
-            <a:off x="685800" y="4343400"/>
-            <a:ext cx="5486400" cy="4114800"/>
+            <a:off x="731520" y="4560570"/>
+            <a:ext cx="5852160" cy="4320540"/>
           </a:xfrm>
           <a:prstGeom prst="rect">
             <a:avLst/>
@@ -447,14 +447,14 @@
           <a:effectLst/>
           <a:extLst>
             <a:ext uri="{909E8E84-426E-40DD-AFC4-6F175D3DCCD1}">
-              <a14:hiddenFill xmlns:a14="http://schemas.microsoft.com/office/drawing/2010/main">
+              <a14:hiddenFill xmlns:a14="http://schemas.microsoft.com/office/drawing/2010/main" xmlns="">
                 <a:solidFill>
                   <a:schemeClr val="accent1"/>
                 </a:solidFill>
               </a14:hiddenFill>
             </a:ext>
             <a:ext uri="{91240B29-F687-4F45-9708-019B960494DF}">
-              <a14:hiddenLine xmlns:a14="http://schemas.microsoft.com/office/drawing/2010/main" w="9525">
+              <a14:hiddenLine xmlns:a14="http://schemas.microsoft.com/office/drawing/2010/main" xmlns="" w="9525">
                 <a:solidFill>
                   <a:schemeClr val="tx1"/>
                 </a:solidFill>
@@ -464,7 +464,7 @@
               </a14:hiddenLine>
             </a:ext>
             <a:ext uri="{AF507438-7753-43E0-B8FC-AC1667EBCBE1}">
-              <a14:hiddenEffects xmlns:a14="http://schemas.microsoft.com/office/drawing/2010/main">
+              <a14:hiddenEffects xmlns:a14="http://schemas.microsoft.com/office/drawing/2010/main" xmlns="">
                 <a:effectLst>
                   <a:outerShdw dist="35921" dir="2700000" algn="ctr" rotWithShape="0">
                     <a:schemeClr val="bg2"/>
@@ -475,7 +475,7 @@
           </a:extLst>
         </p:spPr>
         <p:txBody>
-          <a:bodyPr vert="horz" wrap="square" lIns="91440" tIns="45720" rIns="91440" bIns="45720" numCol="1" anchor="t" anchorCtr="0" compatLnSpc="1">
+          <a:bodyPr vert="horz" wrap="square" lIns="96661" tIns="48331" rIns="96661" bIns="48331" numCol="1" anchor="t" anchorCtr="0" compatLnSpc="1">
             <a:prstTxWarp prst="textNoShape">
               <a:avLst/>
             </a:prstTxWarp>
@@ -530,8 +530,8 @@
         </p:nvSpPr>
         <p:spPr bwMode="auto">
           <a:xfrm>
-            <a:off x="0" y="8685213"/>
-            <a:ext cx="2971800" cy="457200"/>
+            <a:off x="0" y="9119474"/>
+            <a:ext cx="3169920" cy="480060"/>
           </a:xfrm>
           <a:prstGeom prst="rect">
             <a:avLst/>
@@ -543,14 +543,14 @@
           <a:effectLst/>
           <a:extLst>
             <a:ext uri="{909E8E84-426E-40DD-AFC4-6F175D3DCCD1}">
-              <a14:hiddenFill xmlns:a14="http://schemas.microsoft.com/office/drawing/2010/main">
+              <a14:hiddenFill xmlns:a14="http://schemas.microsoft.com/office/drawing/2010/main" xmlns="">
                 <a:solidFill>
                   <a:schemeClr val="accent1"/>
                 </a:solidFill>
               </a14:hiddenFill>
             </a:ext>
             <a:ext uri="{91240B29-F687-4F45-9708-019B960494DF}">
-              <a14:hiddenLine xmlns:a14="http://schemas.microsoft.com/office/drawing/2010/main" w="9525">
+              <a14:hiddenLine xmlns:a14="http://schemas.microsoft.com/office/drawing/2010/main" xmlns="" w="9525">
                 <a:solidFill>
                   <a:schemeClr val="tx1"/>
                 </a:solidFill>
@@ -560,7 +560,7 @@
               </a14:hiddenLine>
             </a:ext>
             <a:ext uri="{AF507438-7753-43E0-B8FC-AC1667EBCBE1}">
-              <a14:hiddenEffects xmlns:a14="http://schemas.microsoft.com/office/drawing/2010/main">
+              <a14:hiddenEffects xmlns:a14="http://schemas.microsoft.com/office/drawing/2010/main" xmlns="">
                 <a:effectLst>
                   <a:outerShdw dist="35921" dir="2700000" algn="ctr" rotWithShape="0">
                     <a:schemeClr val="bg2"/>
@@ -571,14 +571,14 @@
           </a:extLst>
         </p:spPr>
         <p:txBody>
-          <a:bodyPr vert="horz" wrap="square" lIns="91440" tIns="45720" rIns="91440" bIns="45720" numCol="1" anchor="b" anchorCtr="0" compatLnSpc="1">
+          <a:bodyPr vert="horz" wrap="square" lIns="96661" tIns="48331" rIns="96661" bIns="48331" numCol="1" anchor="b" anchorCtr="0" compatLnSpc="1">
             <a:prstTxWarp prst="textNoShape">
               <a:avLst/>
             </a:prstTxWarp>
           </a:bodyPr>
           <a:lstStyle>
             <a:lvl1pPr eaLnBrk="0" hangingPunct="0">
-              <a:defRPr sz="1200"/>
+              <a:defRPr sz="1300"/>
             </a:lvl1pPr>
           </a:lstStyle>
           <a:p>
@@ -601,8 +601,8 @@
         </p:nvSpPr>
         <p:spPr bwMode="auto">
           <a:xfrm>
-            <a:off x="3884613" y="8685213"/>
-            <a:ext cx="2971800" cy="457200"/>
+            <a:off x="4143587" y="9119474"/>
+            <a:ext cx="3169920" cy="480060"/>
           </a:xfrm>
           <a:prstGeom prst="rect">
             <a:avLst/>
@@ -614,14 +614,14 @@
           <a:effectLst/>
           <a:extLst>
             <a:ext uri="{909E8E84-426E-40DD-AFC4-6F175D3DCCD1}">
-              <a14:hiddenFill xmlns:a14="http://schemas.microsoft.com/office/drawing/2010/main">
+              <a14:hiddenFill xmlns:a14="http://schemas.microsoft.com/office/drawing/2010/main" xmlns="">
                 <a:solidFill>
                   <a:schemeClr val="accent1"/>
                 </a:solidFill>
               </a14:hiddenFill>
             </a:ext>
             <a:ext uri="{91240B29-F687-4F45-9708-019B960494DF}">
-              <a14:hiddenLine xmlns:a14="http://schemas.microsoft.com/office/drawing/2010/main" w="9525">
+              <a14:hiddenLine xmlns:a14="http://schemas.microsoft.com/office/drawing/2010/main" xmlns="" w="9525">
                 <a:solidFill>
                   <a:schemeClr val="tx1"/>
                 </a:solidFill>
@@ -631,7 +631,7 @@
               </a14:hiddenLine>
             </a:ext>
             <a:ext uri="{AF507438-7753-43E0-B8FC-AC1667EBCBE1}">
-              <a14:hiddenEffects xmlns:a14="http://schemas.microsoft.com/office/drawing/2010/main">
+              <a14:hiddenEffects xmlns:a14="http://schemas.microsoft.com/office/drawing/2010/main" xmlns="">
                 <a:effectLst>
                   <a:outerShdw dist="35921" dir="2700000" algn="ctr" rotWithShape="0">
                     <a:schemeClr val="bg2"/>
@@ -642,14 +642,14 @@
           </a:extLst>
         </p:spPr>
         <p:txBody>
-          <a:bodyPr vert="horz" wrap="square" lIns="91440" tIns="45720" rIns="91440" bIns="45720" numCol="1" anchor="b" anchorCtr="0" compatLnSpc="1">
+          <a:bodyPr vert="horz" wrap="square" lIns="96661" tIns="48331" rIns="96661" bIns="48331" numCol="1" anchor="b" anchorCtr="0" compatLnSpc="1">
             <a:prstTxWarp prst="textNoShape">
               <a:avLst/>
             </a:prstTxWarp>
           </a:bodyPr>
           <a:lstStyle>
             <a:lvl1pPr algn="r" eaLnBrk="0" hangingPunct="0">
-              <a:defRPr sz="1200"/>
+              <a:defRPr sz="1300"/>
             </a:lvl1pPr>
           </a:lstStyle>
           <a:p>
@@ -670,7 +670,7 @@
     </p:spTree>
     <p:extLst>
       <p:ext uri="{BB962C8B-B14F-4D97-AF65-F5344CB8AC3E}">
-        <p14:creationId xmlns:p14="http://schemas.microsoft.com/office/powerpoint/2010/main" val="1534625768"/>
+        <p14:creationId xmlns:p14="http://schemas.microsoft.com/office/powerpoint/2010/main" xmlns="" val="1534625768"/>
       </p:ext>
     </p:extLst>
   </p:cSld>
@@ -917,7 +917,7 @@
     </p:spTree>
     <p:extLst>
       <p:ext uri="{BB962C8B-B14F-4D97-AF65-F5344CB8AC3E}">
-        <p14:creationId xmlns:p14="http://schemas.microsoft.com/office/powerpoint/2010/main" val="2716104023"/>
+        <p14:creationId xmlns:p14="http://schemas.microsoft.com/office/powerpoint/2010/main" xmlns="" val="2716104023"/>
       </p:ext>
     </p:extLst>
   </p:cSld>
@@ -1054,7 +1054,7 @@
               <a:pPr>
                 <a:defRPr/>
               </a:pPr>
-              <a:t>11/7/2017</a:t>
+              <a:t>11/12/2017</a:t>
             </a:fld>
             <a:endParaRPr lang="en-US" altLang="en-US"/>
           </a:p>
@@ -1141,7 +1141,7 @@
     </p:spTree>
     <p:extLst>
       <p:ext uri="{BB962C8B-B14F-4D97-AF65-F5344CB8AC3E}">
-        <p14:creationId xmlns:p14="http://schemas.microsoft.com/office/powerpoint/2010/main" val="3849012506"/>
+        <p14:creationId xmlns:p14="http://schemas.microsoft.com/office/powerpoint/2010/main" xmlns="" val="3849012506"/>
       </p:ext>
     </p:extLst>
   </p:cSld>
@@ -1288,7 +1288,7 @@
               <a:pPr>
                 <a:defRPr/>
               </a:pPr>
-              <a:t>11/7/2017</a:t>
+              <a:t>11/12/2017</a:t>
             </a:fld>
             <a:endParaRPr lang="en-US" altLang="en-US"/>
           </a:p>
@@ -1375,7 +1375,7 @@
     </p:spTree>
     <p:extLst>
       <p:ext uri="{BB962C8B-B14F-4D97-AF65-F5344CB8AC3E}">
-        <p14:creationId xmlns:p14="http://schemas.microsoft.com/office/powerpoint/2010/main" val="1950966811"/>
+        <p14:creationId xmlns:p14="http://schemas.microsoft.com/office/powerpoint/2010/main" xmlns="" val="1950966811"/>
       </p:ext>
     </p:extLst>
   </p:cSld>
@@ -1480,7 +1480,7 @@
     </p:spTree>
     <p:extLst>
       <p:ext uri="{BB962C8B-B14F-4D97-AF65-F5344CB8AC3E}">
-        <p14:creationId xmlns:p14="http://schemas.microsoft.com/office/powerpoint/2010/main" val="1766794565"/>
+        <p14:creationId xmlns:p14="http://schemas.microsoft.com/office/powerpoint/2010/main" xmlns="" val="1766794565"/>
       </p:ext>
     </p:extLst>
   </p:cSld>
@@ -1607,7 +1607,7 @@
     </p:spTree>
     <p:extLst>
       <p:ext uri="{BB962C8B-B14F-4D97-AF65-F5344CB8AC3E}">
-        <p14:creationId xmlns:p14="http://schemas.microsoft.com/office/powerpoint/2010/main" val="2138603420"/>
+        <p14:creationId xmlns:p14="http://schemas.microsoft.com/office/powerpoint/2010/main" xmlns="" val="2138603420"/>
       </p:ext>
     </p:extLst>
   </p:cSld>
@@ -1774,7 +1774,7 @@
     </p:spTree>
     <p:extLst>
       <p:ext uri="{BB962C8B-B14F-4D97-AF65-F5344CB8AC3E}">
-        <p14:creationId xmlns:p14="http://schemas.microsoft.com/office/powerpoint/2010/main" val="2826881444"/>
+        <p14:creationId xmlns:p14="http://schemas.microsoft.com/office/powerpoint/2010/main" xmlns="" val="2826881444"/>
       </p:ext>
     </p:extLst>
   </p:cSld>
@@ -2076,7 +2076,7 @@
     </p:spTree>
     <p:extLst>
       <p:ext uri="{BB962C8B-B14F-4D97-AF65-F5344CB8AC3E}">
-        <p14:creationId xmlns:p14="http://schemas.microsoft.com/office/powerpoint/2010/main" val="1963513231"/>
+        <p14:creationId xmlns:p14="http://schemas.microsoft.com/office/powerpoint/2010/main" xmlns="" val="1963513231"/>
       </p:ext>
     </p:extLst>
   </p:cSld>
@@ -2161,7 +2161,7 @@
               <a:pPr>
                 <a:defRPr/>
               </a:pPr>
-              <a:t>11/7/2017</a:t>
+              <a:t>11/12/2017</a:t>
             </a:fld>
             <a:endParaRPr lang="en-US" altLang="en-US"/>
           </a:p>
@@ -2248,7 +2248,7 @@
     </p:spTree>
     <p:extLst>
       <p:ext uri="{BB962C8B-B14F-4D97-AF65-F5344CB8AC3E}">
-        <p14:creationId xmlns:p14="http://schemas.microsoft.com/office/powerpoint/2010/main" val="2218195436"/>
+        <p14:creationId xmlns:p14="http://schemas.microsoft.com/office/powerpoint/2010/main" xmlns="" val="2218195436"/>
       </p:ext>
     </p:extLst>
   </p:cSld>
@@ -2310,7 +2310,7 @@
               <a:pPr>
                 <a:defRPr/>
               </a:pPr>
-              <a:t>11/7/2017</a:t>
+              <a:t>11/12/2017</a:t>
             </a:fld>
             <a:endParaRPr lang="en-US" altLang="en-US"/>
           </a:p>
@@ -2397,7 +2397,7 @@
     </p:spTree>
     <p:extLst>
       <p:ext uri="{BB962C8B-B14F-4D97-AF65-F5344CB8AC3E}">
-        <p14:creationId xmlns:p14="http://schemas.microsoft.com/office/powerpoint/2010/main" val="1171497205"/>
+        <p14:creationId xmlns:p14="http://schemas.microsoft.com/office/powerpoint/2010/main" xmlns="" val="1171497205"/>
       </p:ext>
     </p:extLst>
   </p:cSld>
@@ -2641,7 +2641,7 @@
               <a:pPr>
                 <a:defRPr/>
               </a:pPr>
-              <a:t>11/7/2017</a:t>
+              <a:t>11/12/2017</a:t>
             </a:fld>
             <a:endParaRPr lang="en-US" altLang="en-US"/>
           </a:p>
@@ -2728,7 +2728,7 @@
     </p:spTree>
     <p:extLst>
       <p:ext uri="{BB962C8B-B14F-4D97-AF65-F5344CB8AC3E}">
-        <p14:creationId xmlns:p14="http://schemas.microsoft.com/office/powerpoint/2010/main" val="2730479000"/>
+        <p14:creationId xmlns:p14="http://schemas.microsoft.com/office/powerpoint/2010/main" xmlns="" val="2730479000"/>
       </p:ext>
     </p:extLst>
   </p:cSld>
@@ -2949,7 +2949,7 @@
               <a:pPr>
                 <a:defRPr/>
               </a:pPr>
-              <a:t>11/7/2017</a:t>
+              <a:t>11/12/2017</a:t>
             </a:fld>
             <a:endParaRPr lang="en-US" altLang="en-US"/>
           </a:p>
@@ -3036,7 +3036,7 @@
     </p:spTree>
     <p:extLst>
       <p:ext uri="{BB962C8B-B14F-4D97-AF65-F5344CB8AC3E}">
-        <p14:creationId xmlns:p14="http://schemas.microsoft.com/office/powerpoint/2010/main" val="2177943095"/>
+        <p14:creationId xmlns:p14="http://schemas.microsoft.com/office/powerpoint/2010/main" xmlns="" val="2177943095"/>
       </p:ext>
     </p:extLst>
   </p:cSld>
@@ -3096,14 +3096,14 @@
           <a:effectLst/>
           <a:extLst>
             <a:ext uri="{909E8E84-426E-40DD-AFC4-6F175D3DCCD1}">
-              <a14:hiddenFill xmlns:a14="http://schemas.microsoft.com/office/drawing/2010/main">
+              <a14:hiddenFill xmlns:a14="http://schemas.microsoft.com/office/drawing/2010/main" xmlns="">
                 <a:solidFill>
                   <a:schemeClr val="accent1"/>
                 </a:solidFill>
               </a14:hiddenFill>
             </a:ext>
             <a:ext uri="{91240B29-F687-4F45-9708-019B960494DF}">
-              <a14:hiddenLine xmlns:a14="http://schemas.microsoft.com/office/drawing/2010/main" w="9525">
+              <a14:hiddenLine xmlns:a14="http://schemas.microsoft.com/office/drawing/2010/main" xmlns="" w="9525">
                 <a:solidFill>
                   <a:schemeClr val="tx1"/>
                 </a:solidFill>
@@ -3113,7 +3113,7 @@
               </a14:hiddenLine>
             </a:ext>
             <a:ext uri="{AF507438-7753-43E0-B8FC-AC1667EBCBE1}">
-              <a14:hiddenEffects xmlns:a14="http://schemas.microsoft.com/office/drawing/2010/main">
+              <a14:hiddenEffects xmlns:a14="http://schemas.microsoft.com/office/drawing/2010/main" xmlns="">
                 <a:effectLst>
                   <a:outerShdw dist="35921" dir="2700000" algn="ctr" rotWithShape="0">
                     <a:schemeClr val="bg2"/>
@@ -3164,14 +3164,14 @@
           <a:effectLst/>
           <a:extLst>
             <a:ext uri="{909E8E84-426E-40DD-AFC4-6F175D3DCCD1}">
-              <a14:hiddenFill xmlns:a14="http://schemas.microsoft.com/office/drawing/2010/main">
+              <a14:hiddenFill xmlns:a14="http://schemas.microsoft.com/office/drawing/2010/main" xmlns="">
                 <a:solidFill>
                   <a:schemeClr val="accent1"/>
                 </a:solidFill>
               </a14:hiddenFill>
             </a:ext>
             <a:ext uri="{91240B29-F687-4F45-9708-019B960494DF}">
-              <a14:hiddenLine xmlns:a14="http://schemas.microsoft.com/office/drawing/2010/main" w="9525">
+              <a14:hiddenLine xmlns:a14="http://schemas.microsoft.com/office/drawing/2010/main" xmlns="" w="9525">
                 <a:solidFill>
                   <a:schemeClr val="tx1"/>
                 </a:solidFill>
@@ -3181,7 +3181,7 @@
               </a14:hiddenLine>
             </a:ext>
             <a:ext uri="{AF507438-7753-43E0-B8FC-AC1667EBCBE1}">
-              <a14:hiddenEffects xmlns:a14="http://schemas.microsoft.com/office/drawing/2010/main">
+              <a14:hiddenEffects xmlns:a14="http://schemas.microsoft.com/office/drawing/2010/main" xmlns="">
                 <a:effectLst>
                   <a:outerShdw dist="35921" dir="2700000" algn="ctr" rotWithShape="0">
                     <a:schemeClr val="bg2"/>
@@ -3729,14 +3729,14 @@
           </a:ln>
           <a:extLst>
             <a:ext uri="{909E8E84-426E-40DD-AFC4-6F175D3DCCD1}">
-              <a14:hiddenFill xmlns:a14="http://schemas.microsoft.com/office/drawing/2010/main">
+              <a14:hiddenFill xmlns:a14="http://schemas.microsoft.com/office/drawing/2010/main" xmlns="">
                 <a:solidFill>
                   <a:srgbClr val="FFFFFF"/>
                 </a:solidFill>
               </a14:hiddenFill>
             </a:ext>
             <a:ext uri="{91240B29-F687-4F45-9708-019B960494DF}">
-              <a14:hiddenLine xmlns:a14="http://schemas.microsoft.com/office/drawing/2010/main" w="9525">
+              <a14:hiddenLine xmlns:a14="http://schemas.microsoft.com/office/drawing/2010/main" xmlns="" w="9525">
                 <a:solidFill>
                   <a:srgbClr val="000000"/>
                 </a:solidFill>
@@ -4002,7 +4002,7 @@
     </p:spTree>
     <p:extLst>
       <p:ext uri="{BB962C8B-B14F-4D97-AF65-F5344CB8AC3E}">
-        <p14:creationId xmlns:p14="http://schemas.microsoft.com/office/powerpoint/2010/main" val="3484506997"/>
+        <p14:creationId xmlns:p14="http://schemas.microsoft.com/office/powerpoint/2010/main" xmlns="" val="3484506997"/>
       </p:ext>
     </p:extLst>
   </p:cSld>
@@ -4111,7 +4111,7 @@
     </p:spTree>
     <p:extLst>
       <p:ext uri="{BB962C8B-B14F-4D97-AF65-F5344CB8AC3E}">
-        <p14:creationId xmlns:p14="http://schemas.microsoft.com/office/powerpoint/2010/main" val="3308352172"/>
+        <p14:creationId xmlns:p14="http://schemas.microsoft.com/office/powerpoint/2010/main" xmlns="" val="3308352172"/>
       </p:ext>
     </p:extLst>
   </p:cSld>
@@ -4204,7 +4204,7 @@
     </p:spTree>
     <p:extLst>
       <p:ext uri="{BB962C8B-B14F-4D97-AF65-F5344CB8AC3E}">
-        <p14:creationId xmlns:p14="http://schemas.microsoft.com/office/powerpoint/2010/main" val="3431267449"/>
+        <p14:creationId xmlns:p14="http://schemas.microsoft.com/office/powerpoint/2010/main" xmlns="" val="3431267449"/>
       </p:ext>
     </p:extLst>
   </p:cSld>
@@ -4280,7 +4280,7 @@
     </p:spTree>
     <p:extLst>
       <p:ext uri="{BB962C8B-B14F-4D97-AF65-F5344CB8AC3E}">
-        <p14:creationId xmlns:p14="http://schemas.microsoft.com/office/powerpoint/2010/main" val="6252755"/>
+        <p14:creationId xmlns:p14="http://schemas.microsoft.com/office/powerpoint/2010/main" xmlns="" val="6252755"/>
       </p:ext>
     </p:extLst>
   </p:cSld>
@@ -4434,7 +4434,7 @@
     </p:spTree>
     <p:extLst>
       <p:ext uri="{BB962C8B-B14F-4D97-AF65-F5344CB8AC3E}">
-        <p14:creationId xmlns:p14="http://schemas.microsoft.com/office/powerpoint/2010/main" val="1990163457"/>
+        <p14:creationId xmlns:p14="http://schemas.microsoft.com/office/powerpoint/2010/main" xmlns="" val="1990163457"/>
       </p:ext>
     </p:extLst>
   </p:cSld>
@@ -4745,7 +4745,7 @@
     </p:spTree>
     <p:extLst>
       <p:ext uri="{BB962C8B-B14F-4D97-AF65-F5344CB8AC3E}">
-        <p14:creationId xmlns:p14="http://schemas.microsoft.com/office/powerpoint/2010/main" val="671100035"/>
+        <p14:creationId xmlns:p14="http://schemas.microsoft.com/office/powerpoint/2010/main" xmlns="" val="671100035"/>
       </p:ext>
     </p:extLst>
   </p:cSld>
@@ -4982,7 +4982,7 @@
     </p:spTree>
     <p:extLst>
       <p:ext uri="{BB962C8B-B14F-4D97-AF65-F5344CB8AC3E}">
-        <p14:creationId xmlns:p14="http://schemas.microsoft.com/office/powerpoint/2010/main" val="671100035"/>
+        <p14:creationId xmlns:p14="http://schemas.microsoft.com/office/powerpoint/2010/main" xmlns="" val="671100035"/>
       </p:ext>
     </p:extLst>
   </p:cSld>
@@ -5118,7 +5118,7 @@
     </p:spTree>
     <p:extLst>
       <p:ext uri="{BB962C8B-B14F-4D97-AF65-F5344CB8AC3E}">
-        <p14:creationId xmlns:p14="http://schemas.microsoft.com/office/powerpoint/2010/main" val="1505864923"/>
+        <p14:creationId xmlns:p14="http://schemas.microsoft.com/office/powerpoint/2010/main" xmlns="" val="1505864923"/>
       </p:ext>
     </p:extLst>
   </p:cSld>
@@ -5214,7 +5214,7 @@
     </p:spTree>
     <p:extLst>
       <p:ext uri="{BB962C8B-B14F-4D97-AF65-F5344CB8AC3E}">
-        <p14:creationId xmlns:p14="http://schemas.microsoft.com/office/powerpoint/2010/main" val="1652512450"/>
+        <p14:creationId xmlns:p14="http://schemas.microsoft.com/office/powerpoint/2010/main" xmlns="" val="1652512450"/>
       </p:ext>
     </p:extLst>
   </p:cSld>
@@ -5451,7 +5451,7 @@
     </p:spTree>
     <p:extLst>
       <p:ext uri="{BB962C8B-B14F-4D97-AF65-F5344CB8AC3E}">
-        <p14:creationId xmlns:p14="http://schemas.microsoft.com/office/powerpoint/2010/main" val="2735570689"/>
+        <p14:creationId xmlns:p14="http://schemas.microsoft.com/office/powerpoint/2010/main" xmlns="" val="2735570689"/>
       </p:ext>
     </p:extLst>
   </p:cSld>
@@ -5710,7 +5710,7 @@
     </p:spTree>
     <p:extLst>
       <p:ext uri="{BB962C8B-B14F-4D97-AF65-F5344CB8AC3E}">
-        <p14:creationId xmlns:p14="http://schemas.microsoft.com/office/powerpoint/2010/main" val="314924256"/>
+        <p14:creationId xmlns:p14="http://schemas.microsoft.com/office/powerpoint/2010/main" xmlns="" val="314924256"/>
       </p:ext>
     </p:extLst>
   </p:cSld>
@@ -5818,7 +5818,7 @@
     </p:spTree>
     <p:extLst>
       <p:ext uri="{BB962C8B-B14F-4D97-AF65-F5344CB8AC3E}">
-        <p14:creationId xmlns:p14="http://schemas.microsoft.com/office/powerpoint/2010/main" val="3077947700"/>
+        <p14:creationId xmlns:p14="http://schemas.microsoft.com/office/powerpoint/2010/main" xmlns="" val="3077947700"/>
       </p:ext>
     </p:extLst>
   </p:cSld>
@@ -6055,7 +6055,7 @@
     </p:spTree>
     <p:extLst>
       <p:ext uri="{BB962C8B-B14F-4D97-AF65-F5344CB8AC3E}">
-        <p14:creationId xmlns:p14="http://schemas.microsoft.com/office/powerpoint/2010/main" val="1112626206"/>
+        <p14:creationId xmlns:p14="http://schemas.microsoft.com/office/powerpoint/2010/main" xmlns="" val="1112626206"/>
       </p:ext>
     </p:extLst>
   </p:cSld>
@@ -6181,7 +6181,7 @@
     </p:spTree>
     <p:extLst>
       <p:ext uri="{BB962C8B-B14F-4D97-AF65-F5344CB8AC3E}">
-        <p14:creationId xmlns:p14="http://schemas.microsoft.com/office/powerpoint/2010/main" val="3088272837"/>
+        <p14:creationId xmlns:p14="http://schemas.microsoft.com/office/powerpoint/2010/main" xmlns="" val="3088272837"/>
       </p:ext>
     </p:extLst>
   </p:cSld>
@@ -6284,7 +6284,7 @@
     </p:spTree>
     <p:extLst>
       <p:ext uri="{BB962C8B-B14F-4D97-AF65-F5344CB8AC3E}">
-        <p14:creationId xmlns:p14="http://schemas.microsoft.com/office/powerpoint/2010/main" val="334759954"/>
+        <p14:creationId xmlns:p14="http://schemas.microsoft.com/office/powerpoint/2010/main" xmlns="" val="334759954"/>
       </p:ext>
     </p:extLst>
   </p:cSld>
@@ -6521,7 +6521,7 @@
     </p:spTree>
     <p:extLst>
       <p:ext uri="{BB962C8B-B14F-4D97-AF65-F5344CB8AC3E}">
-        <p14:creationId xmlns:p14="http://schemas.microsoft.com/office/powerpoint/2010/main" val="2997175923"/>
+        <p14:creationId xmlns:p14="http://schemas.microsoft.com/office/powerpoint/2010/main" xmlns="" val="2997175923"/>
       </p:ext>
     </p:extLst>
   </p:cSld>
@@ -6666,7 +6666,7 @@
     </p:spTree>
     <p:extLst>
       <p:ext uri="{BB962C8B-B14F-4D97-AF65-F5344CB8AC3E}">
-        <p14:creationId xmlns:p14="http://schemas.microsoft.com/office/powerpoint/2010/main" val="2537771398"/>
+        <p14:creationId xmlns:p14="http://schemas.microsoft.com/office/powerpoint/2010/main" xmlns="" val="2537771398"/>
       </p:ext>
     </p:extLst>
   </p:cSld>
@@ -6762,7 +6762,7 @@
     </p:spTree>
     <p:extLst>
       <p:ext uri="{BB962C8B-B14F-4D97-AF65-F5344CB8AC3E}">
-        <p14:creationId xmlns:p14="http://schemas.microsoft.com/office/powerpoint/2010/main" val="3143873876"/>
+        <p14:creationId xmlns:p14="http://schemas.microsoft.com/office/powerpoint/2010/main" xmlns="" val="3143873876"/>
       </p:ext>
     </p:extLst>
   </p:cSld>
@@ -6999,7 +6999,7 @@
     </p:spTree>
     <p:extLst>
       <p:ext uri="{BB962C8B-B14F-4D97-AF65-F5344CB8AC3E}">
-        <p14:creationId xmlns:p14="http://schemas.microsoft.com/office/powerpoint/2010/main" val="1121814747"/>
+        <p14:creationId xmlns:p14="http://schemas.microsoft.com/office/powerpoint/2010/main" xmlns="" val="1121814747"/>
       </p:ext>
     </p:extLst>
   </p:cSld>
@@ -7122,7 +7122,7 @@
     </p:spTree>
     <p:extLst>
       <p:ext uri="{BB962C8B-B14F-4D97-AF65-F5344CB8AC3E}">
-        <p14:creationId xmlns:p14="http://schemas.microsoft.com/office/powerpoint/2010/main" val="1447592189"/>
+        <p14:creationId xmlns:p14="http://schemas.microsoft.com/office/powerpoint/2010/main" xmlns="" val="1447592189"/>
       </p:ext>
     </p:extLst>
   </p:cSld>
@@ -7244,7 +7244,7 @@
     </p:spTree>
     <p:extLst>
       <p:ext uri="{BB962C8B-B14F-4D97-AF65-F5344CB8AC3E}">
-        <p14:creationId xmlns:p14="http://schemas.microsoft.com/office/powerpoint/2010/main" val="3968509039"/>
+        <p14:creationId xmlns:p14="http://schemas.microsoft.com/office/powerpoint/2010/main" xmlns="" val="3968509039"/>
       </p:ext>
     </p:extLst>
   </p:cSld>
@@ -7340,7 +7340,7 @@
     </p:spTree>
     <p:extLst>
       <p:ext uri="{BB962C8B-B14F-4D97-AF65-F5344CB8AC3E}">
-        <p14:creationId xmlns:p14="http://schemas.microsoft.com/office/powerpoint/2010/main" val="3843290255"/>
+        <p14:creationId xmlns:p14="http://schemas.microsoft.com/office/powerpoint/2010/main" xmlns="" val="3843290255"/>
       </p:ext>
     </p:extLst>
   </p:cSld>
@@ -7577,7 +7577,7 @@
     </p:spTree>
     <p:extLst>
       <p:ext uri="{BB962C8B-B14F-4D97-AF65-F5344CB8AC3E}">
-        <p14:creationId xmlns:p14="http://schemas.microsoft.com/office/powerpoint/2010/main" val="2036547419"/>
+        <p14:creationId xmlns:p14="http://schemas.microsoft.com/office/powerpoint/2010/main" xmlns="" val="2036547419"/>
       </p:ext>
     </p:extLst>
   </p:cSld>
@@ -7700,7 +7700,7 @@
     </p:spTree>
     <p:extLst>
       <p:ext uri="{BB962C8B-B14F-4D97-AF65-F5344CB8AC3E}">
-        <p14:creationId xmlns:p14="http://schemas.microsoft.com/office/powerpoint/2010/main" val="4066592543"/>
+        <p14:creationId xmlns:p14="http://schemas.microsoft.com/office/powerpoint/2010/main" xmlns="" val="4066592543"/>
       </p:ext>
     </p:extLst>
   </p:cSld>
@@ -7808,7 +7808,7 @@
     </p:spTree>
     <p:extLst>
       <p:ext uri="{BB962C8B-B14F-4D97-AF65-F5344CB8AC3E}">
-        <p14:creationId xmlns:p14="http://schemas.microsoft.com/office/powerpoint/2010/main" val="2033297992"/>
+        <p14:creationId xmlns:p14="http://schemas.microsoft.com/office/powerpoint/2010/main" xmlns="" val="2033297992"/>
       </p:ext>
     </p:extLst>
   </p:cSld>
@@ -8045,7 +8045,7 @@
     </p:spTree>
     <p:extLst>
       <p:ext uri="{BB962C8B-B14F-4D97-AF65-F5344CB8AC3E}">
-        <p14:creationId xmlns:p14="http://schemas.microsoft.com/office/powerpoint/2010/main" val="876791485"/>
+        <p14:creationId xmlns:p14="http://schemas.microsoft.com/office/powerpoint/2010/main" xmlns="" val="876791485"/>
       </p:ext>
     </p:extLst>
   </p:cSld>
@@ -8157,7 +8157,7 @@
     </p:spTree>
     <p:extLst>
       <p:ext uri="{BB962C8B-B14F-4D97-AF65-F5344CB8AC3E}">
-        <p14:creationId xmlns:p14="http://schemas.microsoft.com/office/powerpoint/2010/main" val="1012127932"/>
+        <p14:creationId xmlns:p14="http://schemas.microsoft.com/office/powerpoint/2010/main" xmlns="" val="1012127932"/>
       </p:ext>
     </p:extLst>
   </p:cSld>
@@ -8265,7 +8265,7 @@
     </p:spTree>
     <p:extLst>
       <p:ext uri="{BB962C8B-B14F-4D97-AF65-F5344CB8AC3E}">
-        <p14:creationId xmlns:p14="http://schemas.microsoft.com/office/powerpoint/2010/main" val="1175813799"/>
+        <p14:creationId xmlns:p14="http://schemas.microsoft.com/office/powerpoint/2010/main" xmlns="" val="1175813799"/>
       </p:ext>
     </p:extLst>
   </p:cSld>
@@ -8705,7 +8705,7 @@
     </p:spTree>
     <p:extLst>
       <p:ext uri="{BB962C8B-B14F-4D97-AF65-F5344CB8AC3E}">
-        <p14:creationId xmlns:p14="http://schemas.microsoft.com/office/powerpoint/2010/main" val="3156773525"/>
+        <p14:creationId xmlns:p14="http://schemas.microsoft.com/office/powerpoint/2010/main" xmlns="" val="3156773525"/>
       </p:ext>
     </p:extLst>
   </p:cSld>
@@ -8795,7 +8795,7 @@
     </p:spTree>
     <p:extLst>
       <p:ext uri="{BB962C8B-B14F-4D97-AF65-F5344CB8AC3E}">
-        <p14:creationId xmlns:p14="http://schemas.microsoft.com/office/powerpoint/2010/main" val="3487430"/>
+        <p14:creationId xmlns:p14="http://schemas.microsoft.com/office/powerpoint/2010/main" xmlns="" val="3487430"/>
       </p:ext>
     </p:extLst>
   </p:cSld>
@@ -8874,7 +8874,7 @@
     </p:spTree>
     <p:extLst>
       <p:ext uri="{BB962C8B-B14F-4D97-AF65-F5344CB8AC3E}">
-        <p14:creationId xmlns:p14="http://schemas.microsoft.com/office/powerpoint/2010/main" val="4184333163"/>
+        <p14:creationId xmlns:p14="http://schemas.microsoft.com/office/powerpoint/2010/main" xmlns="" val="4184333163"/>
       </p:ext>
     </p:extLst>
   </p:cSld>
@@ -8957,7 +8957,7 @@
     </p:spTree>
     <p:extLst>
       <p:ext uri="{BB962C8B-B14F-4D97-AF65-F5344CB8AC3E}">
-        <p14:creationId xmlns:p14="http://schemas.microsoft.com/office/powerpoint/2010/main" val="2566280384"/>
+        <p14:creationId xmlns:p14="http://schemas.microsoft.com/office/powerpoint/2010/main" xmlns="" val="2566280384"/>
       </p:ext>
     </p:extLst>
   </p:cSld>
@@ -9089,7 +9089,7 @@
     </p:spTree>
     <p:extLst>
       <p:ext uri="{BB962C8B-B14F-4D97-AF65-F5344CB8AC3E}">
-        <p14:creationId xmlns:p14="http://schemas.microsoft.com/office/powerpoint/2010/main" val="2825520764"/>
+        <p14:creationId xmlns:p14="http://schemas.microsoft.com/office/powerpoint/2010/main" xmlns="" val="2825520764"/>
       </p:ext>
     </p:extLst>
   </p:cSld>
@@ -9173,7 +9173,7 @@
     </p:spTree>
     <p:extLst>
       <p:ext uri="{BB962C8B-B14F-4D97-AF65-F5344CB8AC3E}">
-        <p14:creationId xmlns:p14="http://schemas.microsoft.com/office/powerpoint/2010/main" val="3761747205"/>
+        <p14:creationId xmlns:p14="http://schemas.microsoft.com/office/powerpoint/2010/main" xmlns="" val="3761747205"/>
       </p:ext>
     </p:extLst>
   </p:cSld>
@@ -9314,7 +9314,7 @@
     </p:spTree>
     <p:extLst>
       <p:ext uri="{BB962C8B-B14F-4D97-AF65-F5344CB8AC3E}">
-        <p14:creationId xmlns:p14="http://schemas.microsoft.com/office/powerpoint/2010/main" val="1431457176"/>
+        <p14:creationId xmlns:p14="http://schemas.microsoft.com/office/powerpoint/2010/main" xmlns="" val="1431457176"/>
       </p:ext>
     </p:extLst>
   </p:cSld>
@@ -9389,7 +9389,7 @@
     </p:spTree>
     <p:extLst>
       <p:ext uri="{BB962C8B-B14F-4D97-AF65-F5344CB8AC3E}">
-        <p14:creationId xmlns:p14="http://schemas.microsoft.com/office/powerpoint/2010/main" val="549163843"/>
+        <p14:creationId xmlns:p14="http://schemas.microsoft.com/office/powerpoint/2010/main" xmlns="" val="549163843"/>
       </p:ext>
     </p:extLst>
   </p:cSld>
@@ -9628,7 +9628,7 @@
     </p:spTree>
     <p:extLst>
       <p:ext uri="{BB962C8B-B14F-4D97-AF65-F5344CB8AC3E}">
-        <p14:creationId xmlns:p14="http://schemas.microsoft.com/office/powerpoint/2010/main" val="1228461210"/>
+        <p14:creationId xmlns:p14="http://schemas.microsoft.com/office/powerpoint/2010/main" xmlns="" val="1228461210"/>
       </p:ext>
     </p:extLst>
   </p:cSld>
@@ -9707,7 +9707,7 @@
     </p:spTree>
     <p:extLst>
       <p:ext uri="{BB962C8B-B14F-4D97-AF65-F5344CB8AC3E}">
-        <p14:creationId xmlns:p14="http://schemas.microsoft.com/office/powerpoint/2010/main" val="2310068441"/>
+        <p14:creationId xmlns:p14="http://schemas.microsoft.com/office/powerpoint/2010/main" xmlns="" val="2310068441"/>
       </p:ext>
     </p:extLst>
   </p:cSld>
@@ -9913,7 +9913,7 @@
     </p:spTree>
     <p:extLst>
       <p:ext uri="{BB962C8B-B14F-4D97-AF65-F5344CB8AC3E}">
-        <p14:creationId xmlns:p14="http://schemas.microsoft.com/office/powerpoint/2010/main" val="1690002108"/>
+        <p14:creationId xmlns:p14="http://schemas.microsoft.com/office/powerpoint/2010/main" xmlns="" val="1690002108"/>
       </p:ext>
     </p:extLst>
   </p:cSld>
@@ -10048,7 +10048,7 @@
     </p:spTree>
     <p:extLst>
       <p:ext uri="{BB962C8B-B14F-4D97-AF65-F5344CB8AC3E}">
-        <p14:creationId xmlns:p14="http://schemas.microsoft.com/office/powerpoint/2010/main" val="3855890902"/>
+        <p14:creationId xmlns:p14="http://schemas.microsoft.com/office/powerpoint/2010/main" xmlns="" val="3855890902"/>
       </p:ext>
     </p:extLst>
   </p:cSld>
@@ -10151,7 +10151,7 @@
     </p:spTree>
     <p:extLst>
       <p:ext uri="{BB962C8B-B14F-4D97-AF65-F5344CB8AC3E}">
-        <p14:creationId xmlns:p14="http://schemas.microsoft.com/office/powerpoint/2010/main" val="221602547"/>
+        <p14:creationId xmlns:p14="http://schemas.microsoft.com/office/powerpoint/2010/main" xmlns="" val="221602547"/>
       </p:ext>
     </p:extLst>
   </p:cSld>
@@ -10225,15 +10225,7 @@
           <a:p>
             <a:r>
               <a:rPr lang="en-GB" dirty="0" smtClean="0"/>
-              <a:t>Is </a:t>
-            </a:r>
-            <a:r>
-              <a:rPr lang="en-GB" dirty="0" smtClean="0"/>
-              <a:t>an </a:t>
-            </a:r>
-            <a:r>
-              <a:rPr lang="en-GB" dirty="0" smtClean="0"/>
-              <a:t>“Activity Diagram” a static or dynamic system model?</a:t>
+              <a:t>Is an “Activity Diagram” a static or dynamic system model?</a:t>
             </a:r>
           </a:p>
           <a:p>
@@ -10245,15 +10237,7 @@
             </a:pPr>
             <a:r>
               <a:rPr lang="en-GB" dirty="0" smtClean="0"/>
-              <a:t>Static </a:t>
-            </a:r>
-            <a:r>
-              <a:rPr lang="en-GB" dirty="0" smtClean="0"/>
-              <a:t>(Structural</a:t>
-            </a:r>
-            <a:r>
-              <a:rPr lang="en-GB" dirty="0" smtClean="0"/>
-              <a:t>)</a:t>
+              <a:t>Static (Structural)</a:t>
             </a:r>
           </a:p>
           <a:p>
@@ -10262,11 +10246,7 @@
             </a:pPr>
             <a:r>
               <a:rPr lang="en-GB" dirty="0" smtClean="0"/>
-              <a:t>Dynamic </a:t>
-            </a:r>
-            <a:r>
-              <a:rPr lang="en-GB" dirty="0" smtClean="0"/>
-              <a:t>(</a:t>
+              <a:t>Dynamic (</a:t>
             </a:r>
             <a:r>
               <a:rPr lang="en-GB" dirty="0" err="1" smtClean="0">
@@ -10298,7 +10278,7 @@
     </p:spTree>
     <p:extLst>
       <p:ext uri="{BB962C8B-B14F-4D97-AF65-F5344CB8AC3E}">
-        <p14:creationId xmlns:p14="http://schemas.microsoft.com/office/powerpoint/2010/main" val="2273572126"/>
+        <p14:creationId xmlns:p14="http://schemas.microsoft.com/office/powerpoint/2010/main" xmlns="" val="2273572126"/>
       </p:ext>
     </p:extLst>
   </p:cSld>
@@ -10371,11 +10351,11 @@
           <a:lstStyle/>
           <a:p>
             <a:pPr marL="514350" indent="-514350">
-              <a:buAutoNum type="alphaLcParenR"/>
+              <a:buNone/>
             </a:pPr>
             <a:r>
               <a:rPr lang="en-GB" dirty="0" smtClean="0"/>
-              <a:t>Dynamic </a:t>
+              <a:t>b) Dynamic </a:t>
             </a:r>
             <a:r>
               <a:rPr lang="en-GB" dirty="0" smtClean="0"/>
@@ -10396,7 +10376,7 @@
     </p:spTree>
     <p:extLst>
       <p:ext uri="{BB962C8B-B14F-4D97-AF65-F5344CB8AC3E}">
-        <p14:creationId xmlns:p14="http://schemas.microsoft.com/office/powerpoint/2010/main" val="598278714"/>
+        <p14:creationId xmlns:p14="http://schemas.microsoft.com/office/powerpoint/2010/main" xmlns="" val="598278714"/>
       </p:ext>
     </p:extLst>
   </p:cSld>
@@ -11111,7 +11091,7 @@
     </p:spTree>
     <p:extLst>
       <p:ext uri="{BB962C8B-B14F-4D97-AF65-F5344CB8AC3E}">
-        <p14:creationId xmlns:p14="http://schemas.microsoft.com/office/powerpoint/2010/main" val="2343455787"/>
+        <p14:creationId xmlns:p14="http://schemas.microsoft.com/office/powerpoint/2010/main" xmlns="" val="2343455787"/>
       </p:ext>
     </p:extLst>
   </p:cSld>
@@ -11604,7 +11584,7 @@
   </a:extraClrSchemeLst>
   <a:extLst>
     <a:ext uri="{05A4C25C-085E-4340-85A3-A5531E510DB2}">
-      <thm15:themeFamily xmlns:thm15="http://schemas.microsoft.com/office/thememl/2012/main" name="Office Theme" id="{62F939B6-93AF-4DB8-9C6B-D6C7DFDC589F}" vid="{4A3C46E8-61CC-4603-A589-7422A47A8E4A}"/>
+      <thm15:themeFamily xmlns:thm15="http://schemas.microsoft.com/office/thememl/2012/main" xmlns="" name="Office Theme" id="{62F939B6-93AF-4DB8-9C6B-D6C7DFDC589F}" vid="{4A3C46E8-61CC-4603-A589-7422A47A8E4A}"/>
     </a:ext>
   </a:extLst>
 </a:theme>
@@ -11865,7 +11845,7 @@
   <a:extraClrSchemeLst/>
   <a:extLst>
     <a:ext uri="{05A4C25C-085E-4340-85A3-A5531E510DB2}">
-      <thm15:themeFamily xmlns:thm15="http://schemas.microsoft.com/office/thememl/2012/main" name="Office Theme" id="{62F939B6-93AF-4DB8-9C6B-D6C7DFDC589F}" vid="{4A3C46E8-61CC-4603-A589-7422A47A8E4A}"/>
+      <thm15:themeFamily xmlns:thm15="http://schemas.microsoft.com/office/thememl/2012/main" xmlns="" name="Office Theme" id="{62F939B6-93AF-4DB8-9C6B-D6C7DFDC589F}" vid="{4A3C46E8-61CC-4603-A589-7422A47A8E4A}"/>
     </a:ext>
   </a:extLst>
 </a:theme>

</xml_diff>